<commit_message>
team roles slide completed in draft
</commit_message>
<xml_diff>
--- a/set10120_cw2_presentation.pptx
+++ b/set10120_cw2_presentation.pptx
@@ -16,7 +16,7 @@
     <p:sldId id="271" r:id="rId7"/>
     <p:sldId id="273" r:id="rId8"/>
     <p:sldId id="274" r:id="rId9"/>
-    <p:sldId id="277" r:id="rId10"/>
+    <p:sldId id="261" r:id="rId10"/>
   </p:sldIdLst>
   <p:sldSz cx="12192000" cy="6858000"/>
   <p:notesSz cx="6858000" cy="9144000"/>
@@ -1136,6 +1136,2976 @@
 </pc:chgInfo>
 </file>
 
+<file path=ppt/diagrams/colors1.xml><?xml version="1.0" encoding="utf-8"?>
+<dgm:colorsDef xmlns:dgm="http://schemas.openxmlformats.org/drawingml/2006/diagram" xmlns:a="http://schemas.openxmlformats.org/drawingml/2006/main" uniqueId="urn:microsoft.com/office/officeart/2018/5/colors/Iconchunking_neutralbg_accent1_2">
+  <dgm:title val=""/>
+  <dgm:desc val=""/>
+  <dgm:catLst>
+    <dgm:cat type="accent1" pri="11200"/>
+  </dgm:catLst>
+  <dgm:styleLbl name="node0">
+    <dgm:fillClrLst meth="repeat">
+      <a:schemeClr val="accent1"/>
+    </dgm:fillClrLst>
+    <dgm:linClrLst meth="repeat">
+      <a:schemeClr val="lt1"/>
+    </dgm:linClrLst>
+    <dgm:effectClrLst/>
+    <dgm:txLinClrLst/>
+    <dgm:txFillClrLst/>
+    <dgm:txEffectClrLst/>
+  </dgm:styleLbl>
+  <dgm:styleLbl name="alignNode1">
+    <dgm:fillClrLst meth="repeat">
+      <a:schemeClr val="accent1"/>
+    </dgm:fillClrLst>
+    <dgm:linClrLst meth="repeat">
+      <a:schemeClr val="accent1"/>
+    </dgm:linClrLst>
+    <dgm:effectClrLst/>
+    <dgm:txLinClrLst/>
+    <dgm:txFillClrLst/>
+    <dgm:txEffectClrLst/>
+  </dgm:styleLbl>
+  <dgm:styleLbl name="node1">
+    <dgm:fillClrLst meth="repeat">
+      <a:schemeClr val="accent1"/>
+    </dgm:fillClrLst>
+    <dgm:linClrLst meth="repeat">
+      <a:schemeClr val="lt1">
+        <a:alpha val="0"/>
+      </a:schemeClr>
+    </dgm:linClrLst>
+    <dgm:effectClrLst/>
+    <dgm:txLinClrLst/>
+    <dgm:txFillClrLst/>
+    <dgm:txEffectClrLst/>
+  </dgm:styleLbl>
+  <dgm:styleLbl name="lnNode1">
+    <dgm:fillClrLst meth="repeat">
+      <a:schemeClr val="accent1"/>
+    </dgm:fillClrLst>
+    <dgm:linClrLst meth="repeat">
+      <a:schemeClr val="lt1"/>
+    </dgm:linClrLst>
+    <dgm:effectClrLst/>
+    <dgm:txLinClrLst/>
+    <dgm:txFillClrLst/>
+    <dgm:txEffectClrLst/>
+  </dgm:styleLbl>
+  <dgm:styleLbl name="vennNode1">
+    <dgm:fillClrLst meth="repeat">
+      <a:schemeClr val="accent1">
+        <a:alpha val="50000"/>
+      </a:schemeClr>
+    </dgm:fillClrLst>
+    <dgm:linClrLst meth="repeat">
+      <a:schemeClr val="lt1"/>
+    </dgm:linClrLst>
+    <dgm:effectClrLst/>
+    <dgm:txLinClrLst/>
+    <dgm:txFillClrLst/>
+    <dgm:txEffectClrLst/>
+  </dgm:styleLbl>
+  <dgm:styleLbl name="node2">
+    <dgm:fillClrLst meth="repeat">
+      <a:schemeClr val="accent1"/>
+    </dgm:fillClrLst>
+    <dgm:linClrLst meth="repeat">
+      <a:schemeClr val="lt1"/>
+    </dgm:linClrLst>
+    <dgm:effectClrLst/>
+    <dgm:txLinClrLst/>
+    <dgm:txFillClrLst/>
+    <dgm:txEffectClrLst/>
+  </dgm:styleLbl>
+  <dgm:styleLbl name="node3">
+    <dgm:fillClrLst meth="repeat">
+      <a:schemeClr val="accent1"/>
+    </dgm:fillClrLst>
+    <dgm:linClrLst meth="repeat">
+      <a:schemeClr val="lt1"/>
+    </dgm:linClrLst>
+    <dgm:effectClrLst/>
+    <dgm:txLinClrLst/>
+    <dgm:txFillClrLst/>
+    <dgm:txEffectClrLst/>
+  </dgm:styleLbl>
+  <dgm:styleLbl name="node4">
+    <dgm:fillClrLst meth="repeat">
+      <a:schemeClr val="accent1"/>
+    </dgm:fillClrLst>
+    <dgm:linClrLst meth="repeat">
+      <a:schemeClr val="lt1"/>
+    </dgm:linClrLst>
+    <dgm:effectClrLst/>
+    <dgm:txLinClrLst/>
+    <dgm:txFillClrLst/>
+    <dgm:txEffectClrLst/>
+  </dgm:styleLbl>
+  <dgm:styleLbl name="fgImgPlace1">
+    <dgm:fillClrLst meth="repeat">
+      <a:schemeClr val="accent1">
+        <a:tint val="50000"/>
+      </a:schemeClr>
+    </dgm:fillClrLst>
+    <dgm:linClrLst meth="repeat">
+      <a:schemeClr val="lt1"/>
+    </dgm:linClrLst>
+    <dgm:effectClrLst/>
+    <dgm:txLinClrLst/>
+    <dgm:txFillClrLst meth="repeat">
+      <a:schemeClr val="lt1"/>
+    </dgm:txFillClrLst>
+    <dgm:txEffectClrLst/>
+  </dgm:styleLbl>
+  <dgm:styleLbl name="alignImgPlace1">
+    <dgm:fillClrLst meth="repeat">
+      <a:schemeClr val="accent1">
+        <a:tint val="50000"/>
+      </a:schemeClr>
+    </dgm:fillClrLst>
+    <dgm:linClrLst meth="repeat">
+      <a:schemeClr val="lt1"/>
+    </dgm:linClrLst>
+    <dgm:effectClrLst/>
+    <dgm:txLinClrLst/>
+    <dgm:txFillClrLst meth="repeat">
+      <a:schemeClr val="lt1"/>
+    </dgm:txFillClrLst>
+    <dgm:txEffectClrLst/>
+  </dgm:styleLbl>
+  <dgm:styleLbl name="bgImgPlace1">
+    <dgm:fillClrLst meth="repeat">
+      <a:schemeClr val="accent1">
+        <a:tint val="50000"/>
+      </a:schemeClr>
+    </dgm:fillClrLst>
+    <dgm:linClrLst meth="repeat">
+      <a:schemeClr val="lt1"/>
+    </dgm:linClrLst>
+    <dgm:effectClrLst/>
+    <dgm:txLinClrLst/>
+    <dgm:txFillClrLst meth="repeat">
+      <a:schemeClr val="lt1"/>
+    </dgm:txFillClrLst>
+    <dgm:txEffectClrLst/>
+  </dgm:styleLbl>
+  <dgm:styleLbl name="sibTrans2D1">
+    <dgm:fillClrLst meth="repeat">
+      <a:schemeClr val="accent1">
+        <a:tint val="60000"/>
+      </a:schemeClr>
+    </dgm:fillClrLst>
+    <dgm:linClrLst meth="repeat">
+      <a:schemeClr val="accent1">
+        <a:tint val="60000"/>
+      </a:schemeClr>
+    </dgm:linClrLst>
+    <dgm:effectClrLst/>
+    <dgm:txLinClrLst/>
+    <dgm:txFillClrLst/>
+    <dgm:txEffectClrLst/>
+  </dgm:styleLbl>
+  <dgm:styleLbl name="fgSibTrans2D1">
+    <dgm:fillClrLst meth="repeat">
+      <a:schemeClr val="accent1">
+        <a:tint val="60000"/>
+      </a:schemeClr>
+    </dgm:fillClrLst>
+    <dgm:linClrLst meth="repeat">
+      <a:schemeClr val="accent1">
+        <a:tint val="60000"/>
+      </a:schemeClr>
+    </dgm:linClrLst>
+    <dgm:effectClrLst/>
+    <dgm:txLinClrLst/>
+    <dgm:txFillClrLst/>
+    <dgm:txEffectClrLst/>
+  </dgm:styleLbl>
+  <dgm:styleLbl name="bgSibTrans2D1">
+    <dgm:fillClrLst meth="repeat">
+      <a:schemeClr val="accent1">
+        <a:tint val="60000"/>
+      </a:schemeClr>
+    </dgm:fillClrLst>
+    <dgm:linClrLst meth="repeat">
+      <a:schemeClr val="accent1">
+        <a:tint val="60000"/>
+      </a:schemeClr>
+    </dgm:linClrLst>
+    <dgm:effectClrLst/>
+    <dgm:txLinClrLst/>
+    <dgm:txFillClrLst/>
+    <dgm:txEffectClrLst/>
+  </dgm:styleLbl>
+  <dgm:styleLbl name="sibTrans1D1">
+    <dgm:fillClrLst meth="repeat">
+      <a:schemeClr val="accent1"/>
+    </dgm:fillClrLst>
+    <dgm:linClrLst meth="repeat">
+      <a:schemeClr val="accent1"/>
+    </dgm:linClrLst>
+    <dgm:effectClrLst/>
+    <dgm:txLinClrLst/>
+    <dgm:txFillClrLst meth="repeat">
+      <a:schemeClr val="tx1"/>
+    </dgm:txFillClrLst>
+    <dgm:txEffectClrLst/>
+  </dgm:styleLbl>
+  <dgm:styleLbl name="callout">
+    <dgm:fillClrLst meth="repeat">
+      <a:schemeClr val="accent1"/>
+    </dgm:fillClrLst>
+    <dgm:linClrLst meth="repeat">
+      <a:schemeClr val="accent1">
+        <a:tint val="50000"/>
+      </a:schemeClr>
+    </dgm:linClrLst>
+    <dgm:effectClrLst/>
+    <dgm:txLinClrLst/>
+    <dgm:txFillClrLst meth="repeat">
+      <a:schemeClr val="tx1"/>
+    </dgm:txFillClrLst>
+    <dgm:txEffectClrLst/>
+  </dgm:styleLbl>
+  <dgm:styleLbl name="asst0">
+    <dgm:fillClrLst meth="repeat">
+      <a:schemeClr val="accent1"/>
+    </dgm:fillClrLst>
+    <dgm:linClrLst meth="repeat">
+      <a:schemeClr val="lt1"/>
+    </dgm:linClrLst>
+    <dgm:effectClrLst/>
+    <dgm:txLinClrLst/>
+    <dgm:txFillClrLst/>
+    <dgm:txEffectClrLst/>
+  </dgm:styleLbl>
+  <dgm:styleLbl name="asst1">
+    <dgm:fillClrLst meth="repeat">
+      <a:schemeClr val="accent1"/>
+    </dgm:fillClrLst>
+    <dgm:linClrLst meth="repeat">
+      <a:schemeClr val="lt1"/>
+    </dgm:linClrLst>
+    <dgm:effectClrLst/>
+    <dgm:txLinClrLst/>
+    <dgm:txFillClrLst/>
+    <dgm:txEffectClrLst/>
+  </dgm:styleLbl>
+  <dgm:styleLbl name="asst2">
+    <dgm:fillClrLst meth="repeat">
+      <a:schemeClr val="accent1"/>
+    </dgm:fillClrLst>
+    <dgm:linClrLst meth="repeat">
+      <a:schemeClr val="lt1"/>
+    </dgm:linClrLst>
+    <dgm:effectClrLst/>
+    <dgm:txLinClrLst/>
+    <dgm:txFillClrLst/>
+    <dgm:txEffectClrLst/>
+  </dgm:styleLbl>
+  <dgm:styleLbl name="asst3">
+    <dgm:fillClrLst meth="repeat">
+      <a:schemeClr val="accent1"/>
+    </dgm:fillClrLst>
+    <dgm:linClrLst meth="repeat">
+      <a:schemeClr val="lt1"/>
+    </dgm:linClrLst>
+    <dgm:effectClrLst/>
+    <dgm:txLinClrLst/>
+    <dgm:txFillClrLst/>
+    <dgm:txEffectClrLst/>
+  </dgm:styleLbl>
+  <dgm:styleLbl name="asst4">
+    <dgm:fillClrLst meth="repeat">
+      <a:schemeClr val="accent1"/>
+    </dgm:fillClrLst>
+    <dgm:linClrLst meth="repeat">
+      <a:schemeClr val="lt1"/>
+    </dgm:linClrLst>
+    <dgm:effectClrLst/>
+    <dgm:txLinClrLst/>
+    <dgm:txFillClrLst/>
+    <dgm:txEffectClrLst/>
+  </dgm:styleLbl>
+  <dgm:styleLbl name="parChTrans2D1">
+    <dgm:fillClrLst meth="repeat">
+      <a:schemeClr val="accent1">
+        <a:tint val="60000"/>
+      </a:schemeClr>
+    </dgm:fillClrLst>
+    <dgm:linClrLst meth="repeat">
+      <a:schemeClr val="accent1">
+        <a:tint val="60000"/>
+      </a:schemeClr>
+    </dgm:linClrLst>
+    <dgm:effectClrLst/>
+    <dgm:txLinClrLst/>
+    <dgm:txFillClrLst meth="repeat">
+      <a:schemeClr val="lt1"/>
+    </dgm:txFillClrLst>
+    <dgm:txEffectClrLst/>
+  </dgm:styleLbl>
+  <dgm:styleLbl name="parChTrans2D2">
+    <dgm:fillClrLst meth="repeat">
+      <a:schemeClr val="accent1"/>
+    </dgm:fillClrLst>
+    <dgm:linClrLst meth="repeat">
+      <a:schemeClr val="accent1"/>
+    </dgm:linClrLst>
+    <dgm:effectClrLst/>
+    <dgm:txLinClrLst/>
+    <dgm:txFillClrLst meth="repeat">
+      <a:schemeClr val="lt1"/>
+    </dgm:txFillClrLst>
+    <dgm:txEffectClrLst/>
+  </dgm:styleLbl>
+  <dgm:styleLbl name="parChTrans2D3">
+    <dgm:fillClrLst meth="repeat">
+      <a:schemeClr val="accent1"/>
+    </dgm:fillClrLst>
+    <dgm:linClrLst meth="repeat">
+      <a:schemeClr val="accent1"/>
+    </dgm:linClrLst>
+    <dgm:effectClrLst/>
+    <dgm:txLinClrLst/>
+    <dgm:txFillClrLst meth="repeat">
+      <a:schemeClr val="lt1"/>
+    </dgm:txFillClrLst>
+    <dgm:txEffectClrLst/>
+  </dgm:styleLbl>
+  <dgm:styleLbl name="parChTrans2D4">
+    <dgm:fillClrLst meth="repeat">
+      <a:schemeClr val="accent1"/>
+    </dgm:fillClrLst>
+    <dgm:linClrLst meth="repeat">
+      <a:schemeClr val="accent1"/>
+    </dgm:linClrLst>
+    <dgm:effectClrLst/>
+    <dgm:txLinClrLst/>
+    <dgm:txFillClrLst meth="repeat">
+      <a:schemeClr val="lt1"/>
+    </dgm:txFillClrLst>
+    <dgm:txEffectClrLst/>
+  </dgm:styleLbl>
+  <dgm:styleLbl name="parChTrans1D1">
+    <dgm:fillClrLst meth="repeat">
+      <a:schemeClr val="accent1"/>
+    </dgm:fillClrLst>
+    <dgm:linClrLst meth="repeat">
+      <a:schemeClr val="accent1">
+        <a:shade val="60000"/>
+      </a:schemeClr>
+    </dgm:linClrLst>
+    <dgm:effectClrLst/>
+    <dgm:txLinClrLst/>
+    <dgm:txFillClrLst meth="repeat">
+      <a:schemeClr val="tx1"/>
+    </dgm:txFillClrLst>
+    <dgm:txEffectClrLst/>
+  </dgm:styleLbl>
+  <dgm:styleLbl name="parChTrans1D2">
+    <dgm:fillClrLst meth="repeat">
+      <a:schemeClr val="accent1"/>
+    </dgm:fillClrLst>
+    <dgm:linClrLst meth="repeat">
+      <a:schemeClr val="accent1">
+        <a:shade val="60000"/>
+      </a:schemeClr>
+    </dgm:linClrLst>
+    <dgm:effectClrLst/>
+    <dgm:txLinClrLst/>
+    <dgm:txFillClrLst meth="repeat">
+      <a:schemeClr val="tx1"/>
+    </dgm:txFillClrLst>
+    <dgm:txEffectClrLst/>
+  </dgm:styleLbl>
+  <dgm:styleLbl name="parChTrans1D3">
+    <dgm:fillClrLst meth="repeat">
+      <a:schemeClr val="accent1"/>
+    </dgm:fillClrLst>
+    <dgm:linClrLst meth="repeat">
+      <a:schemeClr val="accent1">
+        <a:shade val="80000"/>
+      </a:schemeClr>
+    </dgm:linClrLst>
+    <dgm:effectClrLst/>
+    <dgm:txLinClrLst/>
+    <dgm:txFillClrLst meth="repeat">
+      <a:schemeClr val="tx1"/>
+    </dgm:txFillClrLst>
+    <dgm:txEffectClrLst/>
+  </dgm:styleLbl>
+  <dgm:styleLbl name="parChTrans1D4">
+    <dgm:fillClrLst meth="repeat">
+      <a:schemeClr val="accent1"/>
+    </dgm:fillClrLst>
+    <dgm:linClrLst meth="repeat">
+      <a:schemeClr val="accent1">
+        <a:shade val="80000"/>
+      </a:schemeClr>
+    </dgm:linClrLst>
+    <dgm:effectClrLst/>
+    <dgm:txLinClrLst/>
+    <dgm:txFillClrLst meth="repeat">
+      <a:schemeClr val="tx1"/>
+    </dgm:txFillClrLst>
+    <dgm:txEffectClrLst/>
+  </dgm:styleLbl>
+  <dgm:styleLbl name="fgAcc1">
+    <dgm:fillClrLst meth="repeat">
+      <a:schemeClr val="lt1">
+        <a:alpha val="90000"/>
+      </a:schemeClr>
+    </dgm:fillClrLst>
+    <dgm:linClrLst meth="repeat">
+      <a:schemeClr val="accent1"/>
+    </dgm:linClrLst>
+    <dgm:effectClrLst/>
+    <dgm:txLinClrLst/>
+    <dgm:txFillClrLst meth="repeat">
+      <a:schemeClr val="dk1"/>
+    </dgm:txFillClrLst>
+    <dgm:txEffectClrLst/>
+  </dgm:styleLbl>
+  <dgm:styleLbl name="conFgAcc1">
+    <dgm:fillClrLst meth="repeat">
+      <a:schemeClr val="lt1">
+        <a:alpha val="90000"/>
+      </a:schemeClr>
+    </dgm:fillClrLst>
+    <dgm:linClrLst meth="repeat">
+      <a:schemeClr val="accent1"/>
+    </dgm:linClrLst>
+    <dgm:effectClrLst/>
+    <dgm:txLinClrLst/>
+    <dgm:txFillClrLst meth="repeat">
+      <a:schemeClr val="dk1"/>
+    </dgm:txFillClrLst>
+    <dgm:txEffectClrLst/>
+  </dgm:styleLbl>
+  <dgm:styleLbl name="alignAcc1">
+    <dgm:fillClrLst meth="repeat">
+      <a:schemeClr val="lt1">
+        <a:alpha val="90000"/>
+      </a:schemeClr>
+    </dgm:fillClrLst>
+    <dgm:linClrLst meth="repeat">
+      <a:schemeClr val="accent1"/>
+    </dgm:linClrLst>
+    <dgm:effectClrLst/>
+    <dgm:txLinClrLst/>
+    <dgm:txFillClrLst meth="repeat">
+      <a:schemeClr val="dk1"/>
+    </dgm:txFillClrLst>
+    <dgm:txEffectClrLst/>
+  </dgm:styleLbl>
+  <dgm:styleLbl name="trAlignAcc1">
+    <dgm:fillClrLst meth="repeat">
+      <a:schemeClr val="lt1">
+        <a:alpha val="40000"/>
+      </a:schemeClr>
+    </dgm:fillClrLst>
+    <dgm:linClrLst meth="repeat">
+      <a:schemeClr val="accent1"/>
+    </dgm:linClrLst>
+    <dgm:effectClrLst/>
+    <dgm:txLinClrLst/>
+    <dgm:txFillClrLst meth="repeat">
+      <a:schemeClr val="dk1"/>
+    </dgm:txFillClrLst>
+    <dgm:txEffectClrLst/>
+  </dgm:styleLbl>
+  <dgm:styleLbl name="bgAcc1">
+    <dgm:fillClrLst meth="repeat">
+      <a:schemeClr val="lt1">
+        <a:alpha val="90000"/>
+      </a:schemeClr>
+    </dgm:fillClrLst>
+    <dgm:linClrLst meth="repeat">
+      <a:schemeClr val="accent1"/>
+    </dgm:linClrLst>
+    <dgm:effectClrLst/>
+    <dgm:txLinClrLst/>
+    <dgm:txFillClrLst meth="repeat">
+      <a:schemeClr val="dk1"/>
+    </dgm:txFillClrLst>
+    <dgm:txEffectClrLst/>
+  </dgm:styleLbl>
+  <dgm:styleLbl name="solidFgAcc1">
+    <dgm:fillClrLst meth="repeat">
+      <a:schemeClr val="lt1"/>
+    </dgm:fillClrLst>
+    <dgm:linClrLst meth="repeat">
+      <a:schemeClr val="accent1"/>
+    </dgm:linClrLst>
+    <dgm:effectClrLst/>
+    <dgm:txLinClrLst/>
+    <dgm:txFillClrLst meth="repeat">
+      <a:schemeClr val="dk1"/>
+    </dgm:txFillClrLst>
+    <dgm:txEffectClrLst/>
+  </dgm:styleLbl>
+  <dgm:styleLbl name="solidAlignAcc1">
+    <dgm:fillClrLst meth="repeat">
+      <a:schemeClr val="lt1"/>
+    </dgm:fillClrLst>
+    <dgm:linClrLst meth="repeat">
+      <a:schemeClr val="accent1"/>
+    </dgm:linClrLst>
+    <dgm:effectClrLst/>
+    <dgm:txLinClrLst/>
+    <dgm:txFillClrLst meth="repeat">
+      <a:schemeClr val="dk1"/>
+    </dgm:txFillClrLst>
+    <dgm:txEffectClrLst/>
+  </dgm:styleLbl>
+  <dgm:styleLbl name="solidBgAcc1">
+    <dgm:fillClrLst meth="repeat">
+      <a:schemeClr val="lt1"/>
+    </dgm:fillClrLst>
+    <dgm:linClrLst meth="repeat">
+      <a:schemeClr val="accent1"/>
+    </dgm:linClrLst>
+    <dgm:effectClrLst/>
+    <dgm:txLinClrLst/>
+    <dgm:txFillClrLst meth="repeat">
+      <a:schemeClr val="dk1"/>
+    </dgm:txFillClrLst>
+    <dgm:txEffectClrLst/>
+  </dgm:styleLbl>
+  <dgm:styleLbl name="fgAccFollowNode1">
+    <dgm:fillClrLst meth="repeat">
+      <a:schemeClr val="accent1">
+        <a:alpha val="90000"/>
+        <a:tint val="40000"/>
+      </a:schemeClr>
+    </dgm:fillClrLst>
+    <dgm:linClrLst meth="repeat">
+      <a:schemeClr val="accent1">
+        <a:alpha val="90000"/>
+        <a:tint val="40000"/>
+      </a:schemeClr>
+    </dgm:linClrLst>
+    <dgm:effectClrLst/>
+    <dgm:txLinClrLst/>
+    <dgm:txFillClrLst meth="repeat">
+      <a:schemeClr val="dk1"/>
+    </dgm:txFillClrLst>
+    <dgm:txEffectClrLst/>
+  </dgm:styleLbl>
+  <dgm:styleLbl name="alignAccFollowNode1">
+    <dgm:fillClrLst meth="repeat">
+      <a:schemeClr val="accent1">
+        <a:alpha val="90000"/>
+        <a:tint val="40000"/>
+      </a:schemeClr>
+    </dgm:fillClrLst>
+    <dgm:linClrLst meth="repeat">
+      <a:schemeClr val="accent1">
+        <a:alpha val="90000"/>
+        <a:tint val="40000"/>
+      </a:schemeClr>
+    </dgm:linClrLst>
+    <dgm:effectClrLst/>
+    <dgm:txLinClrLst/>
+    <dgm:txFillClrLst meth="repeat">
+      <a:schemeClr val="dk1"/>
+    </dgm:txFillClrLst>
+    <dgm:txEffectClrLst/>
+  </dgm:styleLbl>
+  <dgm:styleLbl name="bgAccFollowNode1">
+    <dgm:fillClrLst meth="repeat">
+      <a:schemeClr val="accent1">
+        <a:alpha val="90000"/>
+        <a:tint val="40000"/>
+      </a:schemeClr>
+    </dgm:fillClrLst>
+    <dgm:linClrLst meth="repeat">
+      <a:schemeClr val="accent1">
+        <a:alpha val="90000"/>
+        <a:tint val="40000"/>
+      </a:schemeClr>
+    </dgm:linClrLst>
+    <dgm:effectClrLst/>
+    <dgm:txLinClrLst/>
+    <dgm:txFillClrLst meth="repeat">
+      <a:schemeClr val="dk1"/>
+    </dgm:txFillClrLst>
+    <dgm:txEffectClrLst/>
+  </dgm:styleLbl>
+  <dgm:styleLbl name="fgAcc0">
+    <dgm:fillClrLst meth="repeat">
+      <a:schemeClr val="lt1">
+        <a:alpha val="90000"/>
+      </a:schemeClr>
+    </dgm:fillClrLst>
+    <dgm:linClrLst meth="repeat">
+      <a:schemeClr val="accent1"/>
+    </dgm:linClrLst>
+    <dgm:effectClrLst/>
+    <dgm:txLinClrLst/>
+    <dgm:txFillClrLst meth="repeat">
+      <a:schemeClr val="dk1"/>
+    </dgm:txFillClrLst>
+    <dgm:txEffectClrLst/>
+  </dgm:styleLbl>
+  <dgm:styleLbl name="fgAcc2">
+    <dgm:fillClrLst meth="repeat">
+      <a:schemeClr val="lt1">
+        <a:alpha val="90000"/>
+      </a:schemeClr>
+    </dgm:fillClrLst>
+    <dgm:linClrLst meth="repeat">
+      <a:schemeClr val="accent1"/>
+    </dgm:linClrLst>
+    <dgm:effectClrLst/>
+    <dgm:txLinClrLst/>
+    <dgm:txFillClrLst meth="repeat">
+      <a:schemeClr val="dk1"/>
+    </dgm:txFillClrLst>
+    <dgm:txEffectClrLst/>
+  </dgm:styleLbl>
+  <dgm:styleLbl name="fgAcc3">
+    <dgm:fillClrLst meth="repeat">
+      <a:schemeClr val="lt1">
+        <a:alpha val="90000"/>
+      </a:schemeClr>
+    </dgm:fillClrLst>
+    <dgm:linClrLst meth="repeat">
+      <a:schemeClr val="accent1"/>
+    </dgm:linClrLst>
+    <dgm:effectClrLst/>
+    <dgm:txLinClrLst/>
+    <dgm:txFillClrLst meth="repeat">
+      <a:schemeClr val="dk1"/>
+    </dgm:txFillClrLst>
+    <dgm:txEffectClrLst/>
+  </dgm:styleLbl>
+  <dgm:styleLbl name="fgAcc4">
+    <dgm:fillClrLst meth="repeat">
+      <a:schemeClr val="lt1">
+        <a:alpha val="90000"/>
+      </a:schemeClr>
+    </dgm:fillClrLst>
+    <dgm:linClrLst meth="repeat">
+      <a:schemeClr val="accent1"/>
+    </dgm:linClrLst>
+    <dgm:effectClrLst/>
+    <dgm:txLinClrLst/>
+    <dgm:txFillClrLst meth="repeat">
+      <a:schemeClr val="dk1"/>
+    </dgm:txFillClrLst>
+    <dgm:txEffectClrLst/>
+  </dgm:styleLbl>
+  <dgm:styleLbl name="bgShp">
+    <dgm:fillClrLst meth="repeat">
+      <a:schemeClr val="bg1">
+        <a:lumMod val="95000"/>
+      </a:schemeClr>
+    </dgm:fillClrLst>
+    <dgm:linClrLst meth="repeat">
+      <a:schemeClr val="accent1"/>
+    </dgm:linClrLst>
+    <dgm:effectClrLst/>
+    <dgm:txLinClrLst/>
+    <dgm:txFillClrLst meth="repeat">
+      <a:schemeClr val="dk1"/>
+    </dgm:txFillClrLst>
+    <dgm:txEffectClrLst/>
+  </dgm:styleLbl>
+  <dgm:styleLbl name="dkBgShp">
+    <dgm:fillClrLst meth="repeat">
+      <a:schemeClr val="accent1">
+        <a:shade val="80000"/>
+      </a:schemeClr>
+    </dgm:fillClrLst>
+    <dgm:linClrLst meth="repeat">
+      <a:schemeClr val="accent1"/>
+    </dgm:linClrLst>
+    <dgm:effectClrLst/>
+    <dgm:txLinClrLst/>
+    <dgm:txFillClrLst meth="repeat">
+      <a:schemeClr val="lt1"/>
+    </dgm:txFillClrLst>
+    <dgm:txEffectClrLst/>
+  </dgm:styleLbl>
+  <dgm:styleLbl name="trBgShp">
+    <dgm:fillClrLst meth="repeat">
+      <a:schemeClr val="accent1">
+        <a:tint val="50000"/>
+        <a:alpha val="40000"/>
+      </a:schemeClr>
+    </dgm:fillClrLst>
+    <dgm:linClrLst meth="repeat">
+      <a:schemeClr val="accent1"/>
+    </dgm:linClrLst>
+    <dgm:effectClrLst/>
+    <dgm:txLinClrLst/>
+    <dgm:txFillClrLst meth="repeat">
+      <a:schemeClr val="lt1"/>
+    </dgm:txFillClrLst>
+    <dgm:txEffectClrLst/>
+  </dgm:styleLbl>
+  <dgm:styleLbl name="fgShp">
+    <dgm:fillClrLst meth="repeat">
+      <a:schemeClr val="accent1">
+        <a:tint val="60000"/>
+      </a:schemeClr>
+    </dgm:fillClrLst>
+    <dgm:linClrLst meth="repeat">
+      <a:schemeClr val="lt1"/>
+    </dgm:linClrLst>
+    <dgm:effectClrLst/>
+    <dgm:txLinClrLst/>
+    <dgm:txFillClrLst meth="repeat">
+      <a:schemeClr val="dk1"/>
+    </dgm:txFillClrLst>
+    <dgm:txEffectClrLst/>
+  </dgm:styleLbl>
+  <dgm:styleLbl name="revTx">
+    <dgm:fillClrLst meth="repeat">
+      <a:schemeClr val="lt1">
+        <a:alpha val="0"/>
+      </a:schemeClr>
+    </dgm:fillClrLst>
+    <dgm:linClrLst meth="repeat">
+      <a:schemeClr val="dk1">
+        <a:alpha val="0"/>
+      </a:schemeClr>
+    </dgm:linClrLst>
+    <dgm:effectClrLst/>
+    <dgm:txLinClrLst/>
+    <dgm:txFillClrLst meth="repeat">
+      <a:schemeClr val="tx1"/>
+    </dgm:txFillClrLst>
+    <dgm:txEffectClrLst/>
+  </dgm:styleLbl>
+</dgm:colorsDef>
+</file>
+
+<file path=ppt/diagrams/data1.xml><?xml version="1.0" encoding="utf-8"?>
+<dgm:dataModel xmlns:dgm="http://schemas.openxmlformats.org/drawingml/2006/diagram" xmlns:a="http://schemas.openxmlformats.org/drawingml/2006/main">
+  <dgm:ptLst>
+    <dgm:pt modelId="{21E1A1C2-9E95-43C6-84D3-5C353B2BA3A6}" type="doc">
+      <dgm:prSet loTypeId="urn:microsoft.com/office/officeart/2018/2/layout/IconLabelList" loCatId="icon" qsTypeId="urn:microsoft.com/office/officeart/2005/8/quickstyle/simple1" qsCatId="simple" csTypeId="urn:microsoft.com/office/officeart/2018/5/colors/Iconchunking_neutralbg_accent1_2" csCatId="accent1" phldr="1"/>
+      <dgm:spPr/>
+      <dgm:t>
+        <a:bodyPr/>
+        <a:lstStyle/>
+        <a:p>
+          <a:endParaRPr lang="en-US"/>
+        </a:p>
+      </dgm:t>
+    </dgm:pt>
+    <dgm:pt modelId="{BC1647FA-FC16-4088-8781-5DF395C7980B}">
+      <dgm:prSet/>
+      <dgm:spPr/>
+      <dgm:t>
+        <a:bodyPr/>
+        <a:lstStyle/>
+        <a:p>
+          <a:endParaRPr lang="en-US" dirty="0"/>
+        </a:p>
+      </dgm:t>
+    </dgm:pt>
+    <dgm:pt modelId="{63EF1F10-D557-4F10-B999-06D3BD92DC15}" type="parTrans" cxnId="{1887557E-35FE-46FA-8BA0-FBA65FF74552}">
+      <dgm:prSet/>
+      <dgm:spPr/>
+      <dgm:t>
+        <a:bodyPr/>
+        <a:lstStyle/>
+        <a:p>
+          <a:endParaRPr lang="en-US"/>
+        </a:p>
+      </dgm:t>
+    </dgm:pt>
+    <dgm:pt modelId="{95DFB8A9-A8F2-44C9-B0F5-C0F85B6E87DD}" type="sibTrans" cxnId="{1887557E-35FE-46FA-8BA0-FBA65FF74552}">
+      <dgm:prSet/>
+      <dgm:spPr/>
+      <dgm:t>
+        <a:bodyPr/>
+        <a:lstStyle/>
+        <a:p>
+          <a:endParaRPr lang="en-US"/>
+        </a:p>
+      </dgm:t>
+    </dgm:pt>
+    <dgm:pt modelId="{7020CCAD-93BA-4EF1-9AAE-39471372D13D}">
+      <dgm:prSet/>
+      <dgm:spPr/>
+      <dgm:t>
+        <a:bodyPr/>
+        <a:lstStyle/>
+        <a:p>
+          <a:endParaRPr lang="en-US" dirty="0"/>
+        </a:p>
+      </dgm:t>
+    </dgm:pt>
+    <dgm:pt modelId="{C334F9B7-F099-49ED-AA1D-FCA4505C4399}" type="parTrans" cxnId="{0B5A0169-D9C1-446E-82F7-E8D3D9228710}">
+      <dgm:prSet/>
+      <dgm:spPr/>
+      <dgm:t>
+        <a:bodyPr/>
+        <a:lstStyle/>
+        <a:p>
+          <a:endParaRPr lang="en-US"/>
+        </a:p>
+      </dgm:t>
+    </dgm:pt>
+    <dgm:pt modelId="{3CC89F7E-4D5D-4704-9E72-7E86AD25575A}" type="sibTrans" cxnId="{0B5A0169-D9C1-446E-82F7-E8D3D9228710}">
+      <dgm:prSet/>
+      <dgm:spPr/>
+      <dgm:t>
+        <a:bodyPr/>
+        <a:lstStyle/>
+        <a:p>
+          <a:endParaRPr lang="en-US"/>
+        </a:p>
+      </dgm:t>
+    </dgm:pt>
+    <dgm:pt modelId="{23553C81-26F7-4E18-94BE-C9452D746B9B}">
+      <dgm:prSet/>
+      <dgm:spPr/>
+      <dgm:t>
+        <a:bodyPr/>
+        <a:lstStyle/>
+        <a:p>
+          <a:endParaRPr lang="en-US" dirty="0"/>
+        </a:p>
+      </dgm:t>
+    </dgm:pt>
+    <dgm:pt modelId="{0A4FE284-2861-478E-997B-01411C9D44D0}" type="parTrans" cxnId="{2251E6E0-6376-4D48-BBF6-71A74BEBCA98}">
+      <dgm:prSet/>
+      <dgm:spPr/>
+      <dgm:t>
+        <a:bodyPr/>
+        <a:lstStyle/>
+        <a:p>
+          <a:endParaRPr lang="en-US"/>
+        </a:p>
+      </dgm:t>
+    </dgm:pt>
+    <dgm:pt modelId="{00553CB4-3FC3-41B8-887F-6E51B0C44C2B}" type="sibTrans" cxnId="{2251E6E0-6376-4D48-BBF6-71A74BEBCA98}">
+      <dgm:prSet/>
+      <dgm:spPr/>
+      <dgm:t>
+        <a:bodyPr/>
+        <a:lstStyle/>
+        <a:p>
+          <a:endParaRPr lang="en-US"/>
+        </a:p>
+      </dgm:t>
+    </dgm:pt>
+    <dgm:pt modelId="{E8F1A2F6-B71C-4950-B94B-47EEE5D8D187}">
+      <dgm:prSet/>
+      <dgm:spPr/>
+      <dgm:t>
+        <a:bodyPr/>
+        <a:lstStyle/>
+        <a:p>
+          <a:endParaRPr lang="en-US" dirty="0"/>
+        </a:p>
+      </dgm:t>
+    </dgm:pt>
+    <dgm:pt modelId="{917EEC95-329A-4867-95C9-303CAFBE7BC3}" type="parTrans" cxnId="{B57AE466-A0A1-40EE-9061-E2706C172114}">
+      <dgm:prSet/>
+      <dgm:spPr/>
+      <dgm:t>
+        <a:bodyPr/>
+        <a:lstStyle/>
+        <a:p>
+          <a:endParaRPr lang="en-US"/>
+        </a:p>
+      </dgm:t>
+    </dgm:pt>
+    <dgm:pt modelId="{FA944B4D-6B91-493E-93C4-4AFBA652ED21}" type="sibTrans" cxnId="{B57AE466-A0A1-40EE-9061-E2706C172114}">
+      <dgm:prSet/>
+      <dgm:spPr/>
+      <dgm:t>
+        <a:bodyPr/>
+        <a:lstStyle/>
+        <a:p>
+          <a:endParaRPr lang="en-US"/>
+        </a:p>
+      </dgm:t>
+    </dgm:pt>
+    <dgm:pt modelId="{1A552DB5-8A00-4471-940C-06DAEF5D7598}">
+      <dgm:prSet/>
+      <dgm:spPr/>
+      <dgm:t>
+        <a:bodyPr/>
+        <a:lstStyle/>
+        <a:p>
+          <a:pPr algn="ctr"/>
+          <a:endParaRPr lang="en-US" dirty="0"/>
+        </a:p>
+      </dgm:t>
+    </dgm:pt>
+    <dgm:pt modelId="{02A5A747-96DD-4BC0-94CB-F4F19514DDD6}" type="sibTrans" cxnId="{C0661B17-35EA-484A-B3AC-B2B011B73B45}">
+      <dgm:prSet/>
+      <dgm:spPr/>
+      <dgm:t>
+        <a:bodyPr/>
+        <a:lstStyle/>
+        <a:p>
+          <a:endParaRPr lang="en-US"/>
+        </a:p>
+      </dgm:t>
+    </dgm:pt>
+    <dgm:pt modelId="{C4E06E00-488D-46C6-B719-B834F94B36C5}" type="parTrans" cxnId="{C0661B17-35EA-484A-B3AC-B2B011B73B45}">
+      <dgm:prSet/>
+      <dgm:spPr/>
+      <dgm:t>
+        <a:bodyPr/>
+        <a:lstStyle/>
+        <a:p>
+          <a:endParaRPr lang="en-US"/>
+        </a:p>
+      </dgm:t>
+    </dgm:pt>
+    <dgm:pt modelId="{A9312221-7DB9-4CD0-8999-86E663B10108}" type="pres">
+      <dgm:prSet presAssocID="{21E1A1C2-9E95-43C6-84D3-5C353B2BA3A6}" presName="root" presStyleCnt="0">
+        <dgm:presLayoutVars>
+          <dgm:dir/>
+          <dgm:resizeHandles val="exact"/>
+        </dgm:presLayoutVars>
+      </dgm:prSet>
+      <dgm:spPr/>
+    </dgm:pt>
+    <dgm:pt modelId="{510F5CE2-E379-43DE-95C9-404149258CDA}" type="pres">
+      <dgm:prSet presAssocID="{BC1647FA-FC16-4088-8781-5DF395C7980B}" presName="compNode" presStyleCnt="0"/>
+      <dgm:spPr/>
+    </dgm:pt>
+    <dgm:pt modelId="{8D713087-BFBB-4240-AD58-8715C20A8E6E}" type="pres">
+      <dgm:prSet presAssocID="{BC1647FA-FC16-4088-8781-5DF395C7980B}" presName="iconRect" presStyleLbl="node1" presStyleIdx="0" presStyleCnt="5"/>
+      <dgm:spPr>
+        <a:blipFill>
+          <a:blip xmlns:r="http://schemas.openxmlformats.org/officeDocument/2006/relationships" r:embed="rId1">
+            <a:extLst>
+              <a:ext uri="{96DAC541-7B7A-43D3-8B79-37D633B846F1}">
+                <asvg:svgBlip xmlns:asvg="http://schemas.microsoft.com/office/drawing/2016/SVG/main" r:embed="rId2"/>
+              </a:ext>
+            </a:extLst>
+          </a:blip>
+          <a:srcRect/>
+          <a:stretch>
+            <a:fillRect/>
+          </a:stretch>
+        </a:blipFill>
+        <a:ln>
+          <a:noFill/>
+        </a:ln>
+      </dgm:spPr>
+      <dgm:extLst>
+        <a:ext uri="{E40237B7-FDA0-4F09-8148-C483321AD2D9}">
+          <dgm14:cNvPr xmlns:dgm14="http://schemas.microsoft.com/office/drawing/2010/diagram" id="0" name="" descr="Priorities outline"/>
+        </a:ext>
+      </dgm:extLst>
+    </dgm:pt>
+    <dgm:pt modelId="{494BDD52-8303-451B-9097-16F1C72964B4}" type="pres">
+      <dgm:prSet presAssocID="{BC1647FA-FC16-4088-8781-5DF395C7980B}" presName="spaceRect" presStyleCnt="0"/>
+      <dgm:spPr/>
+    </dgm:pt>
+    <dgm:pt modelId="{9C4611F3-68EF-458D-8555-33E83AAC8194}" type="pres">
+      <dgm:prSet presAssocID="{BC1647FA-FC16-4088-8781-5DF395C7980B}" presName="textRect" presStyleLbl="revTx" presStyleIdx="0" presStyleCnt="5">
+        <dgm:presLayoutVars>
+          <dgm:chMax val="1"/>
+          <dgm:chPref val="1"/>
+        </dgm:presLayoutVars>
+      </dgm:prSet>
+      <dgm:spPr/>
+    </dgm:pt>
+    <dgm:pt modelId="{B3E2B716-7B40-4B3E-A71E-3A7A90FA6A23}" type="pres">
+      <dgm:prSet presAssocID="{95DFB8A9-A8F2-44C9-B0F5-C0F85B6E87DD}" presName="sibTrans" presStyleCnt="0"/>
+      <dgm:spPr/>
+    </dgm:pt>
+    <dgm:pt modelId="{42CF95A7-44CD-4C95-A29F-05C16C2E4EAE}" type="pres">
+      <dgm:prSet presAssocID="{7020CCAD-93BA-4EF1-9AAE-39471372D13D}" presName="compNode" presStyleCnt="0"/>
+      <dgm:spPr/>
+    </dgm:pt>
+    <dgm:pt modelId="{108E2A86-CF45-489F-9B09-9E0FEB793BEC}" type="pres">
+      <dgm:prSet presAssocID="{7020CCAD-93BA-4EF1-9AAE-39471372D13D}" presName="iconRect" presStyleLbl="node1" presStyleIdx="1" presStyleCnt="5"/>
+      <dgm:spPr>
+        <a:blipFill>
+          <a:blip xmlns:r="http://schemas.openxmlformats.org/officeDocument/2006/relationships" r:embed="rId3">
+            <a:extLst>
+              <a:ext uri="{96DAC541-7B7A-43D3-8B79-37D633B846F1}">
+                <asvg:svgBlip xmlns:asvg="http://schemas.microsoft.com/office/drawing/2016/SVG/main" r:embed="rId4"/>
+              </a:ext>
+            </a:extLst>
+          </a:blip>
+          <a:srcRect/>
+          <a:stretch>
+            <a:fillRect/>
+          </a:stretch>
+        </a:blipFill>
+        <a:ln>
+          <a:noFill/>
+        </a:ln>
+      </dgm:spPr>
+      <dgm:extLst>
+        <a:ext uri="{E40237B7-FDA0-4F09-8148-C483321AD2D9}">
+          <dgm14:cNvPr xmlns:dgm14="http://schemas.microsoft.com/office/drawing/2010/diagram" id="0" name="" descr="Management outline"/>
+        </a:ext>
+      </dgm:extLst>
+    </dgm:pt>
+    <dgm:pt modelId="{FF1E9579-879E-4D83-A4FD-84B492C0B9BF}" type="pres">
+      <dgm:prSet presAssocID="{7020CCAD-93BA-4EF1-9AAE-39471372D13D}" presName="spaceRect" presStyleCnt="0"/>
+      <dgm:spPr/>
+    </dgm:pt>
+    <dgm:pt modelId="{E9CB981E-2F25-4C85-9911-B7AE7C9277A0}" type="pres">
+      <dgm:prSet presAssocID="{7020CCAD-93BA-4EF1-9AAE-39471372D13D}" presName="textRect" presStyleLbl="revTx" presStyleIdx="1" presStyleCnt="5">
+        <dgm:presLayoutVars>
+          <dgm:chMax val="1"/>
+          <dgm:chPref val="1"/>
+        </dgm:presLayoutVars>
+      </dgm:prSet>
+      <dgm:spPr/>
+    </dgm:pt>
+    <dgm:pt modelId="{AF9928D6-829D-42DB-B176-CAB43522F69D}" type="pres">
+      <dgm:prSet presAssocID="{3CC89F7E-4D5D-4704-9E72-7E86AD25575A}" presName="sibTrans" presStyleCnt="0"/>
+      <dgm:spPr/>
+    </dgm:pt>
+    <dgm:pt modelId="{682DBB5D-F40C-4077-A49E-2BD88F251BDD}" type="pres">
+      <dgm:prSet presAssocID="{23553C81-26F7-4E18-94BE-C9452D746B9B}" presName="compNode" presStyleCnt="0"/>
+      <dgm:spPr/>
+    </dgm:pt>
+    <dgm:pt modelId="{8FB2C474-F8DE-4B18-AB47-D4D0D3899577}" type="pres">
+      <dgm:prSet presAssocID="{23553C81-26F7-4E18-94BE-C9452D746B9B}" presName="iconRect" presStyleLbl="node1" presStyleIdx="2" presStyleCnt="5"/>
+      <dgm:spPr>
+        <a:blipFill>
+          <a:blip xmlns:r="http://schemas.openxmlformats.org/officeDocument/2006/relationships" r:embed="rId5">
+            <a:extLst>
+              <a:ext uri="{96DAC541-7B7A-43D3-8B79-37D633B846F1}">
+                <asvg:svgBlip xmlns:asvg="http://schemas.microsoft.com/office/drawing/2016/SVG/main" r:embed="rId6"/>
+              </a:ext>
+            </a:extLst>
+          </a:blip>
+          <a:srcRect/>
+          <a:stretch>
+            <a:fillRect/>
+          </a:stretch>
+        </a:blipFill>
+        <a:ln>
+          <a:noFill/>
+        </a:ln>
+      </dgm:spPr>
+      <dgm:extLst>
+        <a:ext uri="{E40237B7-FDA0-4F09-8148-C483321AD2D9}">
+          <dgm14:cNvPr xmlns:dgm14="http://schemas.microsoft.com/office/drawing/2010/diagram" id="0" name="" descr="Programmer male outline"/>
+        </a:ext>
+      </dgm:extLst>
+    </dgm:pt>
+    <dgm:pt modelId="{1249EE5C-5FF0-4BB7-9927-25C775AF6221}" type="pres">
+      <dgm:prSet presAssocID="{23553C81-26F7-4E18-94BE-C9452D746B9B}" presName="spaceRect" presStyleCnt="0"/>
+      <dgm:spPr/>
+    </dgm:pt>
+    <dgm:pt modelId="{78815FF0-0AB9-4ED6-B92A-5932A1203B53}" type="pres">
+      <dgm:prSet presAssocID="{23553C81-26F7-4E18-94BE-C9452D746B9B}" presName="textRect" presStyleLbl="revTx" presStyleIdx="2" presStyleCnt="5">
+        <dgm:presLayoutVars>
+          <dgm:chMax val="1"/>
+          <dgm:chPref val="1"/>
+        </dgm:presLayoutVars>
+      </dgm:prSet>
+      <dgm:spPr/>
+    </dgm:pt>
+    <dgm:pt modelId="{C9B3B157-5B15-4D0F-911B-A79D041950E6}" type="pres">
+      <dgm:prSet presAssocID="{00553CB4-3FC3-41B8-887F-6E51B0C44C2B}" presName="sibTrans" presStyleCnt="0"/>
+      <dgm:spPr/>
+    </dgm:pt>
+    <dgm:pt modelId="{7BE143BB-3375-45F3-B7A1-62B17E0AB4D9}" type="pres">
+      <dgm:prSet presAssocID="{1A552DB5-8A00-4471-940C-06DAEF5D7598}" presName="compNode" presStyleCnt="0"/>
+      <dgm:spPr/>
+    </dgm:pt>
+    <dgm:pt modelId="{95F47AF0-81E1-45AF-BDB2-4F805A16DE7D}" type="pres">
+      <dgm:prSet presAssocID="{1A552DB5-8A00-4471-940C-06DAEF5D7598}" presName="iconRect" presStyleLbl="node1" presStyleIdx="3" presStyleCnt="5"/>
+      <dgm:spPr>
+        <a:blipFill>
+          <a:blip xmlns:r="http://schemas.openxmlformats.org/officeDocument/2006/relationships" r:embed="rId7">
+            <a:extLst>
+              <a:ext uri="{96DAC541-7B7A-43D3-8B79-37D633B846F1}">
+                <asvg:svgBlip xmlns:asvg="http://schemas.microsoft.com/office/drawing/2016/SVG/main" r:embed="rId8"/>
+              </a:ext>
+            </a:extLst>
+          </a:blip>
+          <a:srcRect/>
+          <a:stretch>
+            <a:fillRect/>
+          </a:stretch>
+        </a:blipFill>
+        <a:ln>
+          <a:noFill/>
+        </a:ln>
+      </dgm:spPr>
+      <dgm:extLst>
+        <a:ext uri="{E40237B7-FDA0-4F09-8148-C483321AD2D9}">
+          <dgm14:cNvPr xmlns:dgm14="http://schemas.microsoft.com/office/drawing/2010/diagram" id="0" name="" descr="Folder Search outline"/>
+        </a:ext>
+      </dgm:extLst>
+    </dgm:pt>
+    <dgm:pt modelId="{4D71A2C1-BE75-4AC4-8E5B-EBA30A11B042}" type="pres">
+      <dgm:prSet presAssocID="{1A552DB5-8A00-4471-940C-06DAEF5D7598}" presName="spaceRect" presStyleCnt="0"/>
+      <dgm:spPr/>
+    </dgm:pt>
+    <dgm:pt modelId="{16379CC7-27AC-4F67-B39E-72F49904C51C}" type="pres">
+      <dgm:prSet presAssocID="{1A552DB5-8A00-4471-940C-06DAEF5D7598}" presName="textRect" presStyleLbl="revTx" presStyleIdx="3" presStyleCnt="5">
+        <dgm:presLayoutVars>
+          <dgm:chMax val="1"/>
+          <dgm:chPref val="1"/>
+        </dgm:presLayoutVars>
+      </dgm:prSet>
+      <dgm:spPr/>
+    </dgm:pt>
+    <dgm:pt modelId="{3ED71837-91FC-4B69-A268-FE34F03C44AB}" type="pres">
+      <dgm:prSet presAssocID="{02A5A747-96DD-4BC0-94CB-F4F19514DDD6}" presName="sibTrans" presStyleCnt="0"/>
+      <dgm:spPr/>
+    </dgm:pt>
+    <dgm:pt modelId="{72CEA82B-1A75-44C1-B8CD-638BADA50EA8}" type="pres">
+      <dgm:prSet presAssocID="{E8F1A2F6-B71C-4950-B94B-47EEE5D8D187}" presName="compNode" presStyleCnt="0"/>
+      <dgm:spPr/>
+    </dgm:pt>
+    <dgm:pt modelId="{59F41051-F2AF-482B-88AD-9374922D5350}" type="pres">
+      <dgm:prSet presAssocID="{E8F1A2F6-B71C-4950-B94B-47EEE5D8D187}" presName="iconRect" presStyleLbl="node1" presStyleIdx="4" presStyleCnt="5"/>
+      <dgm:spPr>
+        <a:blipFill>
+          <a:blip xmlns:r="http://schemas.openxmlformats.org/officeDocument/2006/relationships" r:embed="rId9">
+            <a:extLst>
+              <a:ext uri="{96DAC541-7B7A-43D3-8B79-37D633B846F1}">
+                <asvg:svgBlip xmlns:asvg="http://schemas.microsoft.com/office/drawing/2016/SVG/main" r:embed="rId10"/>
+              </a:ext>
+            </a:extLst>
+          </a:blip>
+          <a:srcRect/>
+          <a:stretch>
+            <a:fillRect/>
+          </a:stretch>
+        </a:blipFill>
+        <a:ln>
+          <a:noFill/>
+        </a:ln>
+      </dgm:spPr>
+      <dgm:extLst>
+        <a:ext uri="{E40237B7-FDA0-4F09-8148-C483321AD2D9}">
+          <dgm14:cNvPr xmlns:dgm14="http://schemas.microsoft.com/office/drawing/2010/diagram" id="0" name="" descr="Clipboard Partially Checked outline"/>
+        </a:ext>
+      </dgm:extLst>
+    </dgm:pt>
+    <dgm:pt modelId="{3F16BFD6-C755-4313-A13E-C2868AABB4C5}" type="pres">
+      <dgm:prSet presAssocID="{E8F1A2F6-B71C-4950-B94B-47EEE5D8D187}" presName="spaceRect" presStyleCnt="0"/>
+      <dgm:spPr/>
+    </dgm:pt>
+    <dgm:pt modelId="{C7EF37BD-D239-4780-BC02-ED102033B001}" type="pres">
+      <dgm:prSet presAssocID="{E8F1A2F6-B71C-4950-B94B-47EEE5D8D187}" presName="textRect" presStyleLbl="revTx" presStyleIdx="4" presStyleCnt="5">
+        <dgm:presLayoutVars>
+          <dgm:chMax val="1"/>
+          <dgm:chPref val="1"/>
+        </dgm:presLayoutVars>
+      </dgm:prSet>
+      <dgm:spPr/>
+    </dgm:pt>
+  </dgm:ptLst>
+  <dgm:cxnLst>
+    <dgm:cxn modelId="{476FDD02-D477-4DE2-A286-36FF34BDF9C3}" type="presOf" srcId="{23553C81-26F7-4E18-94BE-C9452D746B9B}" destId="{78815FF0-0AB9-4ED6-B92A-5932A1203B53}" srcOrd="0" destOrd="0" presId="urn:microsoft.com/office/officeart/2018/2/layout/IconLabelList"/>
+    <dgm:cxn modelId="{C0661B17-35EA-484A-B3AC-B2B011B73B45}" srcId="{21E1A1C2-9E95-43C6-84D3-5C353B2BA3A6}" destId="{1A552DB5-8A00-4471-940C-06DAEF5D7598}" srcOrd="3" destOrd="0" parTransId="{C4E06E00-488D-46C6-B719-B834F94B36C5}" sibTransId="{02A5A747-96DD-4BC0-94CB-F4F19514DDD6}"/>
+    <dgm:cxn modelId="{E58B0219-5435-4BCA-B378-2BCC7B6DD450}" type="presOf" srcId="{7020CCAD-93BA-4EF1-9AAE-39471372D13D}" destId="{E9CB981E-2F25-4C85-9911-B7AE7C9277A0}" srcOrd="0" destOrd="0" presId="urn:microsoft.com/office/officeart/2018/2/layout/IconLabelList"/>
+    <dgm:cxn modelId="{F96B9F23-50EF-453C-BD95-36920E34A390}" type="presOf" srcId="{21E1A1C2-9E95-43C6-84D3-5C353B2BA3A6}" destId="{A9312221-7DB9-4CD0-8999-86E663B10108}" srcOrd="0" destOrd="0" presId="urn:microsoft.com/office/officeart/2018/2/layout/IconLabelList"/>
+    <dgm:cxn modelId="{D4748127-03CE-4F30-8B4B-4C6A388C6DB0}" type="presOf" srcId="{1A552DB5-8A00-4471-940C-06DAEF5D7598}" destId="{16379CC7-27AC-4F67-B39E-72F49904C51C}" srcOrd="0" destOrd="0" presId="urn:microsoft.com/office/officeart/2018/2/layout/IconLabelList"/>
+    <dgm:cxn modelId="{B57AE466-A0A1-40EE-9061-E2706C172114}" srcId="{21E1A1C2-9E95-43C6-84D3-5C353B2BA3A6}" destId="{E8F1A2F6-B71C-4950-B94B-47EEE5D8D187}" srcOrd="4" destOrd="0" parTransId="{917EEC95-329A-4867-95C9-303CAFBE7BC3}" sibTransId="{FA944B4D-6B91-493E-93C4-4AFBA652ED21}"/>
+    <dgm:cxn modelId="{0B5A0169-D9C1-446E-82F7-E8D3D9228710}" srcId="{21E1A1C2-9E95-43C6-84D3-5C353B2BA3A6}" destId="{7020CCAD-93BA-4EF1-9AAE-39471372D13D}" srcOrd="1" destOrd="0" parTransId="{C334F9B7-F099-49ED-AA1D-FCA4505C4399}" sibTransId="{3CC89F7E-4D5D-4704-9E72-7E86AD25575A}"/>
+    <dgm:cxn modelId="{34B68C4C-1861-44B9-ACC5-9BB3E0949AD8}" type="presOf" srcId="{BC1647FA-FC16-4088-8781-5DF395C7980B}" destId="{9C4611F3-68EF-458D-8555-33E83AAC8194}" srcOrd="0" destOrd="0" presId="urn:microsoft.com/office/officeart/2018/2/layout/IconLabelList"/>
+    <dgm:cxn modelId="{1887557E-35FE-46FA-8BA0-FBA65FF74552}" srcId="{21E1A1C2-9E95-43C6-84D3-5C353B2BA3A6}" destId="{BC1647FA-FC16-4088-8781-5DF395C7980B}" srcOrd="0" destOrd="0" parTransId="{63EF1F10-D557-4F10-B999-06D3BD92DC15}" sibTransId="{95DFB8A9-A8F2-44C9-B0F5-C0F85B6E87DD}"/>
+    <dgm:cxn modelId="{55137CD3-536D-4C26-A0EF-3049BD3ED815}" type="presOf" srcId="{E8F1A2F6-B71C-4950-B94B-47EEE5D8D187}" destId="{C7EF37BD-D239-4780-BC02-ED102033B001}" srcOrd="0" destOrd="0" presId="urn:microsoft.com/office/officeart/2018/2/layout/IconLabelList"/>
+    <dgm:cxn modelId="{2251E6E0-6376-4D48-BBF6-71A74BEBCA98}" srcId="{21E1A1C2-9E95-43C6-84D3-5C353B2BA3A6}" destId="{23553C81-26F7-4E18-94BE-C9452D746B9B}" srcOrd="2" destOrd="0" parTransId="{0A4FE284-2861-478E-997B-01411C9D44D0}" sibTransId="{00553CB4-3FC3-41B8-887F-6E51B0C44C2B}"/>
+    <dgm:cxn modelId="{7A2D4CD5-05A4-4CE3-8F37-72BA31E17D7F}" type="presParOf" srcId="{A9312221-7DB9-4CD0-8999-86E663B10108}" destId="{510F5CE2-E379-43DE-95C9-404149258CDA}" srcOrd="0" destOrd="0" presId="urn:microsoft.com/office/officeart/2018/2/layout/IconLabelList"/>
+    <dgm:cxn modelId="{F7D6A916-D03F-425E-BD49-F6976CAE829B}" type="presParOf" srcId="{510F5CE2-E379-43DE-95C9-404149258CDA}" destId="{8D713087-BFBB-4240-AD58-8715C20A8E6E}" srcOrd="0" destOrd="0" presId="urn:microsoft.com/office/officeart/2018/2/layout/IconLabelList"/>
+    <dgm:cxn modelId="{B0514BB6-19E5-480A-8DD6-53FC9D0B3D39}" type="presParOf" srcId="{510F5CE2-E379-43DE-95C9-404149258CDA}" destId="{494BDD52-8303-451B-9097-16F1C72964B4}" srcOrd="1" destOrd="0" presId="urn:microsoft.com/office/officeart/2018/2/layout/IconLabelList"/>
+    <dgm:cxn modelId="{7D9A1B9B-F854-4BD9-93F4-307783AB248D}" type="presParOf" srcId="{510F5CE2-E379-43DE-95C9-404149258CDA}" destId="{9C4611F3-68EF-458D-8555-33E83AAC8194}" srcOrd="2" destOrd="0" presId="urn:microsoft.com/office/officeart/2018/2/layout/IconLabelList"/>
+    <dgm:cxn modelId="{AB793BBD-BF5D-44D9-8535-4AEAF3630294}" type="presParOf" srcId="{A9312221-7DB9-4CD0-8999-86E663B10108}" destId="{B3E2B716-7B40-4B3E-A71E-3A7A90FA6A23}" srcOrd="1" destOrd="0" presId="urn:microsoft.com/office/officeart/2018/2/layout/IconLabelList"/>
+    <dgm:cxn modelId="{599D6CFB-DAFF-4ABA-8924-CAB85DDB1691}" type="presParOf" srcId="{A9312221-7DB9-4CD0-8999-86E663B10108}" destId="{42CF95A7-44CD-4C95-A29F-05C16C2E4EAE}" srcOrd="2" destOrd="0" presId="urn:microsoft.com/office/officeart/2018/2/layout/IconLabelList"/>
+    <dgm:cxn modelId="{DF94D346-942A-4B00-8D2C-4B9C17CA815E}" type="presParOf" srcId="{42CF95A7-44CD-4C95-A29F-05C16C2E4EAE}" destId="{108E2A86-CF45-489F-9B09-9E0FEB793BEC}" srcOrd="0" destOrd="0" presId="urn:microsoft.com/office/officeart/2018/2/layout/IconLabelList"/>
+    <dgm:cxn modelId="{F3D0330E-749B-4F7E-B670-696192D452D1}" type="presParOf" srcId="{42CF95A7-44CD-4C95-A29F-05C16C2E4EAE}" destId="{FF1E9579-879E-4D83-A4FD-84B492C0B9BF}" srcOrd="1" destOrd="0" presId="urn:microsoft.com/office/officeart/2018/2/layout/IconLabelList"/>
+    <dgm:cxn modelId="{BFFBC9C0-98D4-4C30-8006-42998365D23C}" type="presParOf" srcId="{42CF95A7-44CD-4C95-A29F-05C16C2E4EAE}" destId="{E9CB981E-2F25-4C85-9911-B7AE7C9277A0}" srcOrd="2" destOrd="0" presId="urn:microsoft.com/office/officeart/2018/2/layout/IconLabelList"/>
+    <dgm:cxn modelId="{87357235-98A7-41A0-8395-BE379A2BD296}" type="presParOf" srcId="{A9312221-7DB9-4CD0-8999-86E663B10108}" destId="{AF9928D6-829D-42DB-B176-CAB43522F69D}" srcOrd="3" destOrd="0" presId="urn:microsoft.com/office/officeart/2018/2/layout/IconLabelList"/>
+    <dgm:cxn modelId="{848E1A85-3900-4976-A6D7-D7D4069B828A}" type="presParOf" srcId="{A9312221-7DB9-4CD0-8999-86E663B10108}" destId="{682DBB5D-F40C-4077-A49E-2BD88F251BDD}" srcOrd="4" destOrd="0" presId="urn:microsoft.com/office/officeart/2018/2/layout/IconLabelList"/>
+    <dgm:cxn modelId="{92388F56-286F-453F-B82A-A26B91C63FC4}" type="presParOf" srcId="{682DBB5D-F40C-4077-A49E-2BD88F251BDD}" destId="{8FB2C474-F8DE-4B18-AB47-D4D0D3899577}" srcOrd="0" destOrd="0" presId="urn:microsoft.com/office/officeart/2018/2/layout/IconLabelList"/>
+    <dgm:cxn modelId="{CFA4BC1D-50DA-4FD8-B904-6D049C55520E}" type="presParOf" srcId="{682DBB5D-F40C-4077-A49E-2BD88F251BDD}" destId="{1249EE5C-5FF0-4BB7-9927-25C775AF6221}" srcOrd="1" destOrd="0" presId="urn:microsoft.com/office/officeart/2018/2/layout/IconLabelList"/>
+    <dgm:cxn modelId="{CFEE2B86-01B7-4A53-87D3-6655E1969027}" type="presParOf" srcId="{682DBB5D-F40C-4077-A49E-2BD88F251BDD}" destId="{78815FF0-0AB9-4ED6-B92A-5932A1203B53}" srcOrd="2" destOrd="0" presId="urn:microsoft.com/office/officeart/2018/2/layout/IconLabelList"/>
+    <dgm:cxn modelId="{4E49DD25-301D-464D-AEDE-77FB8169F5E1}" type="presParOf" srcId="{A9312221-7DB9-4CD0-8999-86E663B10108}" destId="{C9B3B157-5B15-4D0F-911B-A79D041950E6}" srcOrd="5" destOrd="0" presId="urn:microsoft.com/office/officeart/2018/2/layout/IconLabelList"/>
+    <dgm:cxn modelId="{4D0E0987-5AC0-4E66-A093-28325F86DAC1}" type="presParOf" srcId="{A9312221-7DB9-4CD0-8999-86E663B10108}" destId="{7BE143BB-3375-45F3-B7A1-62B17E0AB4D9}" srcOrd="6" destOrd="0" presId="urn:microsoft.com/office/officeart/2018/2/layout/IconLabelList"/>
+    <dgm:cxn modelId="{D549DB57-8FE6-445B-B86F-DF86BB8E193E}" type="presParOf" srcId="{7BE143BB-3375-45F3-B7A1-62B17E0AB4D9}" destId="{95F47AF0-81E1-45AF-BDB2-4F805A16DE7D}" srcOrd="0" destOrd="0" presId="urn:microsoft.com/office/officeart/2018/2/layout/IconLabelList"/>
+    <dgm:cxn modelId="{6CECD674-F1F7-4D3F-B921-10DBE974FCB7}" type="presParOf" srcId="{7BE143BB-3375-45F3-B7A1-62B17E0AB4D9}" destId="{4D71A2C1-BE75-4AC4-8E5B-EBA30A11B042}" srcOrd="1" destOrd="0" presId="urn:microsoft.com/office/officeart/2018/2/layout/IconLabelList"/>
+    <dgm:cxn modelId="{5581292E-2894-4087-AFC6-047D7D7D91BC}" type="presParOf" srcId="{7BE143BB-3375-45F3-B7A1-62B17E0AB4D9}" destId="{16379CC7-27AC-4F67-B39E-72F49904C51C}" srcOrd="2" destOrd="0" presId="urn:microsoft.com/office/officeart/2018/2/layout/IconLabelList"/>
+    <dgm:cxn modelId="{9A3369F6-92CD-4EA1-B0CC-3C6002F19433}" type="presParOf" srcId="{A9312221-7DB9-4CD0-8999-86E663B10108}" destId="{3ED71837-91FC-4B69-A268-FE34F03C44AB}" srcOrd="7" destOrd="0" presId="urn:microsoft.com/office/officeart/2018/2/layout/IconLabelList"/>
+    <dgm:cxn modelId="{3DA63F15-586C-46C3-8CED-62464F943296}" type="presParOf" srcId="{A9312221-7DB9-4CD0-8999-86E663B10108}" destId="{72CEA82B-1A75-44C1-B8CD-638BADA50EA8}" srcOrd="8" destOrd="0" presId="urn:microsoft.com/office/officeart/2018/2/layout/IconLabelList"/>
+    <dgm:cxn modelId="{970B5785-B266-4A81-9B5E-C104F15B3CCE}" type="presParOf" srcId="{72CEA82B-1A75-44C1-B8CD-638BADA50EA8}" destId="{59F41051-F2AF-482B-88AD-9374922D5350}" srcOrd="0" destOrd="0" presId="urn:microsoft.com/office/officeart/2018/2/layout/IconLabelList"/>
+    <dgm:cxn modelId="{DDC56D1D-90B2-4D20-9377-327B01FED123}" type="presParOf" srcId="{72CEA82B-1A75-44C1-B8CD-638BADA50EA8}" destId="{3F16BFD6-C755-4313-A13E-C2868AABB4C5}" srcOrd="1" destOrd="0" presId="urn:microsoft.com/office/officeart/2018/2/layout/IconLabelList"/>
+    <dgm:cxn modelId="{9B929540-79EA-43AA-9EDC-86D84CFAAC4F}" type="presParOf" srcId="{72CEA82B-1A75-44C1-B8CD-638BADA50EA8}" destId="{C7EF37BD-D239-4780-BC02-ED102033B001}" srcOrd="2" destOrd="0" presId="urn:microsoft.com/office/officeart/2018/2/layout/IconLabelList"/>
+  </dgm:cxnLst>
+  <dgm:bg/>
+  <dgm:whole/>
+  <dgm:extLst>
+    <a:ext uri="http://schemas.microsoft.com/office/drawing/2008/diagram">
+      <dsp:dataModelExt xmlns:dsp="http://schemas.microsoft.com/office/drawing/2008/diagram" relId="rId7" minVer="http://schemas.openxmlformats.org/drawingml/2006/diagram"/>
+    </a:ext>
+  </dgm:extLst>
+</dgm:dataModel>
+</file>
+
+<file path=ppt/diagrams/drawing1.xml><?xml version="1.0" encoding="utf-8"?>
+<dsp:drawing xmlns:dgm="http://schemas.openxmlformats.org/drawingml/2006/diagram" xmlns:dsp="http://schemas.microsoft.com/office/drawing/2008/diagram" xmlns:a="http://schemas.openxmlformats.org/drawingml/2006/main">
+  <dsp:spTree>
+    <dsp:nvGrpSpPr>
+      <dsp:cNvPr id="0" name=""/>
+      <dsp:cNvGrpSpPr/>
+    </dsp:nvGrpSpPr>
+    <dsp:grpSpPr/>
+    <dsp:sp modelId="{8D713087-BFBB-4240-AD58-8715C20A8E6E}">
+      <dsp:nvSpPr>
+        <dsp:cNvPr id="0" name=""/>
+        <dsp:cNvSpPr/>
+      </dsp:nvSpPr>
+      <dsp:spPr>
+        <a:xfrm>
+          <a:off x="775199" y="864964"/>
+          <a:ext cx="810000" cy="810000"/>
+        </a:xfrm>
+        <a:prstGeom prst="rect">
+          <a:avLst/>
+        </a:prstGeom>
+        <a:blipFill>
+          <a:blip xmlns:r="http://schemas.openxmlformats.org/officeDocument/2006/relationships" r:embed="rId1">
+            <a:extLst>
+              <a:ext uri="{96DAC541-7B7A-43D3-8B79-37D633B846F1}">
+                <asvg:svgBlip xmlns:asvg="http://schemas.microsoft.com/office/drawing/2016/SVG/main" r:embed="rId2"/>
+              </a:ext>
+            </a:extLst>
+          </a:blip>
+          <a:srcRect/>
+          <a:stretch>
+            <a:fillRect/>
+          </a:stretch>
+        </a:blipFill>
+        <a:ln w="12700" cap="flat" cmpd="sng" algn="ctr">
+          <a:noFill/>
+          <a:prstDash val="solid"/>
+        </a:ln>
+        <a:effectLst/>
+      </dsp:spPr>
+      <dsp:style>
+        <a:lnRef idx="2">
+          <a:scrgbClr r="0" g="0" b="0"/>
+        </a:lnRef>
+        <a:fillRef idx="1">
+          <a:scrgbClr r="0" g="0" b="0"/>
+        </a:fillRef>
+        <a:effectRef idx="0">
+          <a:scrgbClr r="0" g="0" b="0"/>
+        </a:effectRef>
+        <a:fontRef idx="minor">
+          <a:schemeClr val="lt1"/>
+        </a:fontRef>
+      </dsp:style>
+    </dsp:sp>
+    <dsp:sp modelId="{9C4611F3-68EF-458D-8555-33E83AAC8194}">
+      <dsp:nvSpPr>
+        <dsp:cNvPr id="0" name=""/>
+        <dsp:cNvSpPr/>
+      </dsp:nvSpPr>
+      <dsp:spPr>
+        <a:xfrm>
+          <a:off x="280199" y="1945097"/>
+          <a:ext cx="1800000" cy="720000"/>
+        </a:xfrm>
+        <a:prstGeom prst="rect">
+          <a:avLst/>
+        </a:prstGeom>
+        <a:noFill/>
+        <a:ln>
+          <a:noFill/>
+        </a:ln>
+        <a:effectLst/>
+      </dsp:spPr>
+      <dsp:style>
+        <a:lnRef idx="0">
+          <a:scrgbClr r="0" g="0" b="0"/>
+        </a:lnRef>
+        <a:fillRef idx="0">
+          <a:scrgbClr r="0" g="0" b="0"/>
+        </a:fillRef>
+        <a:effectRef idx="0">
+          <a:scrgbClr r="0" g="0" b="0"/>
+        </a:effectRef>
+        <a:fontRef idx="minor"/>
+      </dsp:style>
+      <dsp:txBody>
+        <a:bodyPr spcFirstLastPara="0" vert="horz" wrap="square" lIns="0" tIns="0" rIns="0" bIns="0" numCol="1" spcCol="1270" anchor="t" anchorCtr="0">
+          <a:noAutofit/>
+        </a:bodyPr>
+        <a:lstStyle/>
+        <a:p>
+          <a:pPr marL="0" lvl="0" indent="0" algn="ctr" defTabSz="1066800">
+            <a:lnSpc>
+              <a:spcPct val="90000"/>
+            </a:lnSpc>
+            <a:spcBef>
+              <a:spcPct val="0"/>
+            </a:spcBef>
+            <a:spcAft>
+              <a:spcPct val="35000"/>
+            </a:spcAft>
+            <a:buNone/>
+          </a:pPr>
+          <a:endParaRPr lang="en-US" sz="2400" kern="1200" dirty="0"/>
+        </a:p>
+      </dsp:txBody>
+      <dsp:txXfrm>
+        <a:off x="280199" y="1945097"/>
+        <a:ext cx="1800000" cy="720000"/>
+      </dsp:txXfrm>
+    </dsp:sp>
+    <dsp:sp modelId="{108E2A86-CF45-489F-9B09-9E0FEB793BEC}">
+      <dsp:nvSpPr>
+        <dsp:cNvPr id="0" name=""/>
+        <dsp:cNvSpPr/>
+      </dsp:nvSpPr>
+      <dsp:spPr>
+        <a:xfrm>
+          <a:off x="2890200" y="864964"/>
+          <a:ext cx="810000" cy="810000"/>
+        </a:xfrm>
+        <a:prstGeom prst="rect">
+          <a:avLst/>
+        </a:prstGeom>
+        <a:blipFill>
+          <a:blip xmlns:r="http://schemas.openxmlformats.org/officeDocument/2006/relationships" r:embed="rId3">
+            <a:extLst>
+              <a:ext uri="{96DAC541-7B7A-43D3-8B79-37D633B846F1}">
+                <asvg:svgBlip xmlns:asvg="http://schemas.microsoft.com/office/drawing/2016/SVG/main" r:embed="rId4"/>
+              </a:ext>
+            </a:extLst>
+          </a:blip>
+          <a:srcRect/>
+          <a:stretch>
+            <a:fillRect/>
+          </a:stretch>
+        </a:blipFill>
+        <a:ln w="12700" cap="flat" cmpd="sng" algn="ctr">
+          <a:noFill/>
+          <a:prstDash val="solid"/>
+        </a:ln>
+        <a:effectLst/>
+      </dsp:spPr>
+      <dsp:style>
+        <a:lnRef idx="2">
+          <a:scrgbClr r="0" g="0" b="0"/>
+        </a:lnRef>
+        <a:fillRef idx="1">
+          <a:scrgbClr r="0" g="0" b="0"/>
+        </a:fillRef>
+        <a:effectRef idx="0">
+          <a:scrgbClr r="0" g="0" b="0"/>
+        </a:effectRef>
+        <a:fontRef idx="minor">
+          <a:schemeClr val="lt1"/>
+        </a:fontRef>
+      </dsp:style>
+    </dsp:sp>
+    <dsp:sp modelId="{E9CB981E-2F25-4C85-9911-B7AE7C9277A0}">
+      <dsp:nvSpPr>
+        <dsp:cNvPr id="0" name=""/>
+        <dsp:cNvSpPr/>
+      </dsp:nvSpPr>
+      <dsp:spPr>
+        <a:xfrm>
+          <a:off x="2395200" y="1945097"/>
+          <a:ext cx="1800000" cy="720000"/>
+        </a:xfrm>
+        <a:prstGeom prst="rect">
+          <a:avLst/>
+        </a:prstGeom>
+        <a:noFill/>
+        <a:ln>
+          <a:noFill/>
+        </a:ln>
+        <a:effectLst/>
+      </dsp:spPr>
+      <dsp:style>
+        <a:lnRef idx="0">
+          <a:scrgbClr r="0" g="0" b="0"/>
+        </a:lnRef>
+        <a:fillRef idx="0">
+          <a:scrgbClr r="0" g="0" b="0"/>
+        </a:fillRef>
+        <a:effectRef idx="0">
+          <a:scrgbClr r="0" g="0" b="0"/>
+        </a:effectRef>
+        <a:fontRef idx="minor"/>
+      </dsp:style>
+      <dsp:txBody>
+        <a:bodyPr spcFirstLastPara="0" vert="horz" wrap="square" lIns="0" tIns="0" rIns="0" bIns="0" numCol="1" spcCol="1270" anchor="t" anchorCtr="0">
+          <a:noAutofit/>
+        </a:bodyPr>
+        <a:lstStyle/>
+        <a:p>
+          <a:pPr marL="0" lvl="0" indent="0" algn="ctr" defTabSz="1066800">
+            <a:lnSpc>
+              <a:spcPct val="90000"/>
+            </a:lnSpc>
+            <a:spcBef>
+              <a:spcPct val="0"/>
+            </a:spcBef>
+            <a:spcAft>
+              <a:spcPct val="35000"/>
+            </a:spcAft>
+            <a:buNone/>
+          </a:pPr>
+          <a:endParaRPr lang="en-US" sz="2400" kern="1200" dirty="0"/>
+        </a:p>
+      </dsp:txBody>
+      <dsp:txXfrm>
+        <a:off x="2395200" y="1945097"/>
+        <a:ext cx="1800000" cy="720000"/>
+      </dsp:txXfrm>
+    </dsp:sp>
+    <dsp:sp modelId="{8FB2C474-F8DE-4B18-AB47-D4D0D3899577}">
+      <dsp:nvSpPr>
+        <dsp:cNvPr id="0" name=""/>
+        <dsp:cNvSpPr/>
+      </dsp:nvSpPr>
+      <dsp:spPr>
+        <a:xfrm>
+          <a:off x="5005200" y="864964"/>
+          <a:ext cx="810000" cy="810000"/>
+        </a:xfrm>
+        <a:prstGeom prst="rect">
+          <a:avLst/>
+        </a:prstGeom>
+        <a:blipFill>
+          <a:blip xmlns:r="http://schemas.openxmlformats.org/officeDocument/2006/relationships" r:embed="rId5">
+            <a:extLst>
+              <a:ext uri="{96DAC541-7B7A-43D3-8B79-37D633B846F1}">
+                <asvg:svgBlip xmlns:asvg="http://schemas.microsoft.com/office/drawing/2016/SVG/main" r:embed="rId6"/>
+              </a:ext>
+            </a:extLst>
+          </a:blip>
+          <a:srcRect/>
+          <a:stretch>
+            <a:fillRect/>
+          </a:stretch>
+        </a:blipFill>
+        <a:ln w="12700" cap="flat" cmpd="sng" algn="ctr">
+          <a:noFill/>
+          <a:prstDash val="solid"/>
+        </a:ln>
+        <a:effectLst/>
+      </dsp:spPr>
+      <dsp:style>
+        <a:lnRef idx="2">
+          <a:scrgbClr r="0" g="0" b="0"/>
+        </a:lnRef>
+        <a:fillRef idx="1">
+          <a:scrgbClr r="0" g="0" b="0"/>
+        </a:fillRef>
+        <a:effectRef idx="0">
+          <a:scrgbClr r="0" g="0" b="0"/>
+        </a:effectRef>
+        <a:fontRef idx="minor">
+          <a:schemeClr val="lt1"/>
+        </a:fontRef>
+      </dsp:style>
+    </dsp:sp>
+    <dsp:sp modelId="{78815FF0-0AB9-4ED6-B92A-5932A1203B53}">
+      <dsp:nvSpPr>
+        <dsp:cNvPr id="0" name=""/>
+        <dsp:cNvSpPr/>
+      </dsp:nvSpPr>
+      <dsp:spPr>
+        <a:xfrm>
+          <a:off x="4510200" y="1945097"/>
+          <a:ext cx="1800000" cy="720000"/>
+        </a:xfrm>
+        <a:prstGeom prst="rect">
+          <a:avLst/>
+        </a:prstGeom>
+        <a:noFill/>
+        <a:ln>
+          <a:noFill/>
+        </a:ln>
+        <a:effectLst/>
+      </dsp:spPr>
+      <dsp:style>
+        <a:lnRef idx="0">
+          <a:scrgbClr r="0" g="0" b="0"/>
+        </a:lnRef>
+        <a:fillRef idx="0">
+          <a:scrgbClr r="0" g="0" b="0"/>
+        </a:fillRef>
+        <a:effectRef idx="0">
+          <a:scrgbClr r="0" g="0" b="0"/>
+        </a:effectRef>
+        <a:fontRef idx="minor"/>
+      </dsp:style>
+      <dsp:txBody>
+        <a:bodyPr spcFirstLastPara="0" vert="horz" wrap="square" lIns="0" tIns="0" rIns="0" bIns="0" numCol="1" spcCol="1270" anchor="t" anchorCtr="0">
+          <a:noAutofit/>
+        </a:bodyPr>
+        <a:lstStyle/>
+        <a:p>
+          <a:pPr marL="0" lvl="0" indent="0" algn="ctr" defTabSz="1066800">
+            <a:lnSpc>
+              <a:spcPct val="90000"/>
+            </a:lnSpc>
+            <a:spcBef>
+              <a:spcPct val="0"/>
+            </a:spcBef>
+            <a:spcAft>
+              <a:spcPct val="35000"/>
+            </a:spcAft>
+            <a:buNone/>
+          </a:pPr>
+          <a:endParaRPr lang="en-US" sz="2400" kern="1200" dirty="0"/>
+        </a:p>
+      </dsp:txBody>
+      <dsp:txXfrm>
+        <a:off x="4510200" y="1945097"/>
+        <a:ext cx="1800000" cy="720000"/>
+      </dsp:txXfrm>
+    </dsp:sp>
+    <dsp:sp modelId="{95F47AF0-81E1-45AF-BDB2-4F805A16DE7D}">
+      <dsp:nvSpPr>
+        <dsp:cNvPr id="0" name=""/>
+        <dsp:cNvSpPr/>
+      </dsp:nvSpPr>
+      <dsp:spPr>
+        <a:xfrm>
+          <a:off x="7120200" y="864964"/>
+          <a:ext cx="810000" cy="810000"/>
+        </a:xfrm>
+        <a:prstGeom prst="rect">
+          <a:avLst/>
+        </a:prstGeom>
+        <a:blipFill>
+          <a:blip xmlns:r="http://schemas.openxmlformats.org/officeDocument/2006/relationships" r:embed="rId7">
+            <a:extLst>
+              <a:ext uri="{96DAC541-7B7A-43D3-8B79-37D633B846F1}">
+                <asvg:svgBlip xmlns:asvg="http://schemas.microsoft.com/office/drawing/2016/SVG/main" r:embed="rId8"/>
+              </a:ext>
+            </a:extLst>
+          </a:blip>
+          <a:srcRect/>
+          <a:stretch>
+            <a:fillRect/>
+          </a:stretch>
+        </a:blipFill>
+        <a:ln w="12700" cap="flat" cmpd="sng" algn="ctr">
+          <a:noFill/>
+          <a:prstDash val="solid"/>
+        </a:ln>
+        <a:effectLst/>
+      </dsp:spPr>
+      <dsp:style>
+        <a:lnRef idx="2">
+          <a:scrgbClr r="0" g="0" b="0"/>
+        </a:lnRef>
+        <a:fillRef idx="1">
+          <a:scrgbClr r="0" g="0" b="0"/>
+        </a:fillRef>
+        <a:effectRef idx="0">
+          <a:scrgbClr r="0" g="0" b="0"/>
+        </a:effectRef>
+        <a:fontRef idx="minor">
+          <a:schemeClr val="lt1"/>
+        </a:fontRef>
+      </dsp:style>
+    </dsp:sp>
+    <dsp:sp modelId="{16379CC7-27AC-4F67-B39E-72F49904C51C}">
+      <dsp:nvSpPr>
+        <dsp:cNvPr id="0" name=""/>
+        <dsp:cNvSpPr/>
+      </dsp:nvSpPr>
+      <dsp:spPr>
+        <a:xfrm>
+          <a:off x="6625200" y="1945097"/>
+          <a:ext cx="1800000" cy="720000"/>
+        </a:xfrm>
+        <a:prstGeom prst="rect">
+          <a:avLst/>
+        </a:prstGeom>
+        <a:noFill/>
+        <a:ln>
+          <a:noFill/>
+        </a:ln>
+        <a:effectLst/>
+      </dsp:spPr>
+      <dsp:style>
+        <a:lnRef idx="0">
+          <a:scrgbClr r="0" g="0" b="0"/>
+        </a:lnRef>
+        <a:fillRef idx="0">
+          <a:scrgbClr r="0" g="0" b="0"/>
+        </a:fillRef>
+        <a:effectRef idx="0">
+          <a:scrgbClr r="0" g="0" b="0"/>
+        </a:effectRef>
+        <a:fontRef idx="minor"/>
+      </dsp:style>
+      <dsp:txBody>
+        <a:bodyPr spcFirstLastPara="0" vert="horz" wrap="square" lIns="0" tIns="0" rIns="0" bIns="0" numCol="1" spcCol="1270" anchor="t" anchorCtr="0">
+          <a:noAutofit/>
+        </a:bodyPr>
+        <a:lstStyle/>
+        <a:p>
+          <a:pPr marL="0" lvl="0" indent="0" algn="ctr" defTabSz="1066800">
+            <a:lnSpc>
+              <a:spcPct val="90000"/>
+            </a:lnSpc>
+            <a:spcBef>
+              <a:spcPct val="0"/>
+            </a:spcBef>
+            <a:spcAft>
+              <a:spcPct val="35000"/>
+            </a:spcAft>
+            <a:buNone/>
+          </a:pPr>
+          <a:endParaRPr lang="en-US" sz="2400" kern="1200" dirty="0"/>
+        </a:p>
+      </dsp:txBody>
+      <dsp:txXfrm>
+        <a:off x="6625200" y="1945097"/>
+        <a:ext cx="1800000" cy="720000"/>
+      </dsp:txXfrm>
+    </dsp:sp>
+    <dsp:sp modelId="{59F41051-F2AF-482B-88AD-9374922D5350}">
+      <dsp:nvSpPr>
+        <dsp:cNvPr id="0" name=""/>
+        <dsp:cNvSpPr/>
+      </dsp:nvSpPr>
+      <dsp:spPr>
+        <a:xfrm>
+          <a:off x="9235199" y="864964"/>
+          <a:ext cx="810000" cy="810000"/>
+        </a:xfrm>
+        <a:prstGeom prst="rect">
+          <a:avLst/>
+        </a:prstGeom>
+        <a:blipFill>
+          <a:blip xmlns:r="http://schemas.openxmlformats.org/officeDocument/2006/relationships" r:embed="rId9">
+            <a:extLst>
+              <a:ext uri="{96DAC541-7B7A-43D3-8B79-37D633B846F1}">
+                <asvg:svgBlip xmlns:asvg="http://schemas.microsoft.com/office/drawing/2016/SVG/main" r:embed="rId10"/>
+              </a:ext>
+            </a:extLst>
+          </a:blip>
+          <a:srcRect/>
+          <a:stretch>
+            <a:fillRect/>
+          </a:stretch>
+        </a:blipFill>
+        <a:ln w="12700" cap="flat" cmpd="sng" algn="ctr">
+          <a:noFill/>
+          <a:prstDash val="solid"/>
+        </a:ln>
+        <a:effectLst/>
+      </dsp:spPr>
+      <dsp:style>
+        <a:lnRef idx="2">
+          <a:scrgbClr r="0" g="0" b="0"/>
+        </a:lnRef>
+        <a:fillRef idx="1">
+          <a:scrgbClr r="0" g="0" b="0"/>
+        </a:fillRef>
+        <a:effectRef idx="0">
+          <a:scrgbClr r="0" g="0" b="0"/>
+        </a:effectRef>
+        <a:fontRef idx="minor">
+          <a:schemeClr val="lt1"/>
+        </a:fontRef>
+      </dsp:style>
+    </dsp:sp>
+    <dsp:sp modelId="{C7EF37BD-D239-4780-BC02-ED102033B001}">
+      <dsp:nvSpPr>
+        <dsp:cNvPr id="0" name=""/>
+        <dsp:cNvSpPr/>
+      </dsp:nvSpPr>
+      <dsp:spPr>
+        <a:xfrm>
+          <a:off x="8740200" y="1945097"/>
+          <a:ext cx="1800000" cy="720000"/>
+        </a:xfrm>
+        <a:prstGeom prst="rect">
+          <a:avLst/>
+        </a:prstGeom>
+        <a:noFill/>
+        <a:ln>
+          <a:noFill/>
+        </a:ln>
+        <a:effectLst/>
+      </dsp:spPr>
+      <dsp:style>
+        <a:lnRef idx="0">
+          <a:scrgbClr r="0" g="0" b="0"/>
+        </a:lnRef>
+        <a:fillRef idx="0">
+          <a:scrgbClr r="0" g="0" b="0"/>
+        </a:fillRef>
+        <a:effectRef idx="0">
+          <a:scrgbClr r="0" g="0" b="0"/>
+        </a:effectRef>
+        <a:fontRef idx="minor"/>
+      </dsp:style>
+      <dsp:txBody>
+        <a:bodyPr spcFirstLastPara="0" vert="horz" wrap="square" lIns="0" tIns="0" rIns="0" bIns="0" numCol="1" spcCol="1270" anchor="t" anchorCtr="0">
+          <a:noAutofit/>
+        </a:bodyPr>
+        <a:lstStyle/>
+        <a:p>
+          <a:pPr marL="0" lvl="0" indent="0" algn="ctr" defTabSz="1066800">
+            <a:lnSpc>
+              <a:spcPct val="90000"/>
+            </a:lnSpc>
+            <a:spcBef>
+              <a:spcPct val="0"/>
+            </a:spcBef>
+            <a:buNone/>
+          </a:pPr>
+          <a:endParaRPr lang="en-US" sz="2400" kern="1200" dirty="0"/>
+        </a:p>
+      </dsp:txBody>
+      <dsp:txXfrm>
+        <a:off x="8740200" y="1945097"/>
+        <a:ext cx="1800000" cy="720000"/>
+      </dsp:txXfrm>
+    </dsp:sp>
+  </dsp:spTree>
+</dsp:drawing>
+</file>
+
+<file path=ppt/diagrams/layout1.xml><?xml version="1.0" encoding="utf-8"?>
+<dgm:layoutDef xmlns:dgm="http://schemas.openxmlformats.org/drawingml/2006/diagram" xmlns:a="http://schemas.openxmlformats.org/drawingml/2006/main" uniqueId="urn:microsoft.com/office/officeart/2018/2/layout/IconLabelList">
+  <dgm:title val="Icon Label List"/>
+  <dgm:desc val="Use to show non-sequential or grouped chunks of information accompanied by a related visuals. Works best with icons or small pictures with short text captions."/>
+  <dgm:catLst>
+    <dgm:cat type="icon" pri="500"/>
+  </dgm:catLst>
+  <dgm:sampData useDef="1">
+    <dgm:dataModel>
+      <dgm:ptLst/>
+      <dgm:bg/>
+      <dgm:whole/>
+    </dgm:dataModel>
+  </dgm:sampData>
+  <dgm:styleData useDef="1">
+    <dgm:dataModel>
+      <dgm:ptLst/>
+      <dgm:bg/>
+      <dgm:whole/>
+    </dgm:dataModel>
+  </dgm:styleData>
+  <dgm:clrData useDef="1">
+    <dgm:dataModel>
+      <dgm:ptLst/>
+      <dgm:bg/>
+      <dgm:whole/>
+    </dgm:dataModel>
+  </dgm:clrData>
+  <dgm:layoutNode name="root">
+    <dgm:varLst>
+      <dgm:dir/>
+      <dgm:resizeHandles val="exact"/>
+    </dgm:varLst>
+    <dgm:choose name="Name0">
+      <dgm:if name="Name1" axis="self" func="var" arg="dir" op="equ" val="norm">
+        <dgm:alg type="snake">
+          <dgm:param type="grDir" val="tL"/>
+          <dgm:param type="flowDir" val="row"/>
+          <dgm:param type="contDir" val="sameDir"/>
+          <dgm:param type="off" val="ctr"/>
+          <dgm:param type="vertAlign" val="mid"/>
+          <dgm:param type="horzAlign" val="ctr"/>
+        </dgm:alg>
+      </dgm:if>
+      <dgm:else name="Name2">
+        <dgm:alg type="snake">
+          <dgm:param type="grDir" val="tR"/>
+          <dgm:param type="flowDir" val="row"/>
+          <dgm:param type="contDir" val="sameDir"/>
+          <dgm:param type="off" val="ctr"/>
+          <dgm:param type="vertAlign" val="mid"/>
+          <dgm:param type="horzAlign" val="ctr"/>
+        </dgm:alg>
+      </dgm:else>
+    </dgm:choose>
+    <dgm:shape xmlns:r="http://schemas.openxmlformats.org/officeDocument/2006/relationships" r:blip="">
+      <dgm:adjLst/>
+    </dgm:shape>
+    <dgm:presOf/>
+    <dgm:choose name="Name3">
+      <dgm:if name="Name4" axis="ch" ptType="node" func="cnt" op="lte" val="2">
+        <dgm:constrLst>
+          <dgm:constr type="h" for="ch" forName="compNode" refType="h" fact="0.4"/>
+          <dgm:constr type="w" for="ch" forName="compNode" val="120"/>
+          <dgm:constr type="w" for="ch" forName="sibTrans" refType="w" refFor="ch" refForName="compNode" fact="0.175"/>
+          <dgm:constr type="sp" refType="w" refFor="ch" refForName="compNode" op="equ" fact="0.25"/>
+          <dgm:constr type="primFontSz" for="des" ptType="node" op="equ" val="50"/>
+          <dgm:constr type="h" for="des" forName="compNode" op="equ"/>
+          <dgm:constr type="h" for="des" forName="textRect" op="equ"/>
+        </dgm:constrLst>
+      </dgm:if>
+      <dgm:if name="Name5" axis="ch" ptType="node" func="cnt" op="lte" val="4">
+        <dgm:constrLst>
+          <dgm:constr type="h" for="ch" forName="compNode" refType="h" fact="0.4"/>
+          <dgm:constr type="w" for="ch" forName="compNode" refType="w"/>
+          <dgm:constr type="w" for="ch" forName="sibTrans" refType="w" refFor="ch" refForName="compNode" fact="0.175"/>
+          <dgm:constr type="sp" refType="w" refFor="ch" refForName="compNode" op="equ" fact="0.25"/>
+          <dgm:constr type="primFontSz" for="des" ptType="node" op="equ" val="36"/>
+          <dgm:constr type="h" for="des" forName="compNode" op="equ"/>
+          <dgm:constr type="h" for="des" forName="textRect" op="equ"/>
+        </dgm:constrLst>
+      </dgm:if>
+      <dgm:else name="Name6">
+        <dgm:constrLst>
+          <dgm:constr type="h" for="ch" forName="compNode" refType="h" fact="0.4"/>
+          <dgm:constr type="w" for="ch" forName="compNode" refType="w"/>
+          <dgm:constr type="w" for="ch" forName="sibTrans" refType="w" refFor="ch" refForName="compNode" fact="0.175"/>
+          <dgm:constr type="sp" refType="w" refFor="ch" refForName="compNode" op="equ" fact="0.25"/>
+          <dgm:constr type="primFontSz" for="des" ptType="node" op="equ" val="24"/>
+          <dgm:constr type="h" for="des" forName="compNode" op="equ"/>
+          <dgm:constr type="h" for="des" forName="textRect" op="equ"/>
+        </dgm:constrLst>
+      </dgm:else>
+    </dgm:choose>
+    <dgm:ruleLst>
+      <dgm:rule type="w" for="ch" forName="compNode" val="50" fact="NaN" max="NaN"/>
+    </dgm:ruleLst>
+    <dgm:forEach name="Name7" axis="ch" ptType="node">
+      <dgm:layoutNode name="compNode">
+        <dgm:alg type="composite"/>
+        <dgm:shape xmlns:r="http://schemas.openxmlformats.org/officeDocument/2006/relationships" r:blip="">
+          <dgm:adjLst/>
+        </dgm:shape>
+        <dgm:presOf axis="self"/>
+        <dgm:constrLst>
+          <dgm:constr type="w" for="ch" forName="iconRect" refType="w" fact="0.45"/>
+          <dgm:constr type="h" for="ch" forName="iconRect" refType="w" refFor="ch" refForName="iconRect"/>
+          <dgm:constr type="ctrX" for="ch" forName="iconRect" refType="w" fact="0.5"/>
+          <dgm:constr type="t" for="ch" forName="iconRect"/>
+          <dgm:constr type="h" for="ch" forName="spaceRect" refType="h" fact="0.15"/>
+          <dgm:constr type="w" for="ch" forName="spaceRect" refType="w"/>
+          <dgm:constr type="l" for="ch" forName="spaceRect"/>
+          <dgm:constr type="t" for="ch" forName="spaceRect" refType="b" refFor="ch" refForName="iconRect"/>
+          <dgm:constr type="h" for="ch" forName="textRect" val="20"/>
+          <dgm:constr type="w" for="ch" forName="textRect" refType="w"/>
+          <dgm:constr type="l" for="ch" forName="textRect"/>
+          <dgm:constr type="t" for="ch" forName="textRect" refType="b" refFor="ch" refForName="spaceRect"/>
+        </dgm:constrLst>
+        <dgm:ruleLst>
+          <dgm:rule type="h" val="INF" fact="NaN" max="NaN"/>
+        </dgm:ruleLst>
+        <dgm:layoutNode name="iconRect" styleLbl="node1">
+          <dgm:alg type="sp"/>
+          <dgm:shape xmlns:r="http://schemas.openxmlformats.org/officeDocument/2006/relationships" type="rect" r:blip="" blipPhldr="1">
+            <dgm:adjLst/>
+          </dgm:shape>
+          <dgm:presOf/>
+          <dgm:constrLst/>
+          <dgm:ruleLst/>
+        </dgm:layoutNode>
+        <dgm:layoutNode name="spaceRect">
+          <dgm:alg type="sp"/>
+          <dgm:shape xmlns:r="http://schemas.openxmlformats.org/officeDocument/2006/relationships" r:blip="">
+            <dgm:adjLst/>
+          </dgm:shape>
+          <dgm:presOf/>
+          <dgm:constrLst/>
+          <dgm:ruleLst/>
+        </dgm:layoutNode>
+        <dgm:layoutNode name="textRect" styleLbl="revTx">
+          <dgm:varLst>
+            <dgm:chMax val="1"/>
+            <dgm:chPref val="1"/>
+          </dgm:varLst>
+          <dgm:alg type="tx">
+            <dgm:param type="txAnchorVert" val="t"/>
+          </dgm:alg>
+          <dgm:shape xmlns:r="http://schemas.openxmlformats.org/officeDocument/2006/relationships" type="rect" r:blip="">
+            <dgm:adjLst/>
+          </dgm:shape>
+          <dgm:presOf axis="self" ptType="node"/>
+          <dgm:constrLst>
+            <dgm:constr type="lMarg"/>
+            <dgm:constr type="rMarg"/>
+            <dgm:constr type="tMarg"/>
+            <dgm:constr type="bMarg"/>
+          </dgm:constrLst>
+          <dgm:ruleLst>
+            <dgm:rule type="primFontSz" val="11" fact="NaN" max="NaN"/>
+            <dgm:rule type="h" val="INF" fact="NaN" max="NaN"/>
+          </dgm:ruleLst>
+        </dgm:layoutNode>
+      </dgm:layoutNode>
+      <dgm:forEach name="Name8" axis="followSib" ptType="sibTrans" cnt="1">
+        <dgm:layoutNode name="sibTrans">
+          <dgm:alg type="sp"/>
+          <dgm:shape xmlns:r="http://schemas.openxmlformats.org/officeDocument/2006/relationships" r:blip="">
+            <dgm:adjLst/>
+          </dgm:shape>
+          <dgm:presOf axis="self"/>
+          <dgm:constrLst/>
+          <dgm:ruleLst/>
+        </dgm:layoutNode>
+      </dgm:forEach>
+    </dgm:forEach>
+  </dgm:layoutNode>
+  <dgm:extLst>
+    <a:ext uri="{68A01E43-0DF5-4B5B-8FA6-DAF915123BFB}">
+      <dgm1612:lstStyle xmlns:dgm1612="http://schemas.microsoft.com/office/drawing/2016/12/diagram">
+        <a:lvl1pPr>
+          <a:lnSpc>
+            <a:spcPct val="100000"/>
+          </a:lnSpc>
+        </a:lvl1pPr>
+      </dgm1612:lstStyle>
+    </a:ext>
+  </dgm:extLst>
+</dgm:layoutDef>
+</file>
+
+<file path=ppt/diagrams/quickStyle1.xml><?xml version="1.0" encoding="utf-8"?>
+<dgm:styleDef xmlns:dgm="http://schemas.openxmlformats.org/drawingml/2006/diagram" xmlns:a="http://schemas.openxmlformats.org/drawingml/2006/main" uniqueId="urn:microsoft.com/office/officeart/2005/8/quickstyle/simple1">
+  <dgm:title val=""/>
+  <dgm:desc val=""/>
+  <dgm:catLst>
+    <dgm:cat type="simple" pri="10100"/>
+  </dgm:catLst>
+  <dgm:scene3d>
+    <a:camera prst="orthographicFront"/>
+    <a:lightRig rig="threePt" dir="t"/>
+  </dgm:scene3d>
+  <dgm:styleLbl name="node0">
+    <dgm:scene3d>
+      <a:camera prst="orthographicFront"/>
+      <a:lightRig rig="threePt" dir="t"/>
+    </dgm:scene3d>
+    <dgm:sp3d/>
+    <dgm:txPr/>
+    <dgm:style>
+      <a:lnRef idx="2">
+        <a:scrgbClr r="0" g="0" b="0"/>
+      </a:lnRef>
+      <a:fillRef idx="1">
+        <a:scrgbClr r="0" g="0" b="0"/>
+      </a:fillRef>
+      <a:effectRef idx="0">
+        <a:scrgbClr r="0" g="0" b="0"/>
+      </a:effectRef>
+      <a:fontRef idx="minor">
+        <a:schemeClr val="lt1"/>
+      </a:fontRef>
+    </dgm:style>
+  </dgm:styleLbl>
+  <dgm:styleLbl name="lnNode1">
+    <dgm:scene3d>
+      <a:camera prst="orthographicFront"/>
+      <a:lightRig rig="threePt" dir="t"/>
+    </dgm:scene3d>
+    <dgm:sp3d/>
+    <dgm:txPr/>
+    <dgm:style>
+      <a:lnRef idx="2">
+        <a:scrgbClr r="0" g="0" b="0"/>
+      </a:lnRef>
+      <a:fillRef idx="1">
+        <a:scrgbClr r="0" g="0" b="0"/>
+      </a:fillRef>
+      <a:effectRef idx="0">
+        <a:scrgbClr r="0" g="0" b="0"/>
+      </a:effectRef>
+      <a:fontRef idx="minor">
+        <a:schemeClr val="lt1"/>
+      </a:fontRef>
+    </dgm:style>
+  </dgm:styleLbl>
+  <dgm:styleLbl name="vennNode1">
+    <dgm:scene3d>
+      <a:camera prst="orthographicFront"/>
+      <a:lightRig rig="threePt" dir="t"/>
+    </dgm:scene3d>
+    <dgm:sp3d/>
+    <dgm:txPr/>
+    <dgm:style>
+      <a:lnRef idx="2">
+        <a:scrgbClr r="0" g="0" b="0"/>
+      </a:lnRef>
+      <a:fillRef idx="1">
+        <a:scrgbClr r="0" g="0" b="0"/>
+      </a:fillRef>
+      <a:effectRef idx="0">
+        <a:scrgbClr r="0" g="0" b="0"/>
+      </a:effectRef>
+      <a:fontRef idx="minor">
+        <a:schemeClr val="tx1"/>
+      </a:fontRef>
+    </dgm:style>
+  </dgm:styleLbl>
+  <dgm:styleLbl name="alignNode1">
+    <dgm:scene3d>
+      <a:camera prst="orthographicFront"/>
+      <a:lightRig rig="threePt" dir="t"/>
+    </dgm:scene3d>
+    <dgm:sp3d/>
+    <dgm:txPr/>
+    <dgm:style>
+      <a:lnRef idx="2">
+        <a:scrgbClr r="0" g="0" b="0"/>
+      </a:lnRef>
+      <a:fillRef idx="1">
+        <a:scrgbClr r="0" g="0" b="0"/>
+      </a:fillRef>
+      <a:effectRef idx="0">
+        <a:scrgbClr r="0" g="0" b="0"/>
+      </a:effectRef>
+      <a:fontRef idx="minor">
+        <a:schemeClr val="lt1"/>
+      </a:fontRef>
+    </dgm:style>
+  </dgm:styleLbl>
+  <dgm:styleLbl name="node1">
+    <dgm:scene3d>
+      <a:camera prst="orthographicFront"/>
+      <a:lightRig rig="threePt" dir="t"/>
+    </dgm:scene3d>
+    <dgm:sp3d/>
+    <dgm:txPr/>
+    <dgm:style>
+      <a:lnRef idx="2">
+        <a:scrgbClr r="0" g="0" b="0"/>
+      </a:lnRef>
+      <a:fillRef idx="1">
+        <a:scrgbClr r="0" g="0" b="0"/>
+      </a:fillRef>
+      <a:effectRef idx="0">
+        <a:scrgbClr r="0" g="0" b="0"/>
+      </a:effectRef>
+      <a:fontRef idx="minor">
+        <a:schemeClr val="lt1"/>
+      </a:fontRef>
+    </dgm:style>
+  </dgm:styleLbl>
+  <dgm:styleLbl name="node2">
+    <dgm:scene3d>
+      <a:camera prst="orthographicFront"/>
+      <a:lightRig rig="threePt" dir="t"/>
+    </dgm:scene3d>
+    <dgm:sp3d/>
+    <dgm:txPr/>
+    <dgm:style>
+      <a:lnRef idx="2">
+        <a:scrgbClr r="0" g="0" b="0"/>
+      </a:lnRef>
+      <a:fillRef idx="1">
+        <a:scrgbClr r="0" g="0" b="0"/>
+      </a:fillRef>
+      <a:effectRef idx="0">
+        <a:scrgbClr r="0" g="0" b="0"/>
+      </a:effectRef>
+      <a:fontRef idx="minor">
+        <a:schemeClr val="lt1"/>
+      </a:fontRef>
+    </dgm:style>
+  </dgm:styleLbl>
+  <dgm:styleLbl name="node3">
+    <dgm:scene3d>
+      <a:camera prst="orthographicFront"/>
+      <a:lightRig rig="threePt" dir="t"/>
+    </dgm:scene3d>
+    <dgm:sp3d/>
+    <dgm:txPr/>
+    <dgm:style>
+      <a:lnRef idx="2">
+        <a:scrgbClr r="0" g="0" b="0"/>
+      </a:lnRef>
+      <a:fillRef idx="1">
+        <a:scrgbClr r="0" g="0" b="0"/>
+      </a:fillRef>
+      <a:effectRef idx="0">
+        <a:scrgbClr r="0" g="0" b="0"/>
+      </a:effectRef>
+      <a:fontRef idx="minor">
+        <a:schemeClr val="lt1"/>
+      </a:fontRef>
+    </dgm:style>
+  </dgm:styleLbl>
+  <dgm:styleLbl name="node4">
+    <dgm:scene3d>
+      <a:camera prst="orthographicFront"/>
+      <a:lightRig rig="threePt" dir="t"/>
+    </dgm:scene3d>
+    <dgm:sp3d/>
+    <dgm:txPr/>
+    <dgm:style>
+      <a:lnRef idx="2">
+        <a:scrgbClr r="0" g="0" b="0"/>
+      </a:lnRef>
+      <a:fillRef idx="1">
+        <a:scrgbClr r="0" g="0" b="0"/>
+      </a:fillRef>
+      <a:effectRef idx="0">
+        <a:scrgbClr r="0" g="0" b="0"/>
+      </a:effectRef>
+      <a:fontRef idx="minor">
+        <a:schemeClr val="lt1"/>
+      </a:fontRef>
+    </dgm:style>
+  </dgm:styleLbl>
+  <dgm:styleLbl name="fgImgPlace1">
+    <dgm:scene3d>
+      <a:camera prst="orthographicFront"/>
+      <a:lightRig rig="threePt" dir="t"/>
+    </dgm:scene3d>
+    <dgm:sp3d/>
+    <dgm:txPr/>
+    <dgm:style>
+      <a:lnRef idx="2">
+        <a:scrgbClr r="0" g="0" b="0"/>
+      </a:lnRef>
+      <a:fillRef idx="1">
+        <a:scrgbClr r="0" g="0" b="0"/>
+      </a:fillRef>
+      <a:effectRef idx="0">
+        <a:scrgbClr r="0" g="0" b="0"/>
+      </a:effectRef>
+      <a:fontRef idx="minor"/>
+    </dgm:style>
+  </dgm:styleLbl>
+  <dgm:styleLbl name="alignImgPlace1">
+    <dgm:scene3d>
+      <a:camera prst="orthographicFront"/>
+      <a:lightRig rig="threePt" dir="t"/>
+    </dgm:scene3d>
+    <dgm:sp3d/>
+    <dgm:txPr/>
+    <dgm:style>
+      <a:lnRef idx="2">
+        <a:scrgbClr r="0" g="0" b="0"/>
+      </a:lnRef>
+      <a:fillRef idx="1">
+        <a:scrgbClr r="0" g="0" b="0"/>
+      </a:fillRef>
+      <a:effectRef idx="0">
+        <a:scrgbClr r="0" g="0" b="0"/>
+      </a:effectRef>
+      <a:fontRef idx="minor"/>
+    </dgm:style>
+  </dgm:styleLbl>
+  <dgm:styleLbl name="bgImgPlace1">
+    <dgm:scene3d>
+      <a:camera prst="orthographicFront"/>
+      <a:lightRig rig="threePt" dir="t"/>
+    </dgm:scene3d>
+    <dgm:sp3d/>
+    <dgm:txPr/>
+    <dgm:style>
+      <a:lnRef idx="2">
+        <a:scrgbClr r="0" g="0" b="0"/>
+      </a:lnRef>
+      <a:fillRef idx="1">
+        <a:scrgbClr r="0" g="0" b="0"/>
+      </a:fillRef>
+      <a:effectRef idx="0">
+        <a:scrgbClr r="0" g="0" b="0"/>
+      </a:effectRef>
+      <a:fontRef idx="minor"/>
+    </dgm:style>
+  </dgm:styleLbl>
+  <dgm:styleLbl name="sibTrans2D1">
+    <dgm:scene3d>
+      <a:camera prst="orthographicFront"/>
+      <a:lightRig rig="threePt" dir="t"/>
+    </dgm:scene3d>
+    <dgm:sp3d/>
+    <dgm:txPr/>
+    <dgm:style>
+      <a:lnRef idx="0">
+        <a:scrgbClr r="0" g="0" b="0"/>
+      </a:lnRef>
+      <a:fillRef idx="1">
+        <a:scrgbClr r="0" g="0" b="0"/>
+      </a:fillRef>
+      <a:effectRef idx="0">
+        <a:scrgbClr r="0" g="0" b="0"/>
+      </a:effectRef>
+      <a:fontRef idx="minor">
+        <a:schemeClr val="lt1"/>
+      </a:fontRef>
+    </dgm:style>
+  </dgm:styleLbl>
+  <dgm:styleLbl name="fgSibTrans2D1">
+    <dgm:scene3d>
+      <a:camera prst="orthographicFront"/>
+      <a:lightRig rig="threePt" dir="t"/>
+    </dgm:scene3d>
+    <dgm:sp3d/>
+    <dgm:txPr/>
+    <dgm:style>
+      <a:lnRef idx="0">
+        <a:scrgbClr r="0" g="0" b="0"/>
+      </a:lnRef>
+      <a:fillRef idx="1">
+        <a:scrgbClr r="0" g="0" b="0"/>
+      </a:fillRef>
+      <a:effectRef idx="0">
+        <a:scrgbClr r="0" g="0" b="0"/>
+      </a:effectRef>
+      <a:fontRef idx="minor">
+        <a:schemeClr val="lt1"/>
+      </a:fontRef>
+    </dgm:style>
+  </dgm:styleLbl>
+  <dgm:styleLbl name="bgSibTrans2D1">
+    <dgm:scene3d>
+      <a:camera prst="orthographicFront"/>
+      <a:lightRig rig="threePt" dir="t"/>
+    </dgm:scene3d>
+    <dgm:sp3d/>
+    <dgm:txPr/>
+    <dgm:style>
+      <a:lnRef idx="0">
+        <a:scrgbClr r="0" g="0" b="0"/>
+      </a:lnRef>
+      <a:fillRef idx="1">
+        <a:scrgbClr r="0" g="0" b="0"/>
+      </a:fillRef>
+      <a:effectRef idx="0">
+        <a:scrgbClr r="0" g="0" b="0"/>
+      </a:effectRef>
+      <a:fontRef idx="minor">
+        <a:schemeClr val="lt1"/>
+      </a:fontRef>
+    </dgm:style>
+  </dgm:styleLbl>
+  <dgm:styleLbl name="sibTrans1D1">
+    <dgm:scene3d>
+      <a:camera prst="orthographicFront"/>
+      <a:lightRig rig="threePt" dir="t"/>
+    </dgm:scene3d>
+    <dgm:sp3d/>
+    <dgm:txPr/>
+    <dgm:style>
+      <a:lnRef idx="1">
+        <a:scrgbClr r="0" g="0" b="0"/>
+      </a:lnRef>
+      <a:fillRef idx="0">
+        <a:scrgbClr r="0" g="0" b="0"/>
+      </a:fillRef>
+      <a:effectRef idx="0">
+        <a:scrgbClr r="0" g="0" b="0"/>
+      </a:effectRef>
+      <a:fontRef idx="minor"/>
+    </dgm:style>
+  </dgm:styleLbl>
+  <dgm:styleLbl name="callout">
+    <dgm:scene3d>
+      <a:camera prst="orthographicFront"/>
+      <a:lightRig rig="threePt" dir="t"/>
+    </dgm:scene3d>
+    <dgm:sp3d/>
+    <dgm:txPr/>
+    <dgm:style>
+      <a:lnRef idx="2">
+        <a:scrgbClr r="0" g="0" b="0"/>
+      </a:lnRef>
+      <a:fillRef idx="1">
+        <a:scrgbClr r="0" g="0" b="0"/>
+      </a:fillRef>
+      <a:effectRef idx="0">
+        <a:scrgbClr r="0" g="0" b="0"/>
+      </a:effectRef>
+      <a:fontRef idx="minor"/>
+    </dgm:style>
+  </dgm:styleLbl>
+  <dgm:styleLbl name="asst0">
+    <dgm:scene3d>
+      <a:camera prst="orthographicFront"/>
+      <a:lightRig rig="threePt" dir="t"/>
+    </dgm:scene3d>
+    <dgm:sp3d/>
+    <dgm:txPr/>
+    <dgm:style>
+      <a:lnRef idx="2">
+        <a:scrgbClr r="0" g="0" b="0"/>
+      </a:lnRef>
+      <a:fillRef idx="1">
+        <a:scrgbClr r="0" g="0" b="0"/>
+      </a:fillRef>
+      <a:effectRef idx="0">
+        <a:scrgbClr r="0" g="0" b="0"/>
+      </a:effectRef>
+      <a:fontRef idx="minor">
+        <a:schemeClr val="lt1"/>
+      </a:fontRef>
+    </dgm:style>
+  </dgm:styleLbl>
+  <dgm:styleLbl name="asst1">
+    <dgm:scene3d>
+      <a:camera prst="orthographicFront"/>
+      <a:lightRig rig="threePt" dir="t"/>
+    </dgm:scene3d>
+    <dgm:sp3d/>
+    <dgm:txPr/>
+    <dgm:style>
+      <a:lnRef idx="2">
+        <a:scrgbClr r="0" g="0" b="0"/>
+      </a:lnRef>
+      <a:fillRef idx="1">
+        <a:scrgbClr r="0" g="0" b="0"/>
+      </a:fillRef>
+      <a:effectRef idx="0">
+        <a:scrgbClr r="0" g="0" b="0"/>
+      </a:effectRef>
+      <a:fontRef idx="minor">
+        <a:schemeClr val="lt1"/>
+      </a:fontRef>
+    </dgm:style>
+  </dgm:styleLbl>
+  <dgm:styleLbl name="asst2">
+    <dgm:scene3d>
+      <a:camera prst="orthographicFront"/>
+      <a:lightRig rig="threePt" dir="t"/>
+    </dgm:scene3d>
+    <dgm:sp3d/>
+    <dgm:txPr/>
+    <dgm:style>
+      <a:lnRef idx="2">
+        <a:scrgbClr r="0" g="0" b="0"/>
+      </a:lnRef>
+      <a:fillRef idx="1">
+        <a:scrgbClr r="0" g="0" b="0"/>
+      </a:fillRef>
+      <a:effectRef idx="0">
+        <a:scrgbClr r="0" g="0" b="0"/>
+      </a:effectRef>
+      <a:fontRef idx="minor">
+        <a:schemeClr val="lt1"/>
+      </a:fontRef>
+    </dgm:style>
+  </dgm:styleLbl>
+  <dgm:styleLbl name="asst3">
+    <dgm:scene3d>
+      <a:camera prst="orthographicFront"/>
+      <a:lightRig rig="threePt" dir="t"/>
+    </dgm:scene3d>
+    <dgm:sp3d/>
+    <dgm:txPr/>
+    <dgm:style>
+      <a:lnRef idx="2">
+        <a:scrgbClr r="0" g="0" b="0"/>
+      </a:lnRef>
+      <a:fillRef idx="1">
+        <a:scrgbClr r="0" g="0" b="0"/>
+      </a:fillRef>
+      <a:effectRef idx="0">
+        <a:scrgbClr r="0" g="0" b="0"/>
+      </a:effectRef>
+      <a:fontRef idx="minor">
+        <a:schemeClr val="lt1"/>
+      </a:fontRef>
+    </dgm:style>
+  </dgm:styleLbl>
+  <dgm:styleLbl name="asst4">
+    <dgm:scene3d>
+      <a:camera prst="orthographicFront"/>
+      <a:lightRig rig="threePt" dir="t"/>
+    </dgm:scene3d>
+    <dgm:sp3d/>
+    <dgm:txPr/>
+    <dgm:style>
+      <a:lnRef idx="2">
+        <a:scrgbClr r="0" g="0" b="0"/>
+      </a:lnRef>
+      <a:fillRef idx="1">
+        <a:scrgbClr r="0" g="0" b="0"/>
+      </a:fillRef>
+      <a:effectRef idx="0">
+        <a:scrgbClr r="0" g="0" b="0"/>
+      </a:effectRef>
+      <a:fontRef idx="minor">
+        <a:schemeClr val="lt1"/>
+      </a:fontRef>
+    </dgm:style>
+  </dgm:styleLbl>
+  <dgm:styleLbl name="parChTrans2D1">
+    <dgm:scene3d>
+      <a:camera prst="orthographicFront"/>
+      <a:lightRig rig="threePt" dir="t"/>
+    </dgm:scene3d>
+    <dgm:sp3d/>
+    <dgm:txPr/>
+    <dgm:style>
+      <a:lnRef idx="2">
+        <a:scrgbClr r="0" g="0" b="0"/>
+      </a:lnRef>
+      <a:fillRef idx="1">
+        <a:scrgbClr r="0" g="0" b="0"/>
+      </a:fillRef>
+      <a:effectRef idx="0">
+        <a:scrgbClr r="0" g="0" b="0"/>
+      </a:effectRef>
+      <a:fontRef idx="minor">
+        <a:schemeClr val="lt1"/>
+      </a:fontRef>
+    </dgm:style>
+  </dgm:styleLbl>
+  <dgm:styleLbl name="parChTrans2D2">
+    <dgm:scene3d>
+      <a:camera prst="orthographicFront"/>
+      <a:lightRig rig="threePt" dir="t"/>
+    </dgm:scene3d>
+    <dgm:sp3d/>
+    <dgm:txPr/>
+    <dgm:style>
+      <a:lnRef idx="2">
+        <a:scrgbClr r="0" g="0" b="0"/>
+      </a:lnRef>
+      <a:fillRef idx="1">
+        <a:scrgbClr r="0" g="0" b="0"/>
+      </a:fillRef>
+      <a:effectRef idx="0">
+        <a:scrgbClr r="0" g="0" b="0"/>
+      </a:effectRef>
+      <a:fontRef idx="minor">
+        <a:schemeClr val="lt1"/>
+      </a:fontRef>
+    </dgm:style>
+  </dgm:styleLbl>
+  <dgm:styleLbl name="parChTrans2D3">
+    <dgm:scene3d>
+      <a:camera prst="orthographicFront"/>
+      <a:lightRig rig="threePt" dir="t"/>
+    </dgm:scene3d>
+    <dgm:sp3d/>
+    <dgm:txPr/>
+    <dgm:style>
+      <a:lnRef idx="2">
+        <a:scrgbClr r="0" g="0" b="0"/>
+      </a:lnRef>
+      <a:fillRef idx="1">
+        <a:scrgbClr r="0" g="0" b="0"/>
+      </a:fillRef>
+      <a:effectRef idx="0">
+        <a:scrgbClr r="0" g="0" b="0"/>
+      </a:effectRef>
+      <a:fontRef idx="minor">
+        <a:schemeClr val="lt1"/>
+      </a:fontRef>
+    </dgm:style>
+  </dgm:styleLbl>
+  <dgm:styleLbl name="parChTrans2D4">
+    <dgm:scene3d>
+      <a:camera prst="orthographicFront"/>
+      <a:lightRig rig="threePt" dir="t"/>
+    </dgm:scene3d>
+    <dgm:sp3d/>
+    <dgm:txPr/>
+    <dgm:style>
+      <a:lnRef idx="2">
+        <a:scrgbClr r="0" g="0" b="0"/>
+      </a:lnRef>
+      <a:fillRef idx="1">
+        <a:scrgbClr r="0" g="0" b="0"/>
+      </a:fillRef>
+      <a:effectRef idx="0">
+        <a:scrgbClr r="0" g="0" b="0"/>
+      </a:effectRef>
+      <a:fontRef idx="minor">
+        <a:schemeClr val="lt1"/>
+      </a:fontRef>
+    </dgm:style>
+  </dgm:styleLbl>
+  <dgm:styleLbl name="parChTrans1D1">
+    <dgm:scene3d>
+      <a:camera prst="orthographicFront"/>
+      <a:lightRig rig="threePt" dir="t"/>
+    </dgm:scene3d>
+    <dgm:sp3d/>
+    <dgm:txPr/>
+    <dgm:style>
+      <a:lnRef idx="2">
+        <a:scrgbClr r="0" g="0" b="0"/>
+      </a:lnRef>
+      <a:fillRef idx="0">
+        <a:scrgbClr r="0" g="0" b="0"/>
+      </a:fillRef>
+      <a:effectRef idx="0">
+        <a:scrgbClr r="0" g="0" b="0"/>
+      </a:effectRef>
+      <a:fontRef idx="minor"/>
+    </dgm:style>
+  </dgm:styleLbl>
+  <dgm:styleLbl name="parChTrans1D2">
+    <dgm:scene3d>
+      <a:camera prst="orthographicFront"/>
+      <a:lightRig rig="threePt" dir="t"/>
+    </dgm:scene3d>
+    <dgm:sp3d/>
+    <dgm:txPr/>
+    <dgm:style>
+      <a:lnRef idx="2">
+        <a:scrgbClr r="0" g="0" b="0"/>
+      </a:lnRef>
+      <a:fillRef idx="0">
+        <a:scrgbClr r="0" g="0" b="0"/>
+      </a:fillRef>
+      <a:effectRef idx="0">
+        <a:scrgbClr r="0" g="0" b="0"/>
+      </a:effectRef>
+      <a:fontRef idx="minor"/>
+    </dgm:style>
+  </dgm:styleLbl>
+  <dgm:styleLbl name="parChTrans1D3">
+    <dgm:scene3d>
+      <a:camera prst="orthographicFront"/>
+      <a:lightRig rig="threePt" dir="t"/>
+    </dgm:scene3d>
+    <dgm:sp3d/>
+    <dgm:txPr/>
+    <dgm:style>
+      <a:lnRef idx="2">
+        <a:scrgbClr r="0" g="0" b="0"/>
+      </a:lnRef>
+      <a:fillRef idx="0">
+        <a:scrgbClr r="0" g="0" b="0"/>
+      </a:fillRef>
+      <a:effectRef idx="0">
+        <a:scrgbClr r="0" g="0" b="0"/>
+      </a:effectRef>
+      <a:fontRef idx="minor"/>
+    </dgm:style>
+  </dgm:styleLbl>
+  <dgm:styleLbl name="parChTrans1D4">
+    <dgm:scene3d>
+      <a:camera prst="orthographicFront"/>
+      <a:lightRig rig="threePt" dir="t"/>
+    </dgm:scene3d>
+    <dgm:sp3d/>
+    <dgm:txPr/>
+    <dgm:style>
+      <a:lnRef idx="2">
+        <a:scrgbClr r="0" g="0" b="0"/>
+      </a:lnRef>
+      <a:fillRef idx="0">
+        <a:scrgbClr r="0" g="0" b="0"/>
+      </a:fillRef>
+      <a:effectRef idx="0">
+        <a:scrgbClr r="0" g="0" b="0"/>
+      </a:effectRef>
+      <a:fontRef idx="minor"/>
+    </dgm:style>
+  </dgm:styleLbl>
+  <dgm:styleLbl name="fgAcc1">
+    <dgm:scene3d>
+      <a:camera prst="orthographicFront"/>
+      <a:lightRig rig="threePt" dir="t"/>
+    </dgm:scene3d>
+    <dgm:sp3d/>
+    <dgm:txPr/>
+    <dgm:style>
+      <a:lnRef idx="2">
+        <a:scrgbClr r="0" g="0" b="0"/>
+      </a:lnRef>
+      <a:fillRef idx="1">
+        <a:scrgbClr r="0" g="0" b="0"/>
+      </a:fillRef>
+      <a:effectRef idx="0">
+        <a:scrgbClr r="0" g="0" b="0"/>
+      </a:effectRef>
+      <a:fontRef idx="minor"/>
+    </dgm:style>
+  </dgm:styleLbl>
+  <dgm:styleLbl name="conFgAcc1">
+    <dgm:scene3d>
+      <a:camera prst="orthographicFront"/>
+      <a:lightRig rig="threePt" dir="t"/>
+    </dgm:scene3d>
+    <dgm:sp3d/>
+    <dgm:txPr/>
+    <dgm:style>
+      <a:lnRef idx="2">
+        <a:scrgbClr r="0" g="0" b="0"/>
+      </a:lnRef>
+      <a:fillRef idx="1">
+        <a:scrgbClr r="0" g="0" b="0"/>
+      </a:fillRef>
+      <a:effectRef idx="0">
+        <a:scrgbClr r="0" g="0" b="0"/>
+      </a:effectRef>
+      <a:fontRef idx="minor"/>
+    </dgm:style>
+  </dgm:styleLbl>
+  <dgm:styleLbl name="alignAcc1">
+    <dgm:scene3d>
+      <a:camera prst="orthographicFront"/>
+      <a:lightRig rig="threePt" dir="t"/>
+    </dgm:scene3d>
+    <dgm:sp3d/>
+    <dgm:txPr/>
+    <dgm:style>
+      <a:lnRef idx="2">
+        <a:scrgbClr r="0" g="0" b="0"/>
+      </a:lnRef>
+      <a:fillRef idx="1">
+        <a:scrgbClr r="0" g="0" b="0"/>
+      </a:fillRef>
+      <a:effectRef idx="0">
+        <a:scrgbClr r="0" g="0" b="0"/>
+      </a:effectRef>
+      <a:fontRef idx="minor"/>
+    </dgm:style>
+  </dgm:styleLbl>
+  <dgm:styleLbl name="trAlignAcc1">
+    <dgm:scene3d>
+      <a:camera prst="orthographicFront"/>
+      <a:lightRig rig="threePt" dir="t"/>
+    </dgm:scene3d>
+    <dgm:sp3d/>
+    <dgm:txPr/>
+    <dgm:style>
+      <a:lnRef idx="1">
+        <a:scrgbClr r="0" g="0" b="0"/>
+      </a:lnRef>
+      <a:fillRef idx="1">
+        <a:scrgbClr r="0" g="0" b="0"/>
+      </a:fillRef>
+      <a:effectRef idx="0">
+        <a:scrgbClr r="0" g="0" b="0"/>
+      </a:effectRef>
+      <a:fontRef idx="minor"/>
+    </dgm:style>
+  </dgm:styleLbl>
+  <dgm:styleLbl name="bgAcc1">
+    <dgm:scene3d>
+      <a:camera prst="orthographicFront"/>
+      <a:lightRig rig="threePt" dir="t"/>
+    </dgm:scene3d>
+    <dgm:sp3d/>
+    <dgm:txPr/>
+    <dgm:style>
+      <a:lnRef idx="2">
+        <a:scrgbClr r="0" g="0" b="0"/>
+      </a:lnRef>
+      <a:fillRef idx="1">
+        <a:scrgbClr r="0" g="0" b="0"/>
+      </a:fillRef>
+      <a:effectRef idx="0">
+        <a:scrgbClr r="0" g="0" b="0"/>
+      </a:effectRef>
+      <a:fontRef idx="minor"/>
+    </dgm:style>
+  </dgm:styleLbl>
+  <dgm:styleLbl name="solidFgAcc1">
+    <dgm:scene3d>
+      <a:camera prst="orthographicFront"/>
+      <a:lightRig rig="threePt" dir="t"/>
+    </dgm:scene3d>
+    <dgm:sp3d/>
+    <dgm:txPr/>
+    <dgm:style>
+      <a:lnRef idx="2">
+        <a:scrgbClr r="0" g="0" b="0"/>
+      </a:lnRef>
+      <a:fillRef idx="1">
+        <a:scrgbClr r="0" g="0" b="0"/>
+      </a:fillRef>
+      <a:effectRef idx="0">
+        <a:scrgbClr r="0" g="0" b="0"/>
+      </a:effectRef>
+      <a:fontRef idx="minor"/>
+    </dgm:style>
+  </dgm:styleLbl>
+  <dgm:styleLbl name="solidAlignAcc1">
+    <dgm:scene3d>
+      <a:camera prst="orthographicFront"/>
+      <a:lightRig rig="threePt" dir="t"/>
+    </dgm:scene3d>
+    <dgm:sp3d/>
+    <dgm:txPr/>
+    <dgm:style>
+      <a:lnRef idx="2">
+        <a:scrgbClr r="0" g="0" b="0"/>
+      </a:lnRef>
+      <a:fillRef idx="1">
+        <a:scrgbClr r="0" g="0" b="0"/>
+      </a:fillRef>
+      <a:effectRef idx="0">
+        <a:scrgbClr r="0" g="0" b="0"/>
+      </a:effectRef>
+      <a:fontRef idx="minor"/>
+    </dgm:style>
+  </dgm:styleLbl>
+  <dgm:styleLbl name="solidBgAcc1">
+    <dgm:scene3d>
+      <a:camera prst="orthographicFront"/>
+      <a:lightRig rig="threePt" dir="t"/>
+    </dgm:scene3d>
+    <dgm:sp3d/>
+    <dgm:txPr/>
+    <dgm:style>
+      <a:lnRef idx="2">
+        <a:scrgbClr r="0" g="0" b="0"/>
+      </a:lnRef>
+      <a:fillRef idx="1">
+        <a:scrgbClr r="0" g="0" b="0"/>
+      </a:fillRef>
+      <a:effectRef idx="0">
+        <a:scrgbClr r="0" g="0" b="0"/>
+      </a:effectRef>
+      <a:fontRef idx="minor"/>
+    </dgm:style>
+  </dgm:styleLbl>
+  <dgm:styleLbl name="fgAccFollowNode1">
+    <dgm:scene3d>
+      <a:camera prst="orthographicFront"/>
+      <a:lightRig rig="threePt" dir="t"/>
+    </dgm:scene3d>
+    <dgm:sp3d/>
+    <dgm:txPr/>
+    <dgm:style>
+      <a:lnRef idx="2">
+        <a:scrgbClr r="0" g="0" b="0"/>
+      </a:lnRef>
+      <a:fillRef idx="1">
+        <a:scrgbClr r="0" g="0" b="0"/>
+      </a:fillRef>
+      <a:effectRef idx="0">
+        <a:scrgbClr r="0" g="0" b="0"/>
+      </a:effectRef>
+      <a:fontRef idx="minor"/>
+    </dgm:style>
+  </dgm:styleLbl>
+  <dgm:styleLbl name="alignAccFollowNode1">
+    <dgm:scene3d>
+      <a:camera prst="orthographicFront"/>
+      <a:lightRig rig="threePt" dir="t"/>
+    </dgm:scene3d>
+    <dgm:sp3d/>
+    <dgm:txPr/>
+    <dgm:style>
+      <a:lnRef idx="2">
+        <a:scrgbClr r="0" g="0" b="0"/>
+      </a:lnRef>
+      <a:fillRef idx="1">
+        <a:scrgbClr r="0" g="0" b="0"/>
+      </a:fillRef>
+      <a:effectRef idx="0">
+        <a:scrgbClr r="0" g="0" b="0"/>
+      </a:effectRef>
+      <a:fontRef idx="minor"/>
+    </dgm:style>
+  </dgm:styleLbl>
+  <dgm:styleLbl name="bgAccFollowNode1">
+    <dgm:scene3d>
+      <a:camera prst="orthographicFront"/>
+      <a:lightRig rig="threePt" dir="t"/>
+    </dgm:scene3d>
+    <dgm:sp3d/>
+    <dgm:txPr/>
+    <dgm:style>
+      <a:lnRef idx="2">
+        <a:scrgbClr r="0" g="0" b="0"/>
+      </a:lnRef>
+      <a:fillRef idx="1">
+        <a:scrgbClr r="0" g="0" b="0"/>
+      </a:fillRef>
+      <a:effectRef idx="0">
+        <a:scrgbClr r="0" g="0" b="0"/>
+      </a:effectRef>
+      <a:fontRef idx="minor"/>
+    </dgm:style>
+  </dgm:styleLbl>
+  <dgm:styleLbl name="fgAcc0">
+    <dgm:scene3d>
+      <a:camera prst="orthographicFront"/>
+      <a:lightRig rig="threePt" dir="t"/>
+    </dgm:scene3d>
+    <dgm:sp3d/>
+    <dgm:txPr/>
+    <dgm:style>
+      <a:lnRef idx="2">
+        <a:scrgbClr r="0" g="0" b="0"/>
+      </a:lnRef>
+      <a:fillRef idx="1">
+        <a:scrgbClr r="0" g="0" b="0"/>
+      </a:fillRef>
+      <a:effectRef idx="0">
+        <a:scrgbClr r="0" g="0" b="0"/>
+      </a:effectRef>
+      <a:fontRef idx="minor"/>
+    </dgm:style>
+  </dgm:styleLbl>
+  <dgm:styleLbl name="fgAcc2">
+    <dgm:scene3d>
+      <a:camera prst="orthographicFront"/>
+      <a:lightRig rig="threePt" dir="t"/>
+    </dgm:scene3d>
+    <dgm:sp3d/>
+    <dgm:txPr/>
+    <dgm:style>
+      <a:lnRef idx="2">
+        <a:scrgbClr r="0" g="0" b="0"/>
+      </a:lnRef>
+      <a:fillRef idx="1">
+        <a:scrgbClr r="0" g="0" b="0"/>
+      </a:fillRef>
+      <a:effectRef idx="0">
+        <a:scrgbClr r="0" g="0" b="0"/>
+      </a:effectRef>
+      <a:fontRef idx="minor"/>
+    </dgm:style>
+  </dgm:styleLbl>
+  <dgm:styleLbl name="fgAcc3">
+    <dgm:scene3d>
+      <a:camera prst="orthographicFront"/>
+      <a:lightRig rig="threePt" dir="t"/>
+    </dgm:scene3d>
+    <dgm:sp3d/>
+    <dgm:txPr/>
+    <dgm:style>
+      <a:lnRef idx="2">
+        <a:scrgbClr r="0" g="0" b="0"/>
+      </a:lnRef>
+      <a:fillRef idx="1">
+        <a:scrgbClr r="0" g="0" b="0"/>
+      </a:fillRef>
+      <a:effectRef idx="0">
+        <a:scrgbClr r="0" g="0" b="0"/>
+      </a:effectRef>
+      <a:fontRef idx="minor"/>
+    </dgm:style>
+  </dgm:styleLbl>
+  <dgm:styleLbl name="fgAcc4">
+    <dgm:scene3d>
+      <a:camera prst="orthographicFront"/>
+      <a:lightRig rig="threePt" dir="t"/>
+    </dgm:scene3d>
+    <dgm:sp3d/>
+    <dgm:txPr/>
+    <dgm:style>
+      <a:lnRef idx="2">
+        <a:scrgbClr r="0" g="0" b="0"/>
+      </a:lnRef>
+      <a:fillRef idx="1">
+        <a:scrgbClr r="0" g="0" b="0"/>
+      </a:fillRef>
+      <a:effectRef idx="0">
+        <a:scrgbClr r="0" g="0" b="0"/>
+      </a:effectRef>
+      <a:fontRef idx="minor"/>
+    </dgm:style>
+  </dgm:styleLbl>
+  <dgm:styleLbl name="bgShp">
+    <dgm:scene3d>
+      <a:camera prst="orthographicFront"/>
+      <a:lightRig rig="threePt" dir="t"/>
+    </dgm:scene3d>
+    <dgm:sp3d/>
+    <dgm:txPr/>
+    <dgm:style>
+      <a:lnRef idx="0">
+        <a:scrgbClr r="0" g="0" b="0"/>
+      </a:lnRef>
+      <a:fillRef idx="1">
+        <a:scrgbClr r="0" g="0" b="0"/>
+      </a:fillRef>
+      <a:effectRef idx="0">
+        <a:scrgbClr r="0" g="0" b="0"/>
+      </a:effectRef>
+      <a:fontRef idx="minor"/>
+    </dgm:style>
+  </dgm:styleLbl>
+  <dgm:styleLbl name="dkBgShp">
+    <dgm:scene3d>
+      <a:camera prst="orthographicFront"/>
+      <a:lightRig rig="threePt" dir="t"/>
+    </dgm:scene3d>
+    <dgm:sp3d/>
+    <dgm:txPr/>
+    <dgm:style>
+      <a:lnRef idx="0">
+        <a:scrgbClr r="0" g="0" b="0"/>
+      </a:lnRef>
+      <a:fillRef idx="1">
+        <a:scrgbClr r="0" g="0" b="0"/>
+      </a:fillRef>
+      <a:effectRef idx="0">
+        <a:scrgbClr r="0" g="0" b="0"/>
+      </a:effectRef>
+      <a:fontRef idx="minor"/>
+    </dgm:style>
+  </dgm:styleLbl>
+  <dgm:styleLbl name="trBgShp">
+    <dgm:scene3d>
+      <a:camera prst="orthographicFront"/>
+      <a:lightRig rig="threePt" dir="t"/>
+    </dgm:scene3d>
+    <dgm:sp3d/>
+    <dgm:txPr/>
+    <dgm:style>
+      <a:lnRef idx="0">
+        <a:scrgbClr r="0" g="0" b="0"/>
+      </a:lnRef>
+      <a:fillRef idx="1">
+        <a:scrgbClr r="0" g="0" b="0"/>
+      </a:fillRef>
+      <a:effectRef idx="0">
+        <a:scrgbClr r="0" g="0" b="0"/>
+      </a:effectRef>
+      <a:fontRef idx="minor"/>
+    </dgm:style>
+  </dgm:styleLbl>
+  <dgm:styleLbl name="fgShp">
+    <dgm:scene3d>
+      <a:camera prst="orthographicFront"/>
+      <a:lightRig rig="threePt" dir="t"/>
+    </dgm:scene3d>
+    <dgm:sp3d/>
+    <dgm:txPr/>
+    <dgm:style>
+      <a:lnRef idx="2">
+        <a:scrgbClr r="0" g="0" b="0"/>
+      </a:lnRef>
+      <a:fillRef idx="1">
+        <a:scrgbClr r="0" g="0" b="0"/>
+      </a:fillRef>
+      <a:effectRef idx="0">
+        <a:scrgbClr r="0" g="0" b="0"/>
+      </a:effectRef>
+      <a:fontRef idx="minor"/>
+    </dgm:style>
+  </dgm:styleLbl>
+  <dgm:styleLbl name="revTx">
+    <dgm:scene3d>
+      <a:camera prst="orthographicFront"/>
+      <a:lightRig rig="threePt" dir="t"/>
+    </dgm:scene3d>
+    <dgm:sp3d/>
+    <dgm:txPr/>
+    <dgm:style>
+      <a:lnRef idx="0">
+        <a:scrgbClr r="0" g="0" b="0"/>
+      </a:lnRef>
+      <a:fillRef idx="0">
+        <a:scrgbClr r="0" g="0" b="0"/>
+      </a:fillRef>
+      <a:effectRef idx="0">
+        <a:scrgbClr r="0" g="0" b="0"/>
+      </a:effectRef>
+      <a:fontRef idx="minor"/>
+    </dgm:style>
+  </dgm:styleLbl>
+</dgm:styleDef>
+</file>
+
 <file path=ppt/notesMasters/notesMaster1.xml><?xml version="1.0" encoding="utf-8"?>
 <p:notesMaster xmlns:a="http://schemas.openxmlformats.org/drawingml/2006/main" xmlns:r="http://schemas.openxmlformats.org/officeDocument/2006/relationships" xmlns:p="http://schemas.openxmlformats.org/presentationml/2006/main">
   <p:cSld>
@@ -1218,7 +4188,7 @@
           <a:p>
             <a:fld id="{F524CC67-45C1-49D0-8AEB-2EF995C1B354}" type="datetimeFigureOut">
               <a:rPr lang="en-GB" smtClean="0"/>
-              <a:t>01/05/2025</a:t>
+              <a:t>02/05/2025</a:t>
             </a:fld>
             <a:endParaRPr lang="en-GB"/>
           </a:p>
@@ -1486,6 +4456,114 @@
 </p:notesMaster>
 </file>
 
+<file path=ppt/notesSlides/notesSlide1.xml><?xml version="1.0" encoding="utf-8"?>
+<p:notes xmlns:a="http://schemas.openxmlformats.org/drawingml/2006/main" xmlns:r="http://schemas.openxmlformats.org/officeDocument/2006/relationships" xmlns:p="http://schemas.openxmlformats.org/presentationml/2006/main">
+  <p:cSld>
+    <p:spTree>
+      <p:nvGrpSpPr>
+        <p:cNvPr id="1" name="">
+          <a:extLst>
+            <a:ext uri="{FF2B5EF4-FFF2-40B4-BE49-F238E27FC236}">
+              <a16:creationId xmlns:a16="http://schemas.microsoft.com/office/drawing/2014/main" id="{EE319B69-70C4-1E25-E41D-415486E7774A}"/>
+            </a:ext>
+          </a:extLst>
+        </p:cNvPr>
+        <p:cNvGrpSpPr/>
+        <p:nvPr/>
+      </p:nvGrpSpPr>
+      <p:grpSpPr>
+        <a:xfrm>
+          <a:off x="0" y="0"/>
+          <a:ext cx="0" cy="0"/>
+          <a:chOff x="0" y="0"/>
+          <a:chExt cx="0" cy="0"/>
+        </a:xfrm>
+      </p:grpSpPr>
+      <p:sp>
+        <p:nvSpPr>
+          <p:cNvPr id="2" name="Slide Image Placeholder 1">
+            <a:extLst>
+              <a:ext uri="{FF2B5EF4-FFF2-40B4-BE49-F238E27FC236}">
+                <a16:creationId xmlns:a16="http://schemas.microsoft.com/office/drawing/2014/main" id="{97E1B84D-1DE1-A21A-23DF-A5345955D2D4}"/>
+              </a:ext>
+            </a:extLst>
+          </p:cNvPr>
+          <p:cNvSpPr>
+            <a:spLocks noGrp="1" noRot="1" noChangeAspect="1"/>
+          </p:cNvSpPr>
+          <p:nvPr>
+            <p:ph type="sldImg"/>
+          </p:nvPr>
+        </p:nvSpPr>
+        <p:spPr/>
+      </p:sp>
+      <p:sp>
+        <p:nvSpPr>
+          <p:cNvPr id="3" name="Notes Placeholder 2">
+            <a:extLst>
+              <a:ext uri="{FF2B5EF4-FFF2-40B4-BE49-F238E27FC236}">
+                <a16:creationId xmlns:a16="http://schemas.microsoft.com/office/drawing/2014/main" id="{AC379202-8B85-4723-2571-3C2272831630}"/>
+              </a:ext>
+            </a:extLst>
+          </p:cNvPr>
+          <p:cNvSpPr>
+            <a:spLocks noGrp="1"/>
+          </p:cNvSpPr>
+          <p:nvPr>
+            <p:ph type="body" idx="1"/>
+          </p:nvPr>
+        </p:nvSpPr>
+        <p:spPr/>
+        <p:txBody>
+          <a:bodyPr/>
+          <a:lstStyle/>
+          <a:p>
+            <a:endParaRPr lang="en-GB" dirty="0"/>
+          </a:p>
+        </p:txBody>
+      </p:sp>
+      <p:sp>
+        <p:nvSpPr>
+          <p:cNvPr id="4" name="Slide Number Placeholder 3">
+            <a:extLst>
+              <a:ext uri="{FF2B5EF4-FFF2-40B4-BE49-F238E27FC236}">
+                <a16:creationId xmlns:a16="http://schemas.microsoft.com/office/drawing/2014/main" id="{DFDBAAAA-4D49-417E-BBE4-E3232BFC1557}"/>
+              </a:ext>
+            </a:extLst>
+          </p:cNvPr>
+          <p:cNvSpPr>
+            <a:spLocks noGrp="1"/>
+          </p:cNvSpPr>
+          <p:nvPr>
+            <p:ph type="sldNum" sz="quarter" idx="5"/>
+          </p:nvPr>
+        </p:nvSpPr>
+        <p:spPr/>
+        <p:txBody>
+          <a:bodyPr/>
+          <a:lstStyle/>
+          <a:p>
+            <a:fld id="{11EE68FA-4CE9-4E49-9680-76DC0DFBA015}" type="slidenum">
+              <a:rPr lang="en-GB" smtClean="0"/>
+              <a:t>9</a:t>
+            </a:fld>
+            <a:endParaRPr lang="en-GB"/>
+          </a:p>
+        </p:txBody>
+      </p:sp>
+    </p:spTree>
+    <p:extLst>
+      <p:ext uri="{BB962C8B-B14F-4D97-AF65-F5344CB8AC3E}">
+        <p14:creationId xmlns:p14="http://schemas.microsoft.com/office/powerpoint/2010/main" val="1152838636"/>
+      </p:ext>
+    </p:extLst>
+  </p:cSld>
+  <p:clrMapOvr>
+    <a:masterClrMapping/>
+  </p:clrMapOvr>
+</p:notes>
+</file>
+
 <file path=ppt/slideLayouts/slideLayout1.xml><?xml version="1.0" encoding="utf-8"?>
 <p:sldLayout xmlns:a="http://schemas.openxmlformats.org/drawingml/2006/main" xmlns:r="http://schemas.openxmlformats.org/officeDocument/2006/relationships" xmlns:p="http://schemas.openxmlformats.org/presentationml/2006/main" type="title" preserve="1">
   <p:cSld name="Title Slide">
@@ -1656,7 +4734,7 @@
           <a:p>
             <a:fld id="{E796DD2E-7FCA-4C1F-A0C3-02DE4E493BB2}" type="datetimeFigureOut">
               <a:rPr lang="en-GB" smtClean="0"/>
-              <a:t>01/05/2025</a:t>
+              <a:t>02/05/2025</a:t>
             </a:fld>
             <a:endParaRPr lang="en-GB" dirty="0"/>
           </a:p>
@@ -1922,7 +5000,7 @@
           <a:p>
             <a:fld id="{E796DD2E-7FCA-4C1F-A0C3-02DE4E493BB2}" type="datetimeFigureOut">
               <a:rPr lang="en-GB" smtClean="0"/>
-              <a:t>01/05/2025</a:t>
+              <a:t>02/05/2025</a:t>
             </a:fld>
             <a:endParaRPr lang="en-GB" dirty="0"/>
           </a:p>
@@ -2178,7 +5256,7 @@
           <a:p>
             <a:fld id="{E796DD2E-7FCA-4C1F-A0C3-02DE4E493BB2}" type="datetimeFigureOut">
               <a:rPr lang="en-GB" smtClean="0"/>
-              <a:t>01/05/2025</a:t>
+              <a:t>02/05/2025</a:t>
             </a:fld>
             <a:endParaRPr lang="en-GB" dirty="0"/>
           </a:p>
@@ -2409,7 +5487,7 @@
           <a:p>
             <a:fld id="{E796DD2E-7FCA-4C1F-A0C3-02DE4E493BB2}" type="datetimeFigureOut">
               <a:rPr lang="en-GB" smtClean="0"/>
-              <a:t>01/05/2025</a:t>
+              <a:t>02/05/2025</a:t>
             </a:fld>
             <a:endParaRPr lang="en-GB" dirty="0"/>
           </a:p>
@@ -2719,7 +5797,7 @@
           <a:p>
             <a:fld id="{E796DD2E-7FCA-4C1F-A0C3-02DE4E493BB2}" type="datetimeFigureOut">
               <a:rPr lang="en-GB" smtClean="0"/>
-              <a:t>01/05/2025</a:t>
+              <a:t>02/05/2025</a:t>
             </a:fld>
             <a:endParaRPr lang="en-GB" dirty="0"/>
           </a:p>
@@ -3192,7 +6270,7 @@
           <a:p>
             <a:fld id="{E796DD2E-7FCA-4C1F-A0C3-02DE4E493BB2}" type="datetimeFigureOut">
               <a:rPr lang="en-GB" smtClean="0"/>
-              <a:t>01/05/2025</a:t>
+              <a:t>02/05/2025</a:t>
             </a:fld>
             <a:endParaRPr lang="en-GB" dirty="0"/>
           </a:p>
@@ -3739,7 +6817,7 @@
           <a:p>
             <a:fld id="{E796DD2E-7FCA-4C1F-A0C3-02DE4E493BB2}" type="datetimeFigureOut">
               <a:rPr lang="en-GB" smtClean="0"/>
-              <a:t>01/05/2025</a:t>
+              <a:t>02/05/2025</a:t>
             </a:fld>
             <a:endParaRPr lang="en-GB" dirty="0"/>
           </a:p>
@@ -4510,7 +7588,7 @@
           <a:p>
             <a:fld id="{E796DD2E-7FCA-4C1F-A0C3-02DE4E493BB2}" type="datetimeFigureOut">
               <a:rPr lang="en-GB" smtClean="0"/>
-              <a:t>01/05/2025</a:t>
+              <a:t>02/05/2025</a:t>
             </a:fld>
             <a:endParaRPr lang="en-GB" dirty="0"/>
           </a:p>
@@ -4685,7 +7763,7 @@
           <a:p>
             <a:fld id="{E796DD2E-7FCA-4C1F-A0C3-02DE4E493BB2}" type="datetimeFigureOut">
               <a:rPr lang="en-GB" smtClean="0"/>
-              <a:t>01/05/2025</a:t>
+              <a:t>02/05/2025</a:t>
             </a:fld>
             <a:endParaRPr lang="en-GB" dirty="0"/>
           </a:p>
@@ -4908,7 +7986,7 @@
           <a:p>
             <a:fld id="{E796DD2E-7FCA-4C1F-A0C3-02DE4E493BB2}" type="datetimeFigureOut">
               <a:rPr lang="en-GB" smtClean="0"/>
-              <a:t>01/05/2025</a:t>
+              <a:t>02/05/2025</a:t>
             </a:fld>
             <a:endParaRPr lang="en-GB" dirty="0"/>
           </a:p>
@@ -5088,7 +8166,7 @@
           <a:p>
             <a:fld id="{E796DD2E-7FCA-4C1F-A0C3-02DE4E493BB2}" type="datetimeFigureOut">
               <a:rPr lang="en-GB" smtClean="0"/>
-              <a:t>01/05/2025</a:t>
+              <a:t>02/05/2025</a:t>
             </a:fld>
             <a:endParaRPr lang="en-GB" dirty="0"/>
           </a:p>
@@ -5218,7 +8296,7 @@
           <a:p>
             <a:fld id="{E796DD2E-7FCA-4C1F-A0C3-02DE4E493BB2}" type="datetimeFigureOut">
               <a:rPr lang="en-GB" smtClean="0"/>
-              <a:t>01/05/2025</a:t>
+              <a:t>02/05/2025</a:t>
             </a:fld>
             <a:endParaRPr lang="en-GB" dirty="0"/>
           </a:p>
@@ -5519,7 +8597,7 @@
           <a:p>
             <a:fld id="{E796DD2E-7FCA-4C1F-A0C3-02DE4E493BB2}" type="datetimeFigureOut">
               <a:rPr lang="en-GB" smtClean="0"/>
-              <a:t>01/05/2025</a:t>
+              <a:t>02/05/2025</a:t>
             </a:fld>
             <a:endParaRPr lang="en-GB" dirty="0"/>
           </a:p>
@@ -5761,7 +8839,7 @@
           <a:p>
             <a:fld id="{E796DD2E-7FCA-4C1F-A0C3-02DE4E493BB2}" type="datetimeFigureOut">
               <a:rPr lang="en-GB" smtClean="0"/>
-              <a:t>01/05/2025</a:t>
+              <a:t>02/05/2025</a:t>
             </a:fld>
             <a:endParaRPr lang="en-GB" dirty="0"/>
           </a:p>
@@ -6140,7 +9218,7 @@
           <a:p>
             <a:fld id="{E796DD2E-7FCA-4C1F-A0C3-02DE4E493BB2}" type="datetimeFigureOut">
               <a:rPr lang="en-GB" smtClean="0"/>
-              <a:t>01/05/2025</a:t>
+              <a:t>02/05/2025</a:t>
             </a:fld>
             <a:endParaRPr lang="en-GB" dirty="0"/>
           </a:p>
@@ -6258,7 +9336,7 @@
           <a:p>
             <a:fld id="{E796DD2E-7FCA-4C1F-A0C3-02DE4E493BB2}" type="datetimeFigureOut">
               <a:rPr lang="en-GB" smtClean="0"/>
-              <a:t>01/05/2025</a:t>
+              <a:t>02/05/2025</a:t>
             </a:fld>
             <a:endParaRPr lang="en-GB" dirty="0"/>
           </a:p>
@@ -6353,7 +9431,7 @@
           <a:p>
             <a:fld id="{E796DD2E-7FCA-4C1F-A0C3-02DE4E493BB2}" type="datetimeFigureOut">
               <a:rPr lang="en-GB" smtClean="0"/>
-              <a:t>01/05/2025</a:t>
+              <a:t>02/05/2025</a:t>
             </a:fld>
             <a:endParaRPr lang="en-GB" dirty="0"/>
           </a:p>
@@ -6602,7 +9680,7 @@
           <a:p>
             <a:fld id="{E796DD2E-7FCA-4C1F-A0C3-02DE4E493BB2}" type="datetimeFigureOut">
               <a:rPr lang="en-GB" smtClean="0"/>
-              <a:t>01/05/2025</a:t>
+              <a:t>02/05/2025</a:t>
             </a:fld>
             <a:endParaRPr lang="en-GB" dirty="0"/>
           </a:p>
@@ -6844,7 +9922,7 @@
           <a:p>
             <a:fld id="{E796DD2E-7FCA-4C1F-A0C3-02DE4E493BB2}" type="datetimeFigureOut">
               <a:rPr lang="en-GB" smtClean="0"/>
-              <a:t>01/05/2025</a:t>
+              <a:t>02/05/2025</a:t>
             </a:fld>
             <a:endParaRPr lang="en-GB" dirty="0"/>
           </a:p>
@@ -8004,7 +11082,13 @@
   <p:cSld>
     <p:spTree>
       <p:nvGrpSpPr>
-        <p:cNvPr id="1" name=""/>
+        <p:cNvPr id="1" name="">
+          <a:extLst>
+            <a:ext uri="{FF2B5EF4-FFF2-40B4-BE49-F238E27FC236}">
+              <a16:creationId xmlns:a16="http://schemas.microsoft.com/office/drawing/2014/main" id="{12C56952-01F2-D240-56C7-70D01E322CE7}"/>
+            </a:ext>
+          </a:extLst>
+        </p:cNvPr>
         <p:cNvGrpSpPr/>
         <p:nvPr/>
       </p:nvGrpSpPr>
@@ -8018,10 +11102,10 @@
       </p:grpSpPr>
       <p:sp>
         <p:nvSpPr>
-          <p:cNvPr id="2" name="Title 1">
+          <p:cNvPr id="5" name="Title 4">
             <a:extLst>
               <a:ext uri="{FF2B5EF4-FFF2-40B4-BE49-F238E27FC236}">
-                <a16:creationId xmlns:a16="http://schemas.microsoft.com/office/drawing/2014/main" id="{1A28327C-C3A5-86F5-C935-C5A90B3DC70A}"/>
+                <a16:creationId xmlns:a16="http://schemas.microsoft.com/office/drawing/2014/main" id="{61028B3D-FE24-1AAA-B17B-4E5E4A5F44F1}"/>
               </a:ext>
             </a:extLst>
           </p:cNvPr>
@@ -8032,39 +11116,672 @@
             <p:ph type="title"/>
           </p:nvPr>
         </p:nvSpPr>
-        <p:spPr/>
-        <p:txBody>
-          <a:bodyPr/>
+        <p:spPr>
+          <a:xfrm>
+            <a:off x="4331368" y="271128"/>
+            <a:ext cx="3529263" cy="1293028"/>
+          </a:xfrm>
+        </p:spPr>
+        <p:txBody>
+          <a:bodyPr>
+            <a:normAutofit/>
+          </a:bodyPr>
           <a:lstStyle/>
           <a:p>
-            <a:endParaRPr lang="en-GB"/>
-          </a:p>
-        </p:txBody>
-      </p:sp>
-      <p:sp>
-        <p:nvSpPr>
-          <p:cNvPr id="3" name="Content Placeholder 2">
+            <a:r>
+              <a:rPr lang="en-GB" dirty="0">
+                <a:latin typeface="Georgia" panose="02040502050405020303" pitchFamily="18" charset="0"/>
+              </a:rPr>
+              <a:t>Team Roles</a:t>
+            </a:r>
+          </a:p>
+        </p:txBody>
+      </p:sp>
+      <p:graphicFrame>
+        <p:nvGraphicFramePr>
+          <p:cNvPr id="7" name="Content Placeholder 2">
             <a:extLst>
               <a:ext uri="{FF2B5EF4-FFF2-40B4-BE49-F238E27FC236}">
-                <a16:creationId xmlns:a16="http://schemas.microsoft.com/office/drawing/2014/main" id="{9E2C3FBD-F0CD-76CE-C687-E9DA578A9A51}"/>
+                <a16:creationId xmlns:a16="http://schemas.microsoft.com/office/drawing/2014/main" id="{0C3F9713-237F-B21D-06C7-E66E55357667}"/>
               </a:ext>
             </a:extLst>
           </p:cNvPr>
-          <p:cNvSpPr>
-            <a:spLocks noGrp="1"/>
-          </p:cNvSpPr>
+          <p:cNvGraphicFramePr>
+            <a:graphicFrameLocks noGrp="1"/>
+          </p:cNvGraphicFramePr>
           <p:nvPr>
             <p:ph idx="1"/>
-          </p:nvPr>
-        </p:nvSpPr>
-        <p:spPr/>
-        <p:txBody>
-          <a:bodyPr/>
+            <p:extLst>
+              <p:ext uri="{D42A27DB-BD31-4B8C-83A1-F6EECF244321}">
+                <p14:modId xmlns:p14="http://schemas.microsoft.com/office/powerpoint/2010/main" val="3230556253"/>
+              </p:ext>
+            </p:extLst>
+          </p:nvPr>
+        </p:nvGraphicFramePr>
+        <p:xfrm>
+          <a:off x="685800" y="2441051"/>
+          <a:ext cx="10820400" cy="3530062"/>
+        </p:xfrm>
+        <a:graphic>
+          <a:graphicData uri="http://schemas.openxmlformats.org/drawingml/2006/diagram">
+            <dgm:relIds xmlns:dgm="http://schemas.openxmlformats.org/drawingml/2006/diagram" xmlns:r="http://schemas.openxmlformats.org/officeDocument/2006/relationships" r:dm="rId3" r:lo="rId4" r:qs="rId5" r:cs="rId6"/>
+          </a:graphicData>
+        </a:graphic>
+      </p:graphicFrame>
+      <p:sp>
+        <p:nvSpPr>
+          <p:cNvPr id="6" name="TextBox 5">
+            <a:extLst>
+              <a:ext uri="{FF2B5EF4-FFF2-40B4-BE49-F238E27FC236}">
+                <a16:creationId xmlns:a16="http://schemas.microsoft.com/office/drawing/2014/main" id="{916C0775-FDFD-E07C-C586-7F0B4A0119B4}"/>
+              </a:ext>
+            </a:extLst>
+          </p:cNvPr>
+          <p:cNvSpPr txBox="1"/>
+          <p:nvPr/>
+        </p:nvSpPr>
+        <p:spPr>
+          <a:xfrm>
+            <a:off x="4951317" y="1802413"/>
+            <a:ext cx="2209800" cy="1277273"/>
+          </a:xfrm>
+          <a:prstGeom prst="rect">
+            <a:avLst/>
+          </a:prstGeom>
+          <a:noFill/>
+        </p:spPr>
+        <p:txBody>
+          <a:bodyPr wrap="square" rtlCol="0">
+            <a:spAutoFit/>
+          </a:bodyPr>
           <a:lstStyle/>
           <a:p>
+            <a:pPr lvl="0" algn="ctr"/>
             <a:r>
               <a:rPr lang="en-GB" dirty="0"/>
-              <a:t>Team roles in the system development</a:t>
+              <a:t>Lead Developer &amp;</a:t>
+            </a:r>
+            <a:br>
+              <a:rPr lang="en-GB" dirty="0"/>
+            </a:br>
+            <a:r>
+              <a:rPr lang="en-GB" dirty="0"/>
+              <a:t>System Integrator:</a:t>
+            </a:r>
+          </a:p>
+          <a:p>
+            <a:pPr lvl="0" algn="ctr"/>
+            <a:endParaRPr lang="en-GB" sz="800" i="1" dirty="0"/>
+          </a:p>
+          <a:p>
+            <a:pPr lvl="0" algn="ctr"/>
+            <a:r>
+              <a:rPr lang="en-GB" sz="1500" i="1" dirty="0"/>
+              <a:t>Jack Harrison </a:t>
+            </a:r>
+          </a:p>
+        </p:txBody>
+      </p:sp>
+      <p:sp>
+        <p:nvSpPr>
+          <p:cNvPr id="8" name="TextBox 7">
+            <a:extLst>
+              <a:ext uri="{FF2B5EF4-FFF2-40B4-BE49-F238E27FC236}">
+                <a16:creationId xmlns:a16="http://schemas.microsoft.com/office/drawing/2014/main" id="{B830713F-7607-F14C-D44C-8B93FD1ADCE3}"/>
+              </a:ext>
+            </a:extLst>
+          </p:cNvPr>
+          <p:cNvSpPr txBox="1"/>
+          <p:nvPr/>
+        </p:nvSpPr>
+        <p:spPr>
+          <a:xfrm>
+            <a:off x="7216100" y="1802414"/>
+            <a:ext cx="2117558" cy="1277273"/>
+          </a:xfrm>
+          <a:prstGeom prst="rect">
+            <a:avLst/>
+          </a:prstGeom>
+          <a:noFill/>
+        </p:spPr>
+        <p:txBody>
+          <a:bodyPr wrap="square" rtlCol="0">
+            <a:spAutoFit/>
+          </a:bodyPr>
+          <a:lstStyle/>
+          <a:p>
+            <a:pPr lvl="0" algn="ctr"/>
+            <a:r>
+              <a:rPr lang="en-GB" dirty="0"/>
+              <a:t>Information Retrieval Engineer:</a:t>
+            </a:r>
+          </a:p>
+          <a:p>
+            <a:pPr lvl="0" algn="ctr"/>
+            <a:endParaRPr lang="en-GB" sz="800" i="1" dirty="0"/>
+          </a:p>
+          <a:p>
+            <a:pPr lvl="0" algn="ctr"/>
+            <a:r>
+              <a:rPr lang="en-GB" sz="1500" i="1" dirty="0"/>
+              <a:t>Ruben Lazell </a:t>
+            </a:r>
+          </a:p>
+        </p:txBody>
+      </p:sp>
+      <p:sp>
+        <p:nvSpPr>
+          <p:cNvPr id="9" name="TextBox 8">
+            <a:extLst>
+              <a:ext uri="{FF2B5EF4-FFF2-40B4-BE49-F238E27FC236}">
+                <a16:creationId xmlns:a16="http://schemas.microsoft.com/office/drawing/2014/main" id="{C4AD3607-C2F7-458F-0EA7-90372B79B705}"/>
+              </a:ext>
+            </a:extLst>
+          </p:cNvPr>
+          <p:cNvSpPr txBox="1"/>
+          <p:nvPr/>
+        </p:nvSpPr>
+        <p:spPr>
+          <a:xfrm>
+            <a:off x="525702" y="1764858"/>
+            <a:ext cx="2592807" cy="1277273"/>
+          </a:xfrm>
+          <a:prstGeom prst="rect">
+            <a:avLst/>
+          </a:prstGeom>
+          <a:noFill/>
+        </p:spPr>
+        <p:txBody>
+          <a:bodyPr wrap="square" rtlCol="0">
+            <a:spAutoFit/>
+          </a:bodyPr>
+          <a:lstStyle/>
+          <a:p>
+            <a:pPr lvl="0" algn="ctr"/>
+            <a:r>
+              <a:rPr lang="en-GB" dirty="0"/>
+              <a:t>SBERT Clarifying Questions Retrieval Specialist:</a:t>
+            </a:r>
+          </a:p>
+          <a:p>
+            <a:pPr lvl="0" algn="ctr"/>
+            <a:endParaRPr lang="en-GB" sz="800" i="1" dirty="0"/>
+          </a:p>
+          <a:p>
+            <a:pPr lvl="0" algn="ctr"/>
+            <a:r>
+              <a:rPr lang="en-GB" sz="1500" i="1" dirty="0"/>
+              <a:t>Ansh Bisht </a:t>
+            </a:r>
+          </a:p>
+        </p:txBody>
+      </p:sp>
+      <p:sp>
+        <p:nvSpPr>
+          <p:cNvPr id="10" name="TextBox 9">
+            <a:extLst>
+              <a:ext uri="{FF2B5EF4-FFF2-40B4-BE49-F238E27FC236}">
+                <a16:creationId xmlns:a16="http://schemas.microsoft.com/office/drawing/2014/main" id="{DA733F52-4B98-0521-072C-BA51569C25BC}"/>
+              </a:ext>
+            </a:extLst>
+          </p:cNvPr>
+          <p:cNvSpPr txBox="1"/>
+          <p:nvPr/>
+        </p:nvSpPr>
+        <p:spPr>
+          <a:xfrm>
+            <a:off x="9194819" y="1802414"/>
+            <a:ext cx="2117558" cy="1277273"/>
+          </a:xfrm>
+          <a:prstGeom prst="rect">
+            <a:avLst/>
+          </a:prstGeom>
+          <a:noFill/>
+        </p:spPr>
+        <p:txBody>
+          <a:bodyPr wrap="square" rtlCol="0">
+            <a:spAutoFit/>
+          </a:bodyPr>
+          <a:lstStyle/>
+          <a:p>
+            <a:pPr lvl="0" algn="ctr"/>
+            <a:r>
+              <a:rPr lang="en-GB" dirty="0"/>
+              <a:t>Scrum Master</a:t>
+            </a:r>
+            <a:br>
+              <a:rPr lang="en-GB" dirty="0"/>
+            </a:br>
+            <a:r>
+              <a:rPr lang="en-GB" dirty="0"/>
+              <a:t>&amp;</a:t>
+            </a:r>
+            <a:br>
+              <a:rPr lang="en-GB" dirty="0"/>
+            </a:br>
+            <a:r>
+              <a:rPr lang="en-GB" dirty="0"/>
+              <a:t>System Designer:</a:t>
+            </a:r>
+          </a:p>
+          <a:p>
+            <a:pPr lvl="0" algn="ctr"/>
+            <a:endParaRPr lang="en-GB" sz="800" i="1" dirty="0"/>
+          </a:p>
+          <a:p>
+            <a:pPr lvl="0" algn="ctr"/>
+            <a:r>
+              <a:rPr lang="en-GB" sz="1500" i="1" dirty="0"/>
+              <a:t>Andrew Taison</a:t>
+            </a:r>
+          </a:p>
+        </p:txBody>
+      </p:sp>
+      <p:sp>
+        <p:nvSpPr>
+          <p:cNvPr id="12" name="TextBox 11">
+            <a:extLst>
+              <a:ext uri="{FF2B5EF4-FFF2-40B4-BE49-F238E27FC236}">
+                <a16:creationId xmlns:a16="http://schemas.microsoft.com/office/drawing/2014/main" id="{4EE16AA8-2F7D-8869-B9A8-F9B20232ABD9}"/>
+              </a:ext>
+            </a:extLst>
+          </p:cNvPr>
+          <p:cNvSpPr txBox="1"/>
+          <p:nvPr/>
+        </p:nvSpPr>
+        <p:spPr>
+          <a:xfrm>
+            <a:off x="2892171" y="1764858"/>
+            <a:ext cx="2117558" cy="1277273"/>
+          </a:xfrm>
+          <a:prstGeom prst="rect">
+            <a:avLst/>
+          </a:prstGeom>
+          <a:noFill/>
+        </p:spPr>
+        <p:txBody>
+          <a:bodyPr wrap="square" rtlCol="0">
+            <a:spAutoFit/>
+          </a:bodyPr>
+          <a:lstStyle/>
+          <a:p>
+            <a:pPr lvl="0" algn="ctr"/>
+            <a:r>
+              <a:rPr lang="en-GB" dirty="0"/>
+              <a:t>Project </a:t>
+            </a:r>
+            <a:br>
+              <a:rPr lang="en-GB" dirty="0"/>
+            </a:br>
+            <a:r>
+              <a:rPr lang="en-GB" dirty="0"/>
+              <a:t>Manager:</a:t>
+            </a:r>
+            <a:br>
+              <a:rPr lang="en-GB" dirty="0"/>
+            </a:br>
+            <a:endParaRPr lang="en-GB" dirty="0"/>
+          </a:p>
+          <a:p>
+            <a:pPr lvl="0" algn="ctr"/>
+            <a:endParaRPr lang="en-GB" sz="800" i="1" dirty="0"/>
+          </a:p>
+          <a:p>
+            <a:pPr lvl="0" algn="ctr"/>
+            <a:r>
+              <a:rPr lang="en-GB" sz="1500" i="1" dirty="0"/>
+              <a:t>Jordan Dickson </a:t>
+            </a:r>
+          </a:p>
+        </p:txBody>
+      </p:sp>
+      <p:sp>
+        <p:nvSpPr>
+          <p:cNvPr id="13" name="Title 4">
+            <a:extLst>
+              <a:ext uri="{FF2B5EF4-FFF2-40B4-BE49-F238E27FC236}">
+                <a16:creationId xmlns:a16="http://schemas.microsoft.com/office/drawing/2014/main" id="{873F13E4-695E-ABD2-09A5-A9628F7DFA9F}"/>
+              </a:ext>
+            </a:extLst>
+          </p:cNvPr>
+          <p:cNvSpPr txBox="1">
+            <a:spLocks/>
+          </p:cNvSpPr>
+          <p:nvPr/>
+        </p:nvSpPr>
+        <p:spPr>
+          <a:xfrm>
+            <a:off x="4291585" y="5731252"/>
+            <a:ext cx="3529263" cy="1293028"/>
+          </a:xfrm>
+          <a:prstGeom prst="rect">
+            <a:avLst/>
+          </a:prstGeom>
+        </p:spPr>
+        <p:txBody>
+          <a:bodyPr vert="horz" lIns="91440" tIns="45720" rIns="91440" bIns="45720" rtlCol="0" anchor="ctr">
+            <a:normAutofit/>
+          </a:bodyPr>
+          <a:lstStyle>
+            <a:lvl1pPr algn="r" defTabSz="914400" rtl="0" eaLnBrk="1" latinLnBrk="0" hangingPunct="1">
+              <a:lnSpc>
+                <a:spcPct val="90000"/>
+              </a:lnSpc>
+              <a:spcBef>
+                <a:spcPct val="0"/>
+              </a:spcBef>
+              <a:buNone/>
+              <a:defRPr sz="4000" kern="1200" cap="all" baseline="0">
+                <a:solidFill>
+                  <a:schemeClr val="tx1"/>
+                </a:solidFill>
+                <a:latin typeface="+mj-lt"/>
+                <a:ea typeface="+mj-ea"/>
+                <a:cs typeface="+mj-cs"/>
+              </a:defRPr>
+            </a:lvl1pPr>
+          </a:lstStyle>
+          <a:p>
+            <a:pPr algn="ctr"/>
+            <a:r>
+              <a:rPr lang="en-GB" sz="2500" dirty="0">
+                <a:latin typeface="Georgia" panose="02040502050405020303" pitchFamily="18" charset="0"/>
+              </a:rPr>
+              <a:t>Responsibilities</a:t>
+            </a:r>
+          </a:p>
+        </p:txBody>
+      </p:sp>
+      <p:sp>
+        <p:nvSpPr>
+          <p:cNvPr id="2" name="TextBox 1">
+            <a:extLst>
+              <a:ext uri="{FF2B5EF4-FFF2-40B4-BE49-F238E27FC236}">
+                <a16:creationId xmlns:a16="http://schemas.microsoft.com/office/drawing/2014/main" id="{626771B4-F1C8-3B2B-706B-2D4CC3790D9F}"/>
+              </a:ext>
+            </a:extLst>
+          </p:cNvPr>
+          <p:cNvSpPr txBox="1"/>
+          <p:nvPr/>
+        </p:nvSpPr>
+        <p:spPr>
+          <a:xfrm>
+            <a:off x="9293275" y="4248000"/>
+            <a:ext cx="2215159" cy="2123658"/>
+          </a:xfrm>
+          <a:prstGeom prst="rect">
+            <a:avLst/>
+          </a:prstGeom>
+          <a:noFill/>
+        </p:spPr>
+        <p:txBody>
+          <a:bodyPr wrap="square" rtlCol="0">
+            <a:spAutoFit/>
+          </a:bodyPr>
+          <a:lstStyle/>
+          <a:p>
+            <a:pPr marL="285750" indent="-285750">
+              <a:buFont typeface="Arial" panose="020B0604020202020204" pitchFamily="34" charset="0"/>
+              <a:buChar char="•"/>
+            </a:pPr>
+            <a:r>
+              <a:rPr lang="en-GB" sz="1200" dirty="0"/>
+              <a:t>Led team meetings and tracked weekly progress.</a:t>
+            </a:r>
+          </a:p>
+          <a:p>
+            <a:pPr marL="285750" indent="-285750">
+              <a:buFont typeface="Arial" panose="020B0604020202020204" pitchFamily="34" charset="0"/>
+              <a:buChar char="•"/>
+            </a:pPr>
+            <a:r>
+              <a:rPr lang="en-GB" sz="1200" dirty="0"/>
+              <a:t>Designed the initial system structure.</a:t>
+            </a:r>
+          </a:p>
+          <a:p>
+            <a:pPr marL="285750" indent="-285750">
+              <a:buFont typeface="Arial" panose="020B0604020202020204" pitchFamily="34" charset="0"/>
+              <a:buChar char="•"/>
+            </a:pPr>
+            <a:r>
+              <a:rPr lang="en-GB" sz="1200" dirty="0"/>
+              <a:t>Sourced and pre-processed the </a:t>
+            </a:r>
+            <a:r>
+              <a:rPr lang="en-GB" sz="1200" dirty="0" err="1"/>
+              <a:t>Qulac</a:t>
+            </a:r>
+            <a:r>
+              <a:rPr lang="en-GB" sz="1200" dirty="0"/>
+              <a:t> dataset.</a:t>
+            </a:r>
+          </a:p>
+          <a:p>
+            <a:pPr marL="285750" indent="-285750">
+              <a:buFont typeface="Arial" panose="020B0604020202020204" pitchFamily="34" charset="0"/>
+              <a:buChar char="•"/>
+            </a:pPr>
+            <a:r>
+              <a:rPr lang="en-GB" sz="1200" dirty="0"/>
+              <a:t>Created templates for the report and presentation.</a:t>
+            </a:r>
+          </a:p>
+        </p:txBody>
+      </p:sp>
+      <p:sp>
+        <p:nvSpPr>
+          <p:cNvPr id="3" name="TextBox 2">
+            <a:extLst>
+              <a:ext uri="{FF2B5EF4-FFF2-40B4-BE49-F238E27FC236}">
+                <a16:creationId xmlns:a16="http://schemas.microsoft.com/office/drawing/2014/main" id="{1A56D24B-2D9E-758B-010F-94D6A9458AB3}"/>
+              </a:ext>
+            </a:extLst>
+          </p:cNvPr>
+          <p:cNvSpPr txBox="1"/>
+          <p:nvPr/>
+        </p:nvSpPr>
+        <p:spPr>
+          <a:xfrm>
+            <a:off x="2820014" y="4248403"/>
+            <a:ext cx="2215159" cy="1384995"/>
+          </a:xfrm>
+          <a:prstGeom prst="rect">
+            <a:avLst/>
+          </a:prstGeom>
+          <a:noFill/>
+        </p:spPr>
+        <p:txBody>
+          <a:bodyPr wrap="square" rtlCol="0">
+            <a:spAutoFit/>
+          </a:bodyPr>
+          <a:lstStyle/>
+          <a:p>
+            <a:pPr marL="285750" indent="-285750">
+              <a:buFont typeface="Arial" panose="020B0604020202020204" pitchFamily="34" charset="0"/>
+              <a:buChar char="•"/>
+            </a:pPr>
+            <a:r>
+              <a:rPr lang="en-GB" sz="1200" dirty="0"/>
+              <a:t>Managed project tools including Kanban board and GitHub.</a:t>
+            </a:r>
+          </a:p>
+          <a:p>
+            <a:pPr marL="285750" indent="-285750">
+              <a:buFont typeface="Arial" panose="020B0604020202020204" pitchFamily="34" charset="0"/>
+              <a:buChar char="•"/>
+            </a:pPr>
+            <a:r>
+              <a:rPr lang="en-GB" sz="1200" dirty="0"/>
+              <a:t>Organised team meetings.</a:t>
+            </a:r>
+          </a:p>
+          <a:p>
+            <a:pPr marL="285750" indent="-285750">
+              <a:buFont typeface="Arial" panose="020B0604020202020204" pitchFamily="34" charset="0"/>
+              <a:buChar char="•"/>
+            </a:pPr>
+            <a:r>
+              <a:rPr lang="en-GB" sz="1200" dirty="0"/>
+              <a:t>Sourced Wikipedia summaries for retrieval.</a:t>
+            </a:r>
+          </a:p>
+        </p:txBody>
+      </p:sp>
+      <p:sp>
+        <p:nvSpPr>
+          <p:cNvPr id="4" name="TextBox 3">
+            <a:extLst>
+              <a:ext uri="{FF2B5EF4-FFF2-40B4-BE49-F238E27FC236}">
+                <a16:creationId xmlns:a16="http://schemas.microsoft.com/office/drawing/2014/main" id="{3A083E88-F80A-02C2-C1F0-7E01883045AD}"/>
+              </a:ext>
+            </a:extLst>
+          </p:cNvPr>
+          <p:cNvSpPr txBox="1"/>
+          <p:nvPr/>
+        </p:nvSpPr>
+        <p:spPr>
+          <a:xfrm>
+            <a:off x="813130" y="4248562"/>
+            <a:ext cx="2215159" cy="1200329"/>
+          </a:xfrm>
+          <a:prstGeom prst="rect">
+            <a:avLst/>
+          </a:prstGeom>
+          <a:noFill/>
+        </p:spPr>
+        <p:txBody>
+          <a:bodyPr wrap="square" rtlCol="0">
+            <a:spAutoFit/>
+          </a:bodyPr>
+          <a:lstStyle/>
+          <a:p>
+            <a:pPr marL="171450" indent="-171450">
+              <a:buFont typeface="Arial" panose="020B0604020202020204" pitchFamily="34" charset="0"/>
+              <a:buChar char="•"/>
+            </a:pPr>
+            <a:r>
+              <a:rPr lang="en-GB" sz="1200" dirty="0"/>
+              <a:t>Set up the SBERT model for sentence similarity.</a:t>
+            </a:r>
+          </a:p>
+          <a:p>
+            <a:pPr marL="171450" indent="-171450">
+              <a:buFont typeface="Arial" panose="020B0604020202020204" pitchFamily="34" charset="0"/>
+              <a:buChar char="•"/>
+            </a:pPr>
+            <a:r>
+              <a:rPr lang="en-GB" sz="1200" dirty="0"/>
+              <a:t>Supported tuning and evaluation of the question ranking module.</a:t>
+            </a:r>
+          </a:p>
+        </p:txBody>
+      </p:sp>
+      <p:sp>
+        <p:nvSpPr>
+          <p:cNvPr id="11" name="TextBox 10">
+            <a:extLst>
+              <a:ext uri="{FF2B5EF4-FFF2-40B4-BE49-F238E27FC236}">
+                <a16:creationId xmlns:a16="http://schemas.microsoft.com/office/drawing/2014/main" id="{2B8EF116-1341-7991-7254-85EB571252E9}"/>
+              </a:ext>
+            </a:extLst>
+          </p:cNvPr>
+          <p:cNvSpPr txBox="1"/>
+          <p:nvPr/>
+        </p:nvSpPr>
+        <p:spPr>
+          <a:xfrm>
+            <a:off x="4948638" y="4248562"/>
+            <a:ext cx="2215159" cy="1569660"/>
+          </a:xfrm>
+          <a:prstGeom prst="rect">
+            <a:avLst/>
+          </a:prstGeom>
+          <a:noFill/>
+        </p:spPr>
+        <p:txBody>
+          <a:bodyPr wrap="square" rtlCol="0">
+            <a:spAutoFit/>
+          </a:bodyPr>
+          <a:lstStyle/>
+          <a:p>
+            <a:pPr marL="171450" lvl="0" indent="-171450">
+              <a:buFont typeface="Arial" panose="020B0604020202020204" pitchFamily="34" charset="0"/>
+              <a:buChar char="•"/>
+            </a:pPr>
+            <a:r>
+              <a:rPr lang="en-GB" sz="1200" dirty="0"/>
+              <a:t>Led implementation and integration of system modules.</a:t>
+            </a:r>
+          </a:p>
+          <a:p>
+            <a:pPr marL="171450" lvl="0" indent="-171450">
+              <a:buFont typeface="Arial" panose="020B0604020202020204" pitchFamily="34" charset="0"/>
+              <a:buChar char="•"/>
+            </a:pPr>
+            <a:r>
+              <a:rPr lang="en-GB" sz="1200" dirty="0"/>
+              <a:t>Set up Rasa and handled communication between components.</a:t>
+            </a:r>
+          </a:p>
+          <a:p>
+            <a:pPr marL="171450" lvl="0" indent="-171450">
+              <a:buFont typeface="Arial" panose="020B0604020202020204" pitchFamily="34" charset="0"/>
+              <a:buChar char="•"/>
+            </a:pPr>
+            <a:r>
+              <a:rPr lang="en-GB" sz="1200" dirty="0"/>
+              <a:t>Produced the system demonstration video.</a:t>
+            </a:r>
+            <a:endParaRPr lang="en-US" sz="1200" dirty="0"/>
+          </a:p>
+        </p:txBody>
+      </p:sp>
+      <p:sp>
+        <p:nvSpPr>
+          <p:cNvPr id="14" name="TextBox 13">
+            <a:extLst>
+              <a:ext uri="{FF2B5EF4-FFF2-40B4-BE49-F238E27FC236}">
+                <a16:creationId xmlns:a16="http://schemas.microsoft.com/office/drawing/2014/main" id="{DC93690C-0F65-387B-85AE-BC59A030F0F3}"/>
+              </a:ext>
+            </a:extLst>
+          </p:cNvPr>
+          <p:cNvSpPr txBox="1"/>
+          <p:nvPr/>
+        </p:nvSpPr>
+        <p:spPr>
+          <a:xfrm>
+            <a:off x="7156827" y="4248000"/>
+            <a:ext cx="2215159" cy="1200329"/>
+          </a:xfrm>
+          <a:prstGeom prst="rect">
+            <a:avLst/>
+          </a:prstGeom>
+          <a:noFill/>
+        </p:spPr>
+        <p:txBody>
+          <a:bodyPr wrap="square" rtlCol="0">
+            <a:spAutoFit/>
+          </a:bodyPr>
+          <a:lstStyle/>
+          <a:p>
+            <a:pPr marL="171450" indent="-171450">
+              <a:buFont typeface="Arial" panose="020B0604020202020204" pitchFamily="34" charset="0"/>
+              <a:buChar char="•"/>
+            </a:pPr>
+            <a:r>
+              <a:rPr lang="en-GB" sz="1200" dirty="0"/>
+              <a:t>Developed and tested the BM25 retrieval module.</a:t>
+            </a:r>
+          </a:p>
+          <a:p>
+            <a:pPr marL="171450" indent="-171450">
+              <a:buFont typeface="Arial" panose="020B0604020202020204" pitchFamily="34" charset="0"/>
+              <a:buChar char="•"/>
+            </a:pPr>
+            <a:r>
+              <a:rPr lang="en-GB" sz="1200" dirty="0"/>
+              <a:t>Supported module integration and retrieval tuning.</a:t>
             </a:r>
           </a:p>
         </p:txBody>
@@ -8072,7 +11789,7 @@
     </p:spTree>
     <p:extLst>
       <p:ext uri="{BB962C8B-B14F-4D97-AF65-F5344CB8AC3E}">
-        <p14:creationId xmlns:p14="http://schemas.microsoft.com/office/powerpoint/2010/main" val="342843236"/>
+        <p14:creationId xmlns:p14="http://schemas.microsoft.com/office/powerpoint/2010/main" val="2768695278"/>
       </p:ext>
     </p:extLst>
   </p:cSld>

</xml_diff>

<commit_message>
Added matric numbers to team roles slide
</commit_message>
<xml_diff>
--- a/set10120_cw2_presentation.pptx
+++ b/set10120_cw2_presentation.pptx
@@ -4198,7 +4198,7 @@
           <a:p>
             <a:fld id="{F524CC67-45C1-49D0-8AEB-2EF995C1B354}" type="datetimeFigureOut">
               <a:rPr lang="en-GB" smtClean="0"/>
-              <a:t>06/05/2025</a:t>
+              <a:t>07/05/2025</a:t>
             </a:fld>
             <a:endParaRPr lang="en-GB"/>
           </a:p>
@@ -4912,7 +4912,7 @@
           <a:p>
             <a:fld id="{E796DD2E-7FCA-4C1F-A0C3-02DE4E493BB2}" type="datetimeFigureOut">
               <a:rPr lang="en-GB" smtClean="0"/>
-              <a:t>06/05/2025</a:t>
+              <a:t>07/05/2025</a:t>
             </a:fld>
             <a:endParaRPr lang="en-GB" dirty="0"/>
           </a:p>
@@ -5178,7 +5178,7 @@
           <a:p>
             <a:fld id="{E796DD2E-7FCA-4C1F-A0C3-02DE4E493BB2}" type="datetimeFigureOut">
               <a:rPr lang="en-GB" smtClean="0"/>
-              <a:t>06/05/2025</a:t>
+              <a:t>07/05/2025</a:t>
             </a:fld>
             <a:endParaRPr lang="en-GB" dirty="0"/>
           </a:p>
@@ -5434,7 +5434,7 @@
           <a:p>
             <a:fld id="{E796DD2E-7FCA-4C1F-A0C3-02DE4E493BB2}" type="datetimeFigureOut">
               <a:rPr lang="en-GB" smtClean="0"/>
-              <a:t>06/05/2025</a:t>
+              <a:t>07/05/2025</a:t>
             </a:fld>
             <a:endParaRPr lang="en-GB" dirty="0"/>
           </a:p>
@@ -5665,7 +5665,7 @@
           <a:p>
             <a:fld id="{E796DD2E-7FCA-4C1F-A0C3-02DE4E493BB2}" type="datetimeFigureOut">
               <a:rPr lang="en-GB" smtClean="0"/>
-              <a:t>06/05/2025</a:t>
+              <a:t>07/05/2025</a:t>
             </a:fld>
             <a:endParaRPr lang="en-GB" dirty="0"/>
           </a:p>
@@ -5975,7 +5975,7 @@
           <a:p>
             <a:fld id="{E796DD2E-7FCA-4C1F-A0C3-02DE4E493BB2}" type="datetimeFigureOut">
               <a:rPr lang="en-GB" smtClean="0"/>
-              <a:t>06/05/2025</a:t>
+              <a:t>07/05/2025</a:t>
             </a:fld>
             <a:endParaRPr lang="en-GB" dirty="0"/>
           </a:p>
@@ -6448,7 +6448,7 @@
           <a:p>
             <a:fld id="{E796DD2E-7FCA-4C1F-A0C3-02DE4E493BB2}" type="datetimeFigureOut">
               <a:rPr lang="en-GB" smtClean="0"/>
-              <a:t>06/05/2025</a:t>
+              <a:t>07/05/2025</a:t>
             </a:fld>
             <a:endParaRPr lang="en-GB" dirty="0"/>
           </a:p>
@@ -6995,7 +6995,7 @@
           <a:p>
             <a:fld id="{E796DD2E-7FCA-4C1F-A0C3-02DE4E493BB2}" type="datetimeFigureOut">
               <a:rPr lang="en-GB" smtClean="0"/>
-              <a:t>06/05/2025</a:t>
+              <a:t>07/05/2025</a:t>
             </a:fld>
             <a:endParaRPr lang="en-GB" dirty="0"/>
           </a:p>
@@ -7766,7 +7766,7 @@
           <a:p>
             <a:fld id="{E796DD2E-7FCA-4C1F-A0C3-02DE4E493BB2}" type="datetimeFigureOut">
               <a:rPr lang="en-GB" smtClean="0"/>
-              <a:t>06/05/2025</a:t>
+              <a:t>07/05/2025</a:t>
             </a:fld>
             <a:endParaRPr lang="en-GB" dirty="0"/>
           </a:p>
@@ -7941,7 +7941,7 @@
           <a:p>
             <a:fld id="{E796DD2E-7FCA-4C1F-A0C3-02DE4E493BB2}" type="datetimeFigureOut">
               <a:rPr lang="en-GB" smtClean="0"/>
-              <a:t>06/05/2025</a:t>
+              <a:t>07/05/2025</a:t>
             </a:fld>
             <a:endParaRPr lang="en-GB" dirty="0"/>
           </a:p>
@@ -8164,7 +8164,7 @@
           <a:p>
             <a:fld id="{E796DD2E-7FCA-4C1F-A0C3-02DE4E493BB2}" type="datetimeFigureOut">
               <a:rPr lang="en-GB" smtClean="0"/>
-              <a:t>06/05/2025</a:t>
+              <a:t>07/05/2025</a:t>
             </a:fld>
             <a:endParaRPr lang="en-GB" dirty="0"/>
           </a:p>
@@ -8344,7 +8344,7 @@
           <a:p>
             <a:fld id="{E796DD2E-7FCA-4C1F-A0C3-02DE4E493BB2}" type="datetimeFigureOut">
               <a:rPr lang="en-GB" smtClean="0"/>
-              <a:t>06/05/2025</a:t>
+              <a:t>07/05/2025</a:t>
             </a:fld>
             <a:endParaRPr lang="en-GB" dirty="0"/>
           </a:p>
@@ -8474,7 +8474,7 @@
           <a:p>
             <a:fld id="{E796DD2E-7FCA-4C1F-A0C3-02DE4E493BB2}" type="datetimeFigureOut">
               <a:rPr lang="en-GB" smtClean="0"/>
-              <a:t>06/05/2025</a:t>
+              <a:t>07/05/2025</a:t>
             </a:fld>
             <a:endParaRPr lang="en-GB" dirty="0"/>
           </a:p>
@@ -8775,7 +8775,7 @@
           <a:p>
             <a:fld id="{E796DD2E-7FCA-4C1F-A0C3-02DE4E493BB2}" type="datetimeFigureOut">
               <a:rPr lang="en-GB" smtClean="0"/>
-              <a:t>06/05/2025</a:t>
+              <a:t>07/05/2025</a:t>
             </a:fld>
             <a:endParaRPr lang="en-GB" dirty="0"/>
           </a:p>
@@ -9017,7 +9017,7 @@
           <a:p>
             <a:fld id="{E796DD2E-7FCA-4C1F-A0C3-02DE4E493BB2}" type="datetimeFigureOut">
               <a:rPr lang="en-GB" smtClean="0"/>
-              <a:t>06/05/2025</a:t>
+              <a:t>07/05/2025</a:t>
             </a:fld>
             <a:endParaRPr lang="en-GB" dirty="0"/>
           </a:p>
@@ -9396,7 +9396,7 @@
           <a:p>
             <a:fld id="{E796DD2E-7FCA-4C1F-A0C3-02DE4E493BB2}" type="datetimeFigureOut">
               <a:rPr lang="en-GB" smtClean="0"/>
-              <a:t>06/05/2025</a:t>
+              <a:t>07/05/2025</a:t>
             </a:fld>
             <a:endParaRPr lang="en-GB" dirty="0"/>
           </a:p>
@@ -9514,7 +9514,7 @@
           <a:p>
             <a:fld id="{E796DD2E-7FCA-4C1F-A0C3-02DE4E493BB2}" type="datetimeFigureOut">
               <a:rPr lang="en-GB" smtClean="0"/>
-              <a:t>06/05/2025</a:t>
+              <a:t>07/05/2025</a:t>
             </a:fld>
             <a:endParaRPr lang="en-GB" dirty="0"/>
           </a:p>
@@ -9609,7 +9609,7 @@
           <a:p>
             <a:fld id="{E796DD2E-7FCA-4C1F-A0C3-02DE4E493BB2}" type="datetimeFigureOut">
               <a:rPr lang="en-GB" smtClean="0"/>
-              <a:t>06/05/2025</a:t>
+              <a:t>07/05/2025</a:t>
             </a:fld>
             <a:endParaRPr lang="en-GB" dirty="0"/>
           </a:p>
@@ -9858,7 +9858,7 @@
           <a:p>
             <a:fld id="{E796DD2E-7FCA-4C1F-A0C3-02DE4E493BB2}" type="datetimeFigureOut">
               <a:rPr lang="en-GB" smtClean="0"/>
-              <a:t>06/05/2025</a:t>
+              <a:t>07/05/2025</a:t>
             </a:fld>
             <a:endParaRPr lang="en-GB" dirty="0"/>
           </a:p>
@@ -10100,7 +10100,7 @@
           <a:p>
             <a:fld id="{E796DD2E-7FCA-4C1F-A0C3-02DE4E493BB2}" type="datetimeFigureOut">
               <a:rPr lang="en-GB" smtClean="0"/>
-              <a:t>06/05/2025</a:t>
+              <a:t>07/05/2025</a:t>
             </a:fld>
             <a:endParaRPr lang="en-GB" dirty="0"/>
           </a:p>
@@ -11561,8 +11561,8 @@
         </p:nvSpPr>
         <p:spPr>
           <a:xfrm>
-            <a:off x="4951317" y="1802413"/>
-            <a:ext cx="2209800" cy="1277273"/>
+            <a:off x="4951316" y="1764858"/>
+            <a:ext cx="2209800" cy="1523494"/>
           </a:xfrm>
           <a:prstGeom prst="rect">
             <a:avLst/>
@@ -11596,7 +11596,18 @@
             <a:pPr lvl="0" algn="ctr"/>
             <a:r>
               <a:rPr lang="en-GB" sz="1500" i="1" dirty="0"/>
-              <a:t>Jack Harrison </a:t>
+              <a:t>Jack Harrison</a:t>
+            </a:r>
+          </a:p>
+          <a:p>
+            <a:pPr lvl="0" algn="ctr"/>
+            <a:r>
+              <a:rPr lang="en-GB" sz="1600" dirty="0"/>
+              <a:t>40537035</a:t>
+            </a:r>
+            <a:r>
+              <a:rPr lang="en-GB" sz="1500" i="1" dirty="0"/>
+              <a:t> </a:t>
             </a:r>
           </a:p>
         </p:txBody>
@@ -11615,8 +11626,8 @@
         </p:nvSpPr>
         <p:spPr>
           <a:xfrm>
-            <a:off x="7216100" y="1802414"/>
-            <a:ext cx="2117558" cy="1277273"/>
+            <a:off x="7205627" y="1762057"/>
+            <a:ext cx="2117558" cy="1523494"/>
           </a:xfrm>
           <a:prstGeom prst="rect">
             <a:avLst/>
@@ -11643,7 +11654,18 @@
             <a:pPr lvl="0" algn="ctr"/>
             <a:r>
               <a:rPr lang="en-GB" sz="1500" i="1" dirty="0"/>
-              <a:t>Ruben Lazell </a:t>
+              <a:t>Ruben Lazell</a:t>
+            </a:r>
+          </a:p>
+          <a:p>
+            <a:pPr lvl="0" algn="ctr"/>
+            <a:r>
+              <a:rPr lang="en-GB" sz="1600" dirty="0"/>
+              <a:t>40679914</a:t>
+            </a:r>
+            <a:r>
+              <a:rPr lang="en-GB" sz="1500" i="1" dirty="0"/>
+              <a:t> </a:t>
             </a:r>
           </a:p>
         </p:txBody>
@@ -11663,7 +11685,7 @@
         <p:spPr>
           <a:xfrm>
             <a:off x="525702" y="1764858"/>
-            <a:ext cx="2592807" cy="1277273"/>
+            <a:ext cx="2592807" cy="1523494"/>
           </a:xfrm>
           <a:prstGeom prst="rect">
             <a:avLst/>
@@ -11690,7 +11712,18 @@
             <a:pPr lvl="0" algn="ctr"/>
             <a:r>
               <a:rPr lang="en-GB" sz="1500" i="1" dirty="0"/>
-              <a:t>Ansh Bisht </a:t>
+              <a:t>Ansh Bisht</a:t>
+            </a:r>
+          </a:p>
+          <a:p>
+            <a:pPr lvl="0" algn="ctr"/>
+            <a:r>
+              <a:rPr lang="en-GB" sz="1600" dirty="0"/>
+              <a:t>40527530</a:t>
+            </a:r>
+            <a:r>
+              <a:rPr lang="en-GB" sz="1500" i="1" dirty="0"/>
+              <a:t> </a:t>
             </a:r>
           </a:p>
         </p:txBody>
@@ -11709,8 +11742,8 @@
         </p:nvSpPr>
         <p:spPr>
           <a:xfrm>
-            <a:off x="9194819" y="1802414"/>
-            <a:ext cx="2117558" cy="1277273"/>
+            <a:off x="9293275" y="1762057"/>
+            <a:ext cx="2117558" cy="1523494"/>
           </a:xfrm>
           <a:prstGeom prst="rect">
             <a:avLst/>
@@ -11753,6 +11786,14 @@
               <a:rPr lang="en-GB" sz="1500" i="1" dirty="0"/>
               <a:t>Andrew Taison</a:t>
             </a:r>
+          </a:p>
+          <a:p>
+            <a:pPr lvl="0" algn="ctr"/>
+            <a:r>
+              <a:rPr lang="en-GB" sz="1600" dirty="0"/>
+              <a:t>40538519</a:t>
+            </a:r>
+            <a:endParaRPr lang="en-GB" sz="1500" i="1" dirty="0"/>
           </a:p>
         </p:txBody>
       </p:sp>
@@ -11771,7 +11812,7 @@
         <p:spPr>
           <a:xfrm>
             <a:off x="2892171" y="1764858"/>
-            <a:ext cx="2117558" cy="1277273"/>
+            <a:ext cx="2117558" cy="1523494"/>
           </a:xfrm>
           <a:prstGeom prst="rect">
             <a:avLst/>
@@ -11809,7 +11850,18 @@
             <a:pPr lvl="0" algn="ctr"/>
             <a:r>
               <a:rPr lang="en-GB" sz="1500" i="1" dirty="0"/>
-              <a:t>Jordan Dickson </a:t>
+              <a:t>Jordan Dickson</a:t>
+            </a:r>
+          </a:p>
+          <a:p>
+            <a:pPr lvl="0" algn="ctr"/>
+            <a:r>
+              <a:rPr lang="en-GB" sz="1600" dirty="0"/>
+              <a:t>40545300</a:t>
+            </a:r>
+            <a:r>
+              <a:rPr lang="en-GB" sz="1500" i="1" dirty="0"/>
+              <a:t> </a:t>
             </a:r>
           </a:p>
         </p:txBody>

</xml_diff>